<commit_message>
Filled in initial information to get a start on the presentation
</commit_message>
<xml_diff>
--- a/assets/slides/Project Presentation.pptx
+++ b/assets/slides/Project Presentation.pptx
@@ -1,25 +1,25 @@
 
 <file path=ppt/presentation.xml><?xml version="1.0" encoding="utf-8"?>
-<p:presentation xmlns:a="http://schemas.openxmlformats.org/drawingml/2006/main" xmlns:r="http://schemas.openxmlformats.org/officeDocument/2006/relationships" xmlns:mc="http://schemas.openxmlformats.org/markup-compatibility/2006" xmlns:mv="urn:schemas-microsoft-com:mac:vml" xmlns:p="http://schemas.openxmlformats.org/presentationml/2006/main" xmlns:c="http://schemas.openxmlformats.org/drawingml/2006/chart" xmlns:dgm="http://schemas.openxmlformats.org/drawingml/2006/diagram" xmlns:o="urn:schemas-microsoft-com:office:office" xmlns:v="urn:schemas-microsoft-com:vml" xmlns:pvml="urn:schemas-microsoft-com:office:powerpoint" xmlns:com="http://schemas.openxmlformats.org/drawingml/2006/compatibility" xmlns:p14="http://schemas.microsoft.com/office/powerpoint/2010/main" xmlns:p15="http://schemas.microsoft.com/office/powerpoint/2012/main" xmlns:ahyp="http://schemas.microsoft.com/office/drawing/2018/hyperlinkcolor" autoCompressPictures="0" strictFirstAndLastChars="0" saveSubsetFonts="1">
+<p:presentation xmlns:a="http://schemas.openxmlformats.org/drawingml/2006/main" xmlns:r="http://schemas.openxmlformats.org/officeDocument/2006/relationships" xmlns:p="http://schemas.openxmlformats.org/presentationml/2006/main" strictFirstAndLastChars="0" saveSubsetFonts="1" autoCompressPictures="0">
   <p:sldMasterIdLst>
-    <p:sldMasterId id="2147483659" r:id="rId3"/>
+    <p:sldMasterId id="2147483659" r:id="rId1"/>
   </p:sldMasterIdLst>
   <p:notesMasterIdLst>
-    <p:notesMasterId r:id="rId4"/>
+    <p:notesMasterId r:id="rId9"/>
   </p:notesMasterIdLst>
   <p:sldIdLst>
-    <p:sldId id="256" r:id="rId5"/>
-    <p:sldId id="257" r:id="rId6"/>
-    <p:sldId id="258" r:id="rId7"/>
-    <p:sldId id="259" r:id="rId8"/>
-    <p:sldId id="260" r:id="rId9"/>
-    <p:sldId id="261" r:id="rId10"/>
-    <p:sldId id="262" r:id="rId11"/>
+    <p:sldId id="256" r:id="rId2"/>
+    <p:sldId id="257" r:id="rId3"/>
+    <p:sldId id="258" r:id="rId4"/>
+    <p:sldId id="259" r:id="rId5"/>
+    <p:sldId id="260" r:id="rId6"/>
+    <p:sldId id="261" r:id="rId7"/>
+    <p:sldId id="262" r:id="rId8"/>
   </p:sldIdLst>
-  <p:sldSz cy="5143500" cx="9144000"/>
+  <p:sldSz cx="9144000" cy="5143500" type="screen16x9"/>
   <p:notesSz cx="6858000" cy="9144000"/>
   <p:defaultTextStyle>
-    <a:defPPr lvl="0" marR="0" rtl="0" algn="l">
+    <a:defPPr marR="0" lvl="0" algn="l" rtl="0">
       <a:lnSpc>
         <a:spcPct val="100000"/>
       </a:lnSpc>
@@ -30,7 +30,7 @@
         <a:spcPts val="0"/>
       </a:spcAft>
     </a:defPPr>
-    <a:lvl1pPr lvl="0" marR="0" rtl="0" algn="l">
+    <a:lvl1pPr marR="0" lvl="0" algn="l" rtl="0">
       <a:lnSpc>
         <a:spcPct val="100000"/>
       </a:lnSpc>
@@ -44,7 +44,7 @@
         <a:srgbClr val="000000"/>
       </a:buClr>
       <a:buFont typeface="Arial"/>
-      <a:defRPr b="0" i="0" sz="1400" u="none" cap="none" strike="noStrike">
+      <a:defRPr sz="1400" b="0" i="0" u="none" strike="noStrike" cap="none">
         <a:solidFill>
           <a:srgbClr val="000000"/>
         </a:solidFill>
@@ -54,7 +54,7 @@
         <a:sym typeface="Arial"/>
       </a:defRPr>
     </a:lvl1pPr>
-    <a:lvl2pPr lvl="1" marR="0" rtl="0" algn="l">
+    <a:lvl2pPr marR="0" lvl="1" algn="l" rtl="0">
       <a:lnSpc>
         <a:spcPct val="100000"/>
       </a:lnSpc>
@@ -68,7 +68,7 @@
         <a:srgbClr val="000000"/>
       </a:buClr>
       <a:buFont typeface="Arial"/>
-      <a:defRPr b="0" i="0" sz="1400" u="none" cap="none" strike="noStrike">
+      <a:defRPr sz="1400" b="0" i="0" u="none" strike="noStrike" cap="none">
         <a:solidFill>
           <a:srgbClr val="000000"/>
         </a:solidFill>
@@ -78,7 +78,7 @@
         <a:sym typeface="Arial"/>
       </a:defRPr>
     </a:lvl2pPr>
-    <a:lvl3pPr lvl="2" marR="0" rtl="0" algn="l">
+    <a:lvl3pPr marR="0" lvl="2" algn="l" rtl="0">
       <a:lnSpc>
         <a:spcPct val="100000"/>
       </a:lnSpc>
@@ -92,7 +92,7 @@
         <a:srgbClr val="000000"/>
       </a:buClr>
       <a:buFont typeface="Arial"/>
-      <a:defRPr b="0" i="0" sz="1400" u="none" cap="none" strike="noStrike">
+      <a:defRPr sz="1400" b="0" i="0" u="none" strike="noStrike" cap="none">
         <a:solidFill>
           <a:srgbClr val="000000"/>
         </a:solidFill>
@@ -102,7 +102,7 @@
         <a:sym typeface="Arial"/>
       </a:defRPr>
     </a:lvl3pPr>
-    <a:lvl4pPr lvl="3" marR="0" rtl="0" algn="l">
+    <a:lvl4pPr marR="0" lvl="3" algn="l" rtl="0">
       <a:lnSpc>
         <a:spcPct val="100000"/>
       </a:lnSpc>
@@ -116,7 +116,7 @@
         <a:srgbClr val="000000"/>
       </a:buClr>
       <a:buFont typeface="Arial"/>
-      <a:defRPr b="0" i="0" sz="1400" u="none" cap="none" strike="noStrike">
+      <a:defRPr sz="1400" b="0" i="0" u="none" strike="noStrike" cap="none">
         <a:solidFill>
           <a:srgbClr val="000000"/>
         </a:solidFill>
@@ -126,7 +126,7 @@
         <a:sym typeface="Arial"/>
       </a:defRPr>
     </a:lvl4pPr>
-    <a:lvl5pPr lvl="4" marR="0" rtl="0" algn="l">
+    <a:lvl5pPr marR="0" lvl="4" algn="l" rtl="0">
       <a:lnSpc>
         <a:spcPct val="100000"/>
       </a:lnSpc>
@@ -140,7 +140,7 @@
         <a:srgbClr val="000000"/>
       </a:buClr>
       <a:buFont typeface="Arial"/>
-      <a:defRPr b="0" i="0" sz="1400" u="none" cap="none" strike="noStrike">
+      <a:defRPr sz="1400" b="0" i="0" u="none" strike="noStrike" cap="none">
         <a:solidFill>
           <a:srgbClr val="000000"/>
         </a:solidFill>
@@ -150,7 +150,7 @@
         <a:sym typeface="Arial"/>
       </a:defRPr>
     </a:lvl5pPr>
-    <a:lvl6pPr lvl="5" marR="0" rtl="0" algn="l">
+    <a:lvl6pPr marR="0" lvl="5" algn="l" rtl="0">
       <a:lnSpc>
         <a:spcPct val="100000"/>
       </a:lnSpc>
@@ -164,7 +164,7 @@
         <a:srgbClr val="000000"/>
       </a:buClr>
       <a:buFont typeface="Arial"/>
-      <a:defRPr b="0" i="0" sz="1400" u="none" cap="none" strike="noStrike">
+      <a:defRPr sz="1400" b="0" i="0" u="none" strike="noStrike" cap="none">
         <a:solidFill>
           <a:srgbClr val="000000"/>
         </a:solidFill>
@@ -174,7 +174,7 @@
         <a:sym typeface="Arial"/>
       </a:defRPr>
     </a:lvl6pPr>
-    <a:lvl7pPr lvl="6" marR="0" rtl="0" algn="l">
+    <a:lvl7pPr marR="0" lvl="6" algn="l" rtl="0">
       <a:lnSpc>
         <a:spcPct val="100000"/>
       </a:lnSpc>
@@ -188,7 +188,7 @@
         <a:srgbClr val="000000"/>
       </a:buClr>
       <a:buFont typeface="Arial"/>
-      <a:defRPr b="0" i="0" sz="1400" u="none" cap="none" strike="noStrike">
+      <a:defRPr sz="1400" b="0" i="0" u="none" strike="noStrike" cap="none">
         <a:solidFill>
           <a:srgbClr val="000000"/>
         </a:solidFill>
@@ -198,7 +198,7 @@
         <a:sym typeface="Arial"/>
       </a:defRPr>
     </a:lvl7pPr>
-    <a:lvl8pPr lvl="7" marR="0" rtl="0" algn="l">
+    <a:lvl8pPr marR="0" lvl="7" algn="l" rtl="0">
       <a:lnSpc>
         <a:spcPct val="100000"/>
       </a:lnSpc>
@@ -212,7 +212,7 @@
         <a:srgbClr val="000000"/>
       </a:buClr>
       <a:buFont typeface="Arial"/>
-      <a:defRPr b="0" i="0" sz="1400" u="none" cap="none" strike="noStrike">
+      <a:defRPr sz="1400" b="0" i="0" u="none" strike="noStrike" cap="none">
         <a:solidFill>
           <a:srgbClr val="000000"/>
         </a:solidFill>
@@ -222,7 +222,7 @@
         <a:sym typeface="Arial"/>
       </a:defRPr>
     </a:lvl8pPr>
-    <a:lvl9pPr lvl="8" marR="0" rtl="0" algn="l">
+    <a:lvl9pPr marR="0" lvl="8" algn="l" rtl="0">
       <a:lnSpc>
         <a:spcPct val="100000"/>
       </a:lnSpc>
@@ -236,7 +236,7 @@
         <a:srgbClr val="000000"/>
       </a:buClr>
       <a:buFont typeface="Arial"/>
-      <a:defRPr b="0" i="0" sz="1400" u="none" cap="none" strike="noStrike">
+      <a:defRPr sz="1400" b="0" i="0" u="none" strike="noStrike" cap="none">
         <a:solidFill>
           <a:srgbClr val="000000"/>
         </a:solidFill>
@@ -251,11 +251,16 @@
 </file>
 
 <file path=ppt/notesMasters/notesMaster1.xml><?xml version="1.0" encoding="utf-8"?>
-<p:notesMaster xmlns:a="http://schemas.openxmlformats.org/drawingml/2006/main" xmlns:r="http://schemas.openxmlformats.org/officeDocument/2006/relationships" xmlns:mc="http://schemas.openxmlformats.org/markup-compatibility/2006" xmlns:mv="urn:schemas-microsoft-com:mac:vml" xmlns:p="http://schemas.openxmlformats.org/presentationml/2006/main" xmlns:c="http://schemas.openxmlformats.org/drawingml/2006/chart" xmlns:dgm="http://schemas.openxmlformats.org/drawingml/2006/diagram" xmlns:o="urn:schemas-microsoft-com:office:office" xmlns:v="urn:schemas-microsoft-com:vml" xmlns:pvml="urn:schemas-microsoft-com:office:powerpoint" xmlns:com="http://schemas.openxmlformats.org/drawingml/2006/compatibility" xmlns:p14="http://schemas.microsoft.com/office/powerpoint/2010/main" xmlns:p15="http://schemas.microsoft.com/office/powerpoint/2012/main" xmlns:ahyp="http://schemas.microsoft.com/office/drawing/2018/hyperlinkcolor">
+<p:notesMaster xmlns:a="http://schemas.openxmlformats.org/drawingml/2006/main" xmlns:r="http://schemas.openxmlformats.org/officeDocument/2006/relationships" xmlns:p="http://schemas.openxmlformats.org/presentationml/2006/main">
   <p:cSld>
+    <p:bg>
+      <p:bgRef idx="1001">
+        <a:schemeClr val="bg1"/>
+      </p:bgRef>
+    </p:bg>
     <p:spTree>
       <p:nvGrpSpPr>
-        <p:cNvPr id="2" name="Shape 2"/>
+        <p:cNvPr id="1" name="Shape 2"/>
         <p:cNvGrpSpPr/>
         <p:nvPr/>
       </p:nvGrpSpPr>
@@ -270,9 +275,11 @@
       <p:sp>
         <p:nvSpPr>
           <p:cNvPr id="3" name="Google Shape;3;n"/>
-          <p:cNvSpPr/>
+          <p:cNvSpPr>
+            <a:spLocks noGrp="1" noRot="1" noChangeAspect="1"/>
+          </p:cNvSpPr>
           <p:nvPr>
-            <p:ph idx="2" type="sldImg"/>
+            <p:ph type="sldImg" idx="2"/>
           </p:nvPr>
         </p:nvSpPr>
         <p:spPr>
@@ -281,9 +288,13 @@
             <a:ext cx="6096075" cy="3429000"/>
           </a:xfrm>
           <a:custGeom>
-            <a:rect b="b" l="l" r="r" t="t"/>
+            <a:avLst/>
+            <a:gdLst/>
+            <a:ahLst/>
+            <a:cxnLst/>
+            <a:rect l="l" t="t" r="r" b="b"/>
             <a:pathLst>
-              <a:path extrusionOk="0" h="120000" w="120000">
+              <a:path w="120000" h="120000" extrusionOk="0">
                 <a:moveTo>
                   <a:pt x="0" y="0"/>
                 </a:moveTo>
@@ -301,23 +312,25 @@
             </a:pathLst>
           </a:custGeom>
           <a:noFill/>
-          <a:ln cap="flat" cmpd="sng" w="9525">
+          <a:ln w="9525" cap="flat" cmpd="sng">
             <a:solidFill>
               <a:srgbClr val="000000"/>
             </a:solidFill>
             <a:prstDash val="solid"/>
             <a:round/>
-            <a:headEnd len="sm" w="sm" type="none"/>
-            <a:tailEnd len="sm" w="sm" type="none"/>
+            <a:headEnd type="none" w="sm" len="sm"/>
+            <a:tailEnd type="none" w="sm" len="sm"/>
           </a:ln>
         </p:spPr>
       </p:sp>
       <p:sp>
         <p:nvSpPr>
           <p:cNvPr id="4" name="Google Shape;4;n"/>
-          <p:cNvSpPr txBox="1"/>
+          <p:cNvSpPr txBox="1">
+            <a:spLocks noGrp="1"/>
+          </p:cNvSpPr>
           <p:nvPr>
-            <p:ph idx="1" type="body"/>
+            <p:ph type="body" idx="1"/>
           </p:nvPr>
         </p:nvSpPr>
         <p:spPr>
@@ -334,11 +347,11 @@
           </a:ln>
         </p:spPr>
         <p:txBody>
-          <a:bodyPr anchorCtr="0" anchor="t" bIns="91425" lIns="91425" spcFirstLastPara="1" rIns="91425" wrap="square" tIns="91425">
+          <a:bodyPr spcFirstLastPara="1" wrap="square" lIns="91425" tIns="91425" rIns="91425" bIns="91425" anchor="t" anchorCtr="0">
             <a:noAutofit/>
           </a:bodyPr>
           <a:lstStyle>
-            <a:lvl1pPr indent="-298450" lvl="0" marL="457200">
+            <a:lvl1pPr marL="457200" lvl="0" indent="-298450">
               <a:spcBef>
                 <a:spcPts val="0"/>
               </a:spcBef>
@@ -349,7 +362,7 @@
               <a:buChar char="●"/>
               <a:defRPr sz="1100"/>
             </a:lvl1pPr>
-            <a:lvl2pPr indent="-298450" lvl="1" marL="914400">
+            <a:lvl2pPr marL="914400" lvl="1" indent="-298450">
               <a:spcBef>
                 <a:spcPts val="0"/>
               </a:spcBef>
@@ -360,7 +373,7 @@
               <a:buChar char="○"/>
               <a:defRPr sz="1100"/>
             </a:lvl2pPr>
-            <a:lvl3pPr indent="-298450" lvl="2" marL="1371600">
+            <a:lvl3pPr marL="1371600" lvl="2" indent="-298450">
               <a:spcBef>
                 <a:spcPts val="0"/>
               </a:spcBef>
@@ -371,7 +384,7 @@
               <a:buChar char="■"/>
               <a:defRPr sz="1100"/>
             </a:lvl3pPr>
-            <a:lvl4pPr indent="-298450" lvl="3" marL="1828800">
+            <a:lvl4pPr marL="1828800" lvl="3" indent="-298450">
               <a:spcBef>
                 <a:spcPts val="0"/>
               </a:spcBef>
@@ -382,7 +395,7 @@
               <a:buChar char="●"/>
               <a:defRPr sz="1100"/>
             </a:lvl4pPr>
-            <a:lvl5pPr indent="-298450" lvl="4" marL="2286000">
+            <a:lvl5pPr marL="2286000" lvl="4" indent="-298450">
               <a:spcBef>
                 <a:spcPts val="0"/>
               </a:spcBef>
@@ -393,7 +406,7 @@
               <a:buChar char="○"/>
               <a:defRPr sz="1100"/>
             </a:lvl5pPr>
-            <a:lvl6pPr indent="-298450" lvl="5" marL="2743200">
+            <a:lvl6pPr marL="2743200" lvl="5" indent="-298450">
               <a:spcBef>
                 <a:spcPts val="0"/>
               </a:spcBef>
@@ -404,7 +417,7 @@
               <a:buChar char="■"/>
               <a:defRPr sz="1100"/>
             </a:lvl6pPr>
-            <a:lvl7pPr indent="-298450" lvl="6" marL="3200400">
+            <a:lvl7pPr marL="3200400" lvl="6" indent="-298450">
               <a:spcBef>
                 <a:spcPts val="0"/>
               </a:spcBef>
@@ -415,7 +428,7 @@
               <a:buChar char="●"/>
               <a:defRPr sz="1100"/>
             </a:lvl7pPr>
-            <a:lvl8pPr indent="-298450" lvl="7" marL="3657600">
+            <a:lvl8pPr marL="3657600" lvl="7" indent="-298450">
               <a:spcBef>
                 <a:spcPts val="0"/>
               </a:spcBef>
@@ -426,7 +439,7 @@
               <a:buChar char="○"/>
               <a:defRPr sz="1100"/>
             </a:lvl8pPr>
-            <a:lvl9pPr indent="-298450" lvl="8" marL="4114800">
+            <a:lvl9pPr marL="4114800" lvl="8" indent="-298450">
               <a:spcBef>
                 <a:spcPts val="0"/>
               </a:spcBef>
@@ -438,14 +451,16 @@
               <a:defRPr sz="1100"/>
             </a:lvl9pPr>
           </a:lstStyle>
-          <a:p/>
+          <a:p>
+            <a:endParaRPr/>
+          </a:p>
         </p:txBody>
       </p:sp>
     </p:spTree>
   </p:cSld>
-  <p:clrMap accent1="accent1" accent2="accent2" accent3="accent3" accent4="accent4" accent5="accent5" accent6="accent6" bg1="lt1" bg2="dk2" tx1="dk1" tx2="lt2" folHlink="folHlink" hlink="hlink"/>
+  <p:clrMap bg1="lt1" tx1="dk1" bg2="dk2" tx2="lt2" accent1="accent1" accent2="accent2" accent3="accent3" accent4="accent4" accent5="accent5" accent6="accent6" hlink="hlink" folHlink="folHlink"/>
   <p:notesStyle>
-    <a:defPPr lvl="0" marR="0" rtl="0" algn="l">
+    <a:defPPr marR="0" lvl="0" algn="l" rtl="0">
       <a:lnSpc>
         <a:spcPct val="100000"/>
       </a:lnSpc>
@@ -456,7 +471,7 @@
         <a:spcPts val="0"/>
       </a:spcAft>
     </a:defPPr>
-    <a:lvl1pPr lvl="0" marR="0" rtl="0" algn="l">
+    <a:lvl1pPr marR="0" lvl="0" algn="l" rtl="0">
       <a:lnSpc>
         <a:spcPct val="100000"/>
       </a:lnSpc>
@@ -470,7 +485,7 @@
         <a:srgbClr val="000000"/>
       </a:buClr>
       <a:buFont typeface="Arial"/>
-      <a:defRPr b="0" i="0" sz="1400" u="none" cap="none" strike="noStrike">
+      <a:defRPr sz="1400" b="0" i="0" u="none" strike="noStrike" cap="none">
         <a:solidFill>
           <a:srgbClr val="000000"/>
         </a:solidFill>
@@ -480,7 +495,7 @@
         <a:sym typeface="Arial"/>
       </a:defRPr>
     </a:lvl1pPr>
-    <a:lvl2pPr lvl="1" marR="0" rtl="0" algn="l">
+    <a:lvl2pPr marR="0" lvl="1" algn="l" rtl="0">
       <a:lnSpc>
         <a:spcPct val="100000"/>
       </a:lnSpc>
@@ -494,7 +509,7 @@
         <a:srgbClr val="000000"/>
       </a:buClr>
       <a:buFont typeface="Arial"/>
-      <a:defRPr b="0" i="0" sz="1400" u="none" cap="none" strike="noStrike">
+      <a:defRPr sz="1400" b="0" i="0" u="none" strike="noStrike" cap="none">
         <a:solidFill>
           <a:srgbClr val="000000"/>
         </a:solidFill>
@@ -504,7 +519,7 @@
         <a:sym typeface="Arial"/>
       </a:defRPr>
     </a:lvl2pPr>
-    <a:lvl3pPr lvl="2" marR="0" rtl="0" algn="l">
+    <a:lvl3pPr marR="0" lvl="2" algn="l" rtl="0">
       <a:lnSpc>
         <a:spcPct val="100000"/>
       </a:lnSpc>
@@ -518,7 +533,7 @@
         <a:srgbClr val="000000"/>
       </a:buClr>
       <a:buFont typeface="Arial"/>
-      <a:defRPr b="0" i="0" sz="1400" u="none" cap="none" strike="noStrike">
+      <a:defRPr sz="1400" b="0" i="0" u="none" strike="noStrike" cap="none">
         <a:solidFill>
           <a:srgbClr val="000000"/>
         </a:solidFill>
@@ -528,7 +543,7 @@
         <a:sym typeface="Arial"/>
       </a:defRPr>
     </a:lvl3pPr>
-    <a:lvl4pPr lvl="3" marR="0" rtl="0" algn="l">
+    <a:lvl4pPr marR="0" lvl="3" algn="l" rtl="0">
       <a:lnSpc>
         <a:spcPct val="100000"/>
       </a:lnSpc>
@@ -542,7 +557,7 @@
         <a:srgbClr val="000000"/>
       </a:buClr>
       <a:buFont typeface="Arial"/>
-      <a:defRPr b="0" i="0" sz="1400" u="none" cap="none" strike="noStrike">
+      <a:defRPr sz="1400" b="0" i="0" u="none" strike="noStrike" cap="none">
         <a:solidFill>
           <a:srgbClr val="000000"/>
         </a:solidFill>
@@ -552,7 +567,7 @@
         <a:sym typeface="Arial"/>
       </a:defRPr>
     </a:lvl4pPr>
-    <a:lvl5pPr lvl="4" marR="0" rtl="0" algn="l">
+    <a:lvl5pPr marR="0" lvl="4" algn="l" rtl="0">
       <a:lnSpc>
         <a:spcPct val="100000"/>
       </a:lnSpc>
@@ -566,7 +581,7 @@
         <a:srgbClr val="000000"/>
       </a:buClr>
       <a:buFont typeface="Arial"/>
-      <a:defRPr b="0" i="0" sz="1400" u="none" cap="none" strike="noStrike">
+      <a:defRPr sz="1400" b="0" i="0" u="none" strike="noStrike" cap="none">
         <a:solidFill>
           <a:srgbClr val="000000"/>
         </a:solidFill>
@@ -576,7 +591,7 @@
         <a:sym typeface="Arial"/>
       </a:defRPr>
     </a:lvl5pPr>
-    <a:lvl6pPr lvl="5" marR="0" rtl="0" algn="l">
+    <a:lvl6pPr marR="0" lvl="5" algn="l" rtl="0">
       <a:lnSpc>
         <a:spcPct val="100000"/>
       </a:lnSpc>
@@ -590,7 +605,7 @@
         <a:srgbClr val="000000"/>
       </a:buClr>
       <a:buFont typeface="Arial"/>
-      <a:defRPr b="0" i="0" sz="1400" u="none" cap="none" strike="noStrike">
+      <a:defRPr sz="1400" b="0" i="0" u="none" strike="noStrike" cap="none">
         <a:solidFill>
           <a:srgbClr val="000000"/>
         </a:solidFill>
@@ -600,7 +615,7 @@
         <a:sym typeface="Arial"/>
       </a:defRPr>
     </a:lvl6pPr>
-    <a:lvl7pPr lvl="6" marR="0" rtl="0" algn="l">
+    <a:lvl7pPr marR="0" lvl="6" algn="l" rtl="0">
       <a:lnSpc>
         <a:spcPct val="100000"/>
       </a:lnSpc>
@@ -614,7 +629,7 @@
         <a:srgbClr val="000000"/>
       </a:buClr>
       <a:buFont typeface="Arial"/>
-      <a:defRPr b="0" i="0" sz="1400" u="none" cap="none" strike="noStrike">
+      <a:defRPr sz="1400" b="0" i="0" u="none" strike="noStrike" cap="none">
         <a:solidFill>
           <a:srgbClr val="000000"/>
         </a:solidFill>
@@ -624,7 +639,7 @@
         <a:sym typeface="Arial"/>
       </a:defRPr>
     </a:lvl7pPr>
-    <a:lvl8pPr lvl="7" marR="0" rtl="0" algn="l">
+    <a:lvl8pPr marR="0" lvl="7" algn="l" rtl="0">
       <a:lnSpc>
         <a:spcPct val="100000"/>
       </a:lnSpc>
@@ -638,7 +653,7 @@
         <a:srgbClr val="000000"/>
       </a:buClr>
       <a:buFont typeface="Arial"/>
-      <a:defRPr b="0" i="0" sz="1400" u="none" cap="none" strike="noStrike">
+      <a:defRPr sz="1400" b="0" i="0" u="none" strike="noStrike" cap="none">
         <a:solidFill>
           <a:srgbClr val="000000"/>
         </a:solidFill>
@@ -648,7 +663,7 @@
         <a:sym typeface="Arial"/>
       </a:defRPr>
     </a:lvl8pPr>
-    <a:lvl9pPr lvl="8" marR="0" rtl="0" algn="l">
+    <a:lvl9pPr marR="0" lvl="8" algn="l" rtl="0">
       <a:lnSpc>
         <a:spcPct val="100000"/>
       </a:lnSpc>
@@ -662,7 +677,7 @@
         <a:srgbClr val="000000"/>
       </a:buClr>
       <a:buFont typeface="Arial"/>
-      <a:defRPr b="0" i="0" sz="1400" u="none" cap="none" strike="noStrike">
+      <a:defRPr sz="1400" b="0" i="0" u="none" strike="noStrike" cap="none">
         <a:solidFill>
           <a:srgbClr val="000000"/>
         </a:solidFill>
@@ -677,11 +692,11 @@
 </file>
 
 <file path=ppt/notesSlides/notesSlide1.xml><?xml version="1.0" encoding="utf-8"?>
-<p:notes xmlns:a="http://schemas.openxmlformats.org/drawingml/2006/main" xmlns:r="http://schemas.openxmlformats.org/officeDocument/2006/relationships" xmlns:mc="http://schemas.openxmlformats.org/markup-compatibility/2006" xmlns:mv="urn:schemas-microsoft-com:mac:vml" xmlns:p="http://schemas.openxmlformats.org/presentationml/2006/main" xmlns:c="http://schemas.openxmlformats.org/drawingml/2006/chart" xmlns:dgm="http://schemas.openxmlformats.org/drawingml/2006/diagram" xmlns:o="urn:schemas-microsoft-com:office:office" xmlns:v="urn:schemas-microsoft-com:vml" xmlns:pvml="urn:schemas-microsoft-com:office:powerpoint" xmlns:com="http://schemas.openxmlformats.org/drawingml/2006/compatibility" xmlns:p14="http://schemas.microsoft.com/office/powerpoint/2010/main" xmlns:p15="http://schemas.microsoft.com/office/powerpoint/2012/main" xmlns:ahyp="http://schemas.microsoft.com/office/drawing/2018/hyperlinkcolor" showMasterPhAnim="0" showMasterSp="0">
+<p:notes xmlns:a="http://schemas.openxmlformats.org/drawingml/2006/main" xmlns:r="http://schemas.openxmlformats.org/officeDocument/2006/relationships" xmlns:p="http://schemas.openxmlformats.org/presentationml/2006/main" showMasterSp="0" showMasterPhAnim="0">
   <p:cSld>
     <p:spTree>
       <p:nvGrpSpPr>
-        <p:cNvPr id="50" name="Shape 50"/>
+        <p:cNvPr id="1" name="Shape 50"/>
         <p:cNvGrpSpPr/>
         <p:nvPr/>
       </p:nvGrpSpPr>
@@ -696,20 +711,26 @@
       <p:sp>
         <p:nvSpPr>
           <p:cNvPr id="51" name="Google Shape;51;p:notes"/>
-          <p:cNvSpPr/>
+          <p:cNvSpPr>
+            <a:spLocks noGrp="1" noRot="1" noChangeAspect="1"/>
+          </p:cNvSpPr>
           <p:nvPr>
-            <p:ph idx="2" type="sldImg"/>
+            <p:ph type="sldImg" idx="2"/>
           </p:nvPr>
         </p:nvSpPr>
         <p:spPr>
           <a:xfrm>
-            <a:off x="381300" y="685800"/>
-            <a:ext cx="6096075" cy="3429000"/>
+            <a:off x="381000" y="685800"/>
+            <a:ext cx="6096000" cy="3429000"/>
           </a:xfrm>
           <a:custGeom>
-            <a:rect b="b" l="l" r="r" t="t"/>
+            <a:avLst/>
+            <a:gdLst/>
+            <a:ahLst/>
+            <a:cxnLst/>
+            <a:rect l="l" t="t" r="r" b="b"/>
             <a:pathLst>
-              <a:path extrusionOk="0" h="120000" w="120000">
+              <a:path w="120000" h="120000" extrusionOk="0">
                 <a:moveTo>
                   <a:pt x="0" y="0"/>
                 </a:moveTo>
@@ -731,9 +752,11 @@
       <p:sp>
         <p:nvSpPr>
           <p:cNvPr id="52" name="Google Shape;52;p:notes"/>
-          <p:cNvSpPr txBox="1"/>
+          <p:cNvSpPr txBox="1">
+            <a:spLocks noGrp="1"/>
+          </p:cNvSpPr>
           <p:nvPr>
-            <p:ph idx="1" type="body"/>
+            <p:ph type="body" idx="1"/>
           </p:nvPr>
         </p:nvSpPr>
         <p:spPr>
@@ -746,12 +769,12 @@
           </a:prstGeom>
         </p:spPr>
         <p:txBody>
-          <a:bodyPr anchorCtr="0" anchor="t" bIns="91425" lIns="91425" spcFirstLastPara="1" rIns="91425" wrap="square" tIns="91425">
+          <a:bodyPr spcFirstLastPara="1" wrap="square" lIns="91425" tIns="91425" rIns="91425" bIns="91425" anchor="t" anchorCtr="0">
             <a:noAutofit/>
           </a:bodyPr>
           <a:lstStyle/>
           <a:p>
-            <a:pPr indent="0" lvl="0" marL="0" rtl="0" algn="l">
+            <a:pPr marL="0" lvl="0" indent="0" algn="l" rtl="0">
               <a:spcBef>
                 <a:spcPts val="0"/>
               </a:spcBef>
@@ -760,9 +783,6 @@
               </a:spcAft>
               <a:buNone/>
             </a:pPr>
-            <a:r>
-              <a:t/>
-            </a:r>
             <a:endParaRPr/>
           </a:p>
         </p:txBody>
@@ -776,11 +796,11 @@
 </file>
 
 <file path=ppt/notesSlides/notesSlide2.xml><?xml version="1.0" encoding="utf-8"?>
-<p:notes xmlns:a="http://schemas.openxmlformats.org/drawingml/2006/main" xmlns:r="http://schemas.openxmlformats.org/officeDocument/2006/relationships" xmlns:mc="http://schemas.openxmlformats.org/markup-compatibility/2006" xmlns:mv="urn:schemas-microsoft-com:mac:vml" xmlns:p="http://schemas.openxmlformats.org/presentationml/2006/main" xmlns:c="http://schemas.openxmlformats.org/drawingml/2006/chart" xmlns:dgm="http://schemas.openxmlformats.org/drawingml/2006/diagram" xmlns:o="urn:schemas-microsoft-com:office:office" xmlns:v="urn:schemas-microsoft-com:vml" xmlns:pvml="urn:schemas-microsoft-com:office:powerpoint" xmlns:com="http://schemas.openxmlformats.org/drawingml/2006/compatibility" xmlns:p14="http://schemas.microsoft.com/office/powerpoint/2010/main" xmlns:p15="http://schemas.microsoft.com/office/powerpoint/2012/main" xmlns:ahyp="http://schemas.microsoft.com/office/drawing/2018/hyperlinkcolor" showMasterPhAnim="0" showMasterSp="0">
+<p:notes xmlns:a="http://schemas.openxmlformats.org/drawingml/2006/main" xmlns:r="http://schemas.openxmlformats.org/officeDocument/2006/relationships" xmlns:p="http://schemas.openxmlformats.org/presentationml/2006/main" showMasterSp="0" showMasterPhAnim="0">
   <p:cSld>
     <p:spTree>
       <p:nvGrpSpPr>
-        <p:cNvPr id="56" name="Shape 56"/>
+        <p:cNvPr id="1" name="Shape 56"/>
         <p:cNvGrpSpPr/>
         <p:nvPr/>
       </p:nvGrpSpPr>
@@ -795,9 +815,11 @@
       <p:sp>
         <p:nvSpPr>
           <p:cNvPr id="57" name="Google Shape;57;g320332ed93_1_0:notes"/>
-          <p:cNvSpPr/>
+          <p:cNvSpPr>
+            <a:spLocks noGrp="1" noRot="1" noChangeAspect="1"/>
+          </p:cNvSpPr>
           <p:nvPr>
-            <p:ph idx="2" type="sldImg"/>
+            <p:ph type="sldImg" idx="2"/>
           </p:nvPr>
         </p:nvSpPr>
         <p:spPr>
@@ -806,9 +828,13 @@
             <a:ext cx="6096000" cy="3429000"/>
           </a:xfrm>
           <a:custGeom>
-            <a:rect b="b" l="l" r="r" t="t"/>
+            <a:avLst/>
+            <a:gdLst/>
+            <a:ahLst/>
+            <a:cxnLst/>
+            <a:rect l="l" t="t" r="r" b="b"/>
             <a:pathLst>
-              <a:path extrusionOk="0" h="120000" w="120000">
+              <a:path w="120000" h="120000" extrusionOk="0">
                 <a:moveTo>
                   <a:pt x="0" y="0"/>
                 </a:moveTo>
@@ -830,9 +856,11 @@
       <p:sp>
         <p:nvSpPr>
           <p:cNvPr id="58" name="Google Shape;58;g320332ed93_1_0:notes"/>
-          <p:cNvSpPr txBox="1"/>
+          <p:cNvSpPr txBox="1">
+            <a:spLocks noGrp="1"/>
+          </p:cNvSpPr>
           <p:nvPr>
-            <p:ph idx="1" type="body"/>
+            <p:ph type="body" idx="1"/>
           </p:nvPr>
         </p:nvSpPr>
         <p:spPr>
@@ -845,12 +873,12 @@
           </a:prstGeom>
         </p:spPr>
         <p:txBody>
-          <a:bodyPr anchorCtr="0" anchor="t" bIns="91425" lIns="91425" spcFirstLastPara="1" rIns="91425" wrap="square" tIns="91425">
+          <a:bodyPr spcFirstLastPara="1" wrap="square" lIns="91425" tIns="91425" rIns="91425" bIns="91425" anchor="t" anchorCtr="0">
             <a:noAutofit/>
           </a:bodyPr>
           <a:lstStyle/>
           <a:p>
-            <a:pPr indent="0" lvl="0" marL="0" rtl="0" algn="l">
+            <a:pPr marL="0" lvl="0" indent="0" algn="l" rtl="0">
               <a:spcBef>
                 <a:spcPts val="0"/>
               </a:spcBef>
@@ -859,9 +887,6 @@
               </a:spcAft>
               <a:buNone/>
             </a:pPr>
-            <a:r>
-              <a:t/>
-            </a:r>
             <a:endParaRPr/>
           </a:p>
         </p:txBody>
@@ -875,11 +900,11 @@
 </file>
 
 <file path=ppt/notesSlides/notesSlide3.xml><?xml version="1.0" encoding="utf-8"?>
-<p:notes xmlns:a="http://schemas.openxmlformats.org/drawingml/2006/main" xmlns:r="http://schemas.openxmlformats.org/officeDocument/2006/relationships" xmlns:mc="http://schemas.openxmlformats.org/markup-compatibility/2006" xmlns:mv="urn:schemas-microsoft-com:mac:vml" xmlns:p="http://schemas.openxmlformats.org/presentationml/2006/main" xmlns:c="http://schemas.openxmlformats.org/drawingml/2006/chart" xmlns:dgm="http://schemas.openxmlformats.org/drawingml/2006/diagram" xmlns:o="urn:schemas-microsoft-com:office:office" xmlns:v="urn:schemas-microsoft-com:vml" xmlns:pvml="urn:schemas-microsoft-com:office:powerpoint" xmlns:com="http://schemas.openxmlformats.org/drawingml/2006/compatibility" xmlns:p14="http://schemas.microsoft.com/office/powerpoint/2010/main" xmlns:p15="http://schemas.microsoft.com/office/powerpoint/2012/main" xmlns:ahyp="http://schemas.microsoft.com/office/drawing/2018/hyperlinkcolor" showMasterPhAnim="0" showMasterSp="0">
+<p:notes xmlns:a="http://schemas.openxmlformats.org/drawingml/2006/main" xmlns:r="http://schemas.openxmlformats.org/officeDocument/2006/relationships" xmlns:p="http://schemas.openxmlformats.org/presentationml/2006/main" showMasterSp="0" showMasterPhAnim="0">
   <p:cSld>
     <p:spTree>
       <p:nvGrpSpPr>
-        <p:cNvPr id="61" name="Shape 61"/>
+        <p:cNvPr id="1" name="Shape 61"/>
         <p:cNvGrpSpPr/>
         <p:nvPr/>
       </p:nvGrpSpPr>
@@ -894,20 +919,26 @@
       <p:sp>
         <p:nvSpPr>
           <p:cNvPr id="62" name="Google Shape;62;g29f43f0a72_0_0:notes"/>
-          <p:cNvSpPr/>
+          <p:cNvSpPr>
+            <a:spLocks noGrp="1" noRot="1" noChangeAspect="1"/>
+          </p:cNvSpPr>
           <p:nvPr>
-            <p:ph idx="2" type="sldImg"/>
+            <p:ph type="sldImg" idx="2"/>
           </p:nvPr>
         </p:nvSpPr>
         <p:spPr>
           <a:xfrm>
-            <a:off x="381300" y="685800"/>
+            <a:off x="381000" y="685800"/>
             <a:ext cx="6096000" cy="3429000"/>
           </a:xfrm>
           <a:custGeom>
-            <a:rect b="b" l="l" r="r" t="t"/>
+            <a:avLst/>
+            <a:gdLst/>
+            <a:ahLst/>
+            <a:cxnLst/>
+            <a:rect l="l" t="t" r="r" b="b"/>
             <a:pathLst>
-              <a:path extrusionOk="0" h="120000" w="120000">
+              <a:path w="120000" h="120000" extrusionOk="0">
                 <a:moveTo>
                   <a:pt x="0" y="0"/>
                 </a:moveTo>
@@ -929,9 +960,11 @@
       <p:sp>
         <p:nvSpPr>
           <p:cNvPr id="63" name="Google Shape;63;g29f43f0a72_0_0:notes"/>
-          <p:cNvSpPr txBox="1"/>
+          <p:cNvSpPr txBox="1">
+            <a:spLocks noGrp="1"/>
+          </p:cNvSpPr>
           <p:nvPr>
-            <p:ph idx="1" type="body"/>
+            <p:ph type="body" idx="1"/>
           </p:nvPr>
         </p:nvSpPr>
         <p:spPr>
@@ -944,12 +977,12 @@
           </a:prstGeom>
         </p:spPr>
         <p:txBody>
-          <a:bodyPr anchorCtr="0" anchor="t" bIns="91425" lIns="91425" spcFirstLastPara="1" rIns="91425" wrap="square" tIns="91425">
+          <a:bodyPr spcFirstLastPara="1" wrap="square" lIns="91425" tIns="91425" rIns="91425" bIns="91425" anchor="t" anchorCtr="0">
             <a:noAutofit/>
           </a:bodyPr>
           <a:lstStyle/>
           <a:p>
-            <a:pPr indent="0" lvl="0" marL="0" rtl="0" algn="l">
+            <a:pPr marL="0" lvl="0" indent="0" algn="l" rtl="0">
               <a:spcBef>
                 <a:spcPts val="0"/>
               </a:spcBef>
@@ -958,9 +991,6 @@
               </a:spcAft>
               <a:buNone/>
             </a:pPr>
-            <a:r>
-              <a:t/>
-            </a:r>
             <a:endParaRPr/>
           </a:p>
         </p:txBody>
@@ -974,11 +1004,11 @@
 </file>
 
 <file path=ppt/notesSlides/notesSlide4.xml><?xml version="1.0" encoding="utf-8"?>
-<p:notes xmlns:a="http://schemas.openxmlformats.org/drawingml/2006/main" xmlns:r="http://schemas.openxmlformats.org/officeDocument/2006/relationships" xmlns:mc="http://schemas.openxmlformats.org/markup-compatibility/2006" xmlns:mv="urn:schemas-microsoft-com:mac:vml" xmlns:p="http://schemas.openxmlformats.org/presentationml/2006/main" xmlns:c="http://schemas.openxmlformats.org/drawingml/2006/chart" xmlns:dgm="http://schemas.openxmlformats.org/drawingml/2006/diagram" xmlns:o="urn:schemas-microsoft-com:office:office" xmlns:v="urn:schemas-microsoft-com:vml" xmlns:pvml="urn:schemas-microsoft-com:office:powerpoint" xmlns:com="http://schemas.openxmlformats.org/drawingml/2006/compatibility" xmlns:p14="http://schemas.microsoft.com/office/powerpoint/2010/main" xmlns:p15="http://schemas.microsoft.com/office/powerpoint/2012/main" xmlns:ahyp="http://schemas.microsoft.com/office/drawing/2018/hyperlinkcolor" showMasterPhAnim="0" showMasterSp="0">
+<p:notes xmlns:a="http://schemas.openxmlformats.org/drawingml/2006/main" xmlns:r="http://schemas.openxmlformats.org/officeDocument/2006/relationships" xmlns:p="http://schemas.openxmlformats.org/presentationml/2006/main" showMasterSp="0" showMasterPhAnim="0">
   <p:cSld>
     <p:spTree>
       <p:nvGrpSpPr>
-        <p:cNvPr id="67" name="Shape 67"/>
+        <p:cNvPr id="1" name="Shape 67"/>
         <p:cNvGrpSpPr/>
         <p:nvPr/>
       </p:nvGrpSpPr>
@@ -993,20 +1023,26 @@
       <p:sp>
         <p:nvSpPr>
           <p:cNvPr id="68" name="Google Shape;68;g29f43f0a72_0_5:notes"/>
-          <p:cNvSpPr/>
+          <p:cNvSpPr>
+            <a:spLocks noGrp="1" noRot="1" noChangeAspect="1"/>
+          </p:cNvSpPr>
           <p:nvPr>
-            <p:ph idx="2" type="sldImg"/>
+            <p:ph type="sldImg" idx="2"/>
           </p:nvPr>
         </p:nvSpPr>
         <p:spPr>
           <a:xfrm>
-            <a:off x="381300" y="685800"/>
+            <a:off x="381000" y="685800"/>
             <a:ext cx="6096000" cy="3429000"/>
           </a:xfrm>
           <a:custGeom>
-            <a:rect b="b" l="l" r="r" t="t"/>
+            <a:avLst/>
+            <a:gdLst/>
+            <a:ahLst/>
+            <a:cxnLst/>
+            <a:rect l="l" t="t" r="r" b="b"/>
             <a:pathLst>
-              <a:path extrusionOk="0" h="120000" w="120000">
+              <a:path w="120000" h="120000" extrusionOk="0">
                 <a:moveTo>
                   <a:pt x="0" y="0"/>
                 </a:moveTo>
@@ -1028,9 +1064,11 @@
       <p:sp>
         <p:nvSpPr>
           <p:cNvPr id="69" name="Google Shape;69;g29f43f0a72_0_5:notes"/>
-          <p:cNvSpPr txBox="1"/>
+          <p:cNvSpPr txBox="1">
+            <a:spLocks noGrp="1"/>
+          </p:cNvSpPr>
           <p:nvPr>
-            <p:ph idx="1" type="body"/>
+            <p:ph type="body" idx="1"/>
           </p:nvPr>
         </p:nvSpPr>
         <p:spPr>
@@ -1043,12 +1081,12 @@
           </a:prstGeom>
         </p:spPr>
         <p:txBody>
-          <a:bodyPr anchorCtr="0" anchor="t" bIns="91425" lIns="91425" spcFirstLastPara="1" rIns="91425" wrap="square" tIns="91425">
+          <a:bodyPr spcFirstLastPara="1" wrap="square" lIns="91425" tIns="91425" rIns="91425" bIns="91425" anchor="t" anchorCtr="0">
             <a:noAutofit/>
           </a:bodyPr>
           <a:lstStyle/>
           <a:p>
-            <a:pPr indent="0" lvl="0" marL="0" rtl="0" algn="l">
+            <a:pPr marL="0" lvl="0" indent="0" algn="l" rtl="0">
               <a:spcBef>
                 <a:spcPts val="0"/>
               </a:spcBef>
@@ -1057,9 +1095,6 @@
               </a:spcAft>
               <a:buNone/>
             </a:pPr>
-            <a:r>
-              <a:t/>
-            </a:r>
             <a:endParaRPr/>
           </a:p>
         </p:txBody>
@@ -1073,11 +1108,11 @@
 </file>
 
 <file path=ppt/notesSlides/notesSlide5.xml><?xml version="1.0" encoding="utf-8"?>
-<p:notes xmlns:a="http://schemas.openxmlformats.org/drawingml/2006/main" xmlns:r="http://schemas.openxmlformats.org/officeDocument/2006/relationships" xmlns:mc="http://schemas.openxmlformats.org/markup-compatibility/2006" xmlns:mv="urn:schemas-microsoft-com:mac:vml" xmlns:p="http://schemas.openxmlformats.org/presentationml/2006/main" xmlns:c="http://schemas.openxmlformats.org/drawingml/2006/chart" xmlns:dgm="http://schemas.openxmlformats.org/drawingml/2006/diagram" xmlns:o="urn:schemas-microsoft-com:office:office" xmlns:v="urn:schemas-microsoft-com:vml" xmlns:pvml="urn:schemas-microsoft-com:office:powerpoint" xmlns:com="http://schemas.openxmlformats.org/drawingml/2006/compatibility" xmlns:p14="http://schemas.microsoft.com/office/powerpoint/2010/main" xmlns:p15="http://schemas.microsoft.com/office/powerpoint/2012/main" xmlns:ahyp="http://schemas.microsoft.com/office/drawing/2018/hyperlinkcolor" showMasterPhAnim="0" showMasterSp="0">
+<p:notes xmlns:a="http://schemas.openxmlformats.org/drawingml/2006/main" xmlns:r="http://schemas.openxmlformats.org/officeDocument/2006/relationships" xmlns:p="http://schemas.openxmlformats.org/presentationml/2006/main" showMasterSp="0" showMasterPhAnim="0">
   <p:cSld>
     <p:spTree>
       <p:nvGrpSpPr>
-        <p:cNvPr id="73" name="Shape 73"/>
+        <p:cNvPr id="1" name="Shape 73"/>
         <p:cNvGrpSpPr/>
         <p:nvPr/>
       </p:nvGrpSpPr>
@@ -1092,9 +1127,11 @@
       <p:sp>
         <p:nvSpPr>
           <p:cNvPr id="74" name="Google Shape;74;g29f43f0a72_0_15:notes"/>
-          <p:cNvSpPr/>
+          <p:cNvSpPr>
+            <a:spLocks noGrp="1" noRot="1" noChangeAspect="1"/>
+          </p:cNvSpPr>
           <p:nvPr>
-            <p:ph idx="2" type="sldImg"/>
+            <p:ph type="sldImg" idx="2"/>
           </p:nvPr>
         </p:nvSpPr>
         <p:spPr>
@@ -1103,9 +1140,13 @@
             <a:ext cx="6096000" cy="3429000"/>
           </a:xfrm>
           <a:custGeom>
-            <a:rect b="b" l="l" r="r" t="t"/>
+            <a:avLst/>
+            <a:gdLst/>
+            <a:ahLst/>
+            <a:cxnLst/>
+            <a:rect l="l" t="t" r="r" b="b"/>
             <a:pathLst>
-              <a:path extrusionOk="0" h="120000" w="120000">
+              <a:path w="120000" h="120000" extrusionOk="0">
                 <a:moveTo>
                   <a:pt x="0" y="0"/>
                 </a:moveTo>
@@ -1127,9 +1168,11 @@
       <p:sp>
         <p:nvSpPr>
           <p:cNvPr id="75" name="Google Shape;75;g29f43f0a72_0_15:notes"/>
-          <p:cNvSpPr txBox="1"/>
+          <p:cNvSpPr txBox="1">
+            <a:spLocks noGrp="1"/>
+          </p:cNvSpPr>
           <p:nvPr>
-            <p:ph idx="1" type="body"/>
+            <p:ph type="body" idx="1"/>
           </p:nvPr>
         </p:nvSpPr>
         <p:spPr>
@@ -1142,12 +1185,12 @@
           </a:prstGeom>
         </p:spPr>
         <p:txBody>
-          <a:bodyPr anchorCtr="0" anchor="t" bIns="91425" lIns="91425" spcFirstLastPara="1" rIns="91425" wrap="square" tIns="91425">
+          <a:bodyPr spcFirstLastPara="1" wrap="square" lIns="91425" tIns="91425" rIns="91425" bIns="91425" anchor="t" anchorCtr="0">
             <a:noAutofit/>
           </a:bodyPr>
           <a:lstStyle/>
           <a:p>
-            <a:pPr indent="0" lvl="0" marL="0" rtl="0" algn="l">
+            <a:pPr marL="0" lvl="0" indent="0" algn="l" rtl="0">
               <a:spcBef>
                 <a:spcPts val="0"/>
               </a:spcBef>
@@ -1156,9 +1199,6 @@
               </a:spcAft>
               <a:buNone/>
             </a:pPr>
-            <a:r>
-              <a:t/>
-            </a:r>
             <a:endParaRPr/>
           </a:p>
         </p:txBody>
@@ -1172,11 +1212,11 @@
 </file>
 
 <file path=ppt/notesSlides/notesSlide6.xml><?xml version="1.0" encoding="utf-8"?>
-<p:notes xmlns:a="http://schemas.openxmlformats.org/drawingml/2006/main" xmlns:r="http://schemas.openxmlformats.org/officeDocument/2006/relationships" xmlns:mc="http://schemas.openxmlformats.org/markup-compatibility/2006" xmlns:mv="urn:schemas-microsoft-com:mac:vml" xmlns:p="http://schemas.openxmlformats.org/presentationml/2006/main" xmlns:c="http://schemas.openxmlformats.org/drawingml/2006/chart" xmlns:dgm="http://schemas.openxmlformats.org/drawingml/2006/diagram" xmlns:o="urn:schemas-microsoft-com:office:office" xmlns:v="urn:schemas-microsoft-com:vml" xmlns:pvml="urn:schemas-microsoft-com:office:powerpoint" xmlns:com="http://schemas.openxmlformats.org/drawingml/2006/compatibility" xmlns:p14="http://schemas.microsoft.com/office/powerpoint/2010/main" xmlns:p15="http://schemas.microsoft.com/office/powerpoint/2012/main" xmlns:ahyp="http://schemas.microsoft.com/office/drawing/2018/hyperlinkcolor" showMasterPhAnim="0" showMasterSp="0">
+<p:notes xmlns:a="http://schemas.openxmlformats.org/drawingml/2006/main" xmlns:r="http://schemas.openxmlformats.org/officeDocument/2006/relationships" xmlns:p="http://schemas.openxmlformats.org/presentationml/2006/main" showMasterSp="0" showMasterPhAnim="0">
   <p:cSld>
     <p:spTree>
       <p:nvGrpSpPr>
-        <p:cNvPr id="78" name="Shape 78"/>
+        <p:cNvPr id="1" name="Shape 78"/>
         <p:cNvGrpSpPr/>
         <p:nvPr/>
       </p:nvGrpSpPr>
@@ -1191,20 +1231,26 @@
       <p:sp>
         <p:nvSpPr>
           <p:cNvPr id="79" name="Google Shape;79;g29f43f0a72_0_10:notes"/>
-          <p:cNvSpPr/>
+          <p:cNvSpPr>
+            <a:spLocks noGrp="1" noRot="1" noChangeAspect="1"/>
+          </p:cNvSpPr>
           <p:nvPr>
-            <p:ph idx="2" type="sldImg"/>
+            <p:ph type="sldImg" idx="2"/>
           </p:nvPr>
         </p:nvSpPr>
         <p:spPr>
           <a:xfrm>
-            <a:off x="381300" y="685800"/>
+            <a:off x="381000" y="685800"/>
             <a:ext cx="6096000" cy="3429000"/>
           </a:xfrm>
           <a:custGeom>
-            <a:rect b="b" l="l" r="r" t="t"/>
+            <a:avLst/>
+            <a:gdLst/>
+            <a:ahLst/>
+            <a:cxnLst/>
+            <a:rect l="l" t="t" r="r" b="b"/>
             <a:pathLst>
-              <a:path extrusionOk="0" h="120000" w="120000">
+              <a:path w="120000" h="120000" extrusionOk="0">
                 <a:moveTo>
                   <a:pt x="0" y="0"/>
                 </a:moveTo>
@@ -1226,9 +1272,11 @@
       <p:sp>
         <p:nvSpPr>
           <p:cNvPr id="80" name="Google Shape;80;g29f43f0a72_0_10:notes"/>
-          <p:cNvSpPr txBox="1"/>
+          <p:cNvSpPr txBox="1">
+            <a:spLocks noGrp="1"/>
+          </p:cNvSpPr>
           <p:nvPr>
-            <p:ph idx="1" type="body"/>
+            <p:ph type="body" idx="1"/>
           </p:nvPr>
         </p:nvSpPr>
         <p:spPr>
@@ -1241,12 +1289,12 @@
           </a:prstGeom>
         </p:spPr>
         <p:txBody>
-          <a:bodyPr anchorCtr="0" anchor="t" bIns="91425" lIns="91425" spcFirstLastPara="1" rIns="91425" wrap="square" tIns="91425">
+          <a:bodyPr spcFirstLastPara="1" wrap="square" lIns="91425" tIns="91425" rIns="91425" bIns="91425" anchor="t" anchorCtr="0">
             <a:noAutofit/>
           </a:bodyPr>
           <a:lstStyle/>
           <a:p>
-            <a:pPr indent="0" lvl="0" marL="0" rtl="0" algn="l">
+            <a:pPr marL="0" lvl="0" indent="0" algn="l" rtl="0">
               <a:spcBef>
                 <a:spcPts val="0"/>
               </a:spcBef>
@@ -1255,9 +1303,6 @@
               </a:spcAft>
               <a:buNone/>
             </a:pPr>
-            <a:r>
-              <a:t/>
-            </a:r>
             <a:endParaRPr/>
           </a:p>
         </p:txBody>
@@ -1271,11 +1316,11 @@
 </file>
 
 <file path=ppt/notesSlides/notesSlide7.xml><?xml version="1.0" encoding="utf-8"?>
-<p:notes xmlns:a="http://schemas.openxmlformats.org/drawingml/2006/main" xmlns:r="http://schemas.openxmlformats.org/officeDocument/2006/relationships" xmlns:mc="http://schemas.openxmlformats.org/markup-compatibility/2006" xmlns:mv="urn:schemas-microsoft-com:mac:vml" xmlns:p="http://schemas.openxmlformats.org/presentationml/2006/main" xmlns:c="http://schemas.openxmlformats.org/drawingml/2006/chart" xmlns:dgm="http://schemas.openxmlformats.org/drawingml/2006/diagram" xmlns:o="urn:schemas-microsoft-com:office:office" xmlns:v="urn:schemas-microsoft-com:vml" xmlns:pvml="urn:schemas-microsoft-com:office:powerpoint" xmlns:com="http://schemas.openxmlformats.org/drawingml/2006/compatibility" xmlns:p14="http://schemas.microsoft.com/office/powerpoint/2010/main" xmlns:p15="http://schemas.microsoft.com/office/powerpoint/2012/main" xmlns:ahyp="http://schemas.microsoft.com/office/drawing/2018/hyperlinkcolor" showMasterPhAnim="0" showMasterSp="0">
+<p:notes xmlns:a="http://schemas.openxmlformats.org/drawingml/2006/main" xmlns:r="http://schemas.openxmlformats.org/officeDocument/2006/relationships" xmlns:p="http://schemas.openxmlformats.org/presentationml/2006/main" showMasterSp="0" showMasterPhAnim="0">
   <p:cSld>
     <p:spTree>
       <p:nvGrpSpPr>
-        <p:cNvPr id="84" name="Shape 84"/>
+        <p:cNvPr id="1" name="Shape 84"/>
         <p:cNvGrpSpPr/>
         <p:nvPr/>
       </p:nvGrpSpPr>
@@ -1290,20 +1335,26 @@
       <p:sp>
         <p:nvSpPr>
           <p:cNvPr id="85" name="Google Shape;85;g29f43f0a72_0_24:notes"/>
-          <p:cNvSpPr/>
+          <p:cNvSpPr>
+            <a:spLocks noGrp="1" noRot="1" noChangeAspect="1"/>
+          </p:cNvSpPr>
           <p:nvPr>
-            <p:ph idx="2" type="sldImg"/>
+            <p:ph type="sldImg" idx="2"/>
           </p:nvPr>
         </p:nvSpPr>
         <p:spPr>
           <a:xfrm>
-            <a:off x="381300" y="685800"/>
+            <a:off x="381000" y="685800"/>
             <a:ext cx="6096000" cy="3429000"/>
           </a:xfrm>
           <a:custGeom>
-            <a:rect b="b" l="l" r="r" t="t"/>
+            <a:avLst/>
+            <a:gdLst/>
+            <a:ahLst/>
+            <a:cxnLst/>
+            <a:rect l="l" t="t" r="r" b="b"/>
             <a:pathLst>
-              <a:path extrusionOk="0" h="120000" w="120000">
+              <a:path w="120000" h="120000" extrusionOk="0">
                 <a:moveTo>
                   <a:pt x="0" y="0"/>
                 </a:moveTo>
@@ -1325,9 +1376,11 @@
       <p:sp>
         <p:nvSpPr>
           <p:cNvPr id="86" name="Google Shape;86;g29f43f0a72_0_24:notes"/>
-          <p:cNvSpPr txBox="1"/>
+          <p:cNvSpPr txBox="1">
+            <a:spLocks noGrp="1"/>
+          </p:cNvSpPr>
           <p:nvPr>
-            <p:ph idx="1" type="body"/>
+            <p:ph type="body" idx="1"/>
           </p:nvPr>
         </p:nvSpPr>
         <p:spPr>
@@ -1340,12 +1393,12 @@
           </a:prstGeom>
         </p:spPr>
         <p:txBody>
-          <a:bodyPr anchorCtr="0" anchor="t" bIns="91425" lIns="91425" spcFirstLastPara="1" rIns="91425" wrap="square" tIns="91425">
+          <a:bodyPr spcFirstLastPara="1" wrap="square" lIns="91425" tIns="91425" rIns="91425" bIns="91425" anchor="t" anchorCtr="0">
             <a:noAutofit/>
           </a:bodyPr>
           <a:lstStyle/>
           <a:p>
-            <a:pPr indent="0" lvl="0" marL="0" rtl="0" algn="l">
+            <a:pPr marL="0" lvl="0" indent="0" algn="l" rtl="0">
               <a:spcBef>
                 <a:spcPts val="0"/>
               </a:spcBef>
@@ -1354,9 +1407,6 @@
               </a:spcAft>
               <a:buNone/>
             </a:pPr>
-            <a:r>
-              <a:t/>
-            </a:r>
             <a:endParaRPr/>
           </a:p>
         </p:txBody>
@@ -1370,11 +1420,11 @@
 </file>
 
 <file path=ppt/slideLayouts/slideLayout1.xml><?xml version="1.0" encoding="utf-8"?>
-<p:sldLayout xmlns:a="http://schemas.openxmlformats.org/drawingml/2006/main" xmlns:r="http://schemas.openxmlformats.org/officeDocument/2006/relationships" xmlns:mc="http://schemas.openxmlformats.org/markup-compatibility/2006" xmlns:mv="urn:schemas-microsoft-com:mac:vml" xmlns:p="http://schemas.openxmlformats.org/presentationml/2006/main" xmlns:c="http://schemas.openxmlformats.org/drawingml/2006/chart" xmlns:dgm="http://schemas.openxmlformats.org/drawingml/2006/diagram" xmlns:o="urn:schemas-microsoft-com:office:office" xmlns:v="urn:schemas-microsoft-com:vml" xmlns:pvml="urn:schemas-microsoft-com:office:powerpoint" xmlns:com="http://schemas.openxmlformats.org/drawingml/2006/compatibility" xmlns:p14="http://schemas.microsoft.com/office/powerpoint/2010/main" xmlns:p15="http://schemas.microsoft.com/office/powerpoint/2012/main" xmlns:ahyp="http://schemas.microsoft.com/office/drawing/2018/hyperlinkcolor" matchingName="Title slide" type="title">
+<p:sldLayout xmlns:a="http://schemas.openxmlformats.org/drawingml/2006/main" xmlns:r="http://schemas.openxmlformats.org/officeDocument/2006/relationships" xmlns:p="http://schemas.openxmlformats.org/presentationml/2006/main" matchingName="Title slide" type="title">
   <p:cSld name="TITLE">
     <p:spTree>
       <p:nvGrpSpPr>
-        <p:cNvPr id="9" name="Shape 9"/>
+        <p:cNvPr id="1" name="Shape 9"/>
         <p:cNvGrpSpPr/>
         <p:nvPr/>
       </p:nvGrpSpPr>
@@ -1389,7 +1439,9 @@
       <p:sp>
         <p:nvSpPr>
           <p:cNvPr id="10" name="Google Shape;10;p2"/>
-          <p:cNvSpPr txBox="1"/>
+          <p:cNvSpPr txBox="1">
+            <a:spLocks noGrp="1"/>
+          </p:cNvSpPr>
           <p:nvPr>
             <p:ph type="ctrTitle"/>
           </p:nvPr>
@@ -1404,7 +1456,7 @@
           </a:prstGeom>
         </p:spPr>
         <p:txBody>
-          <a:bodyPr anchorCtr="0" anchor="b" bIns="91425" lIns="91425" spcFirstLastPara="1" rIns="91425" wrap="square" tIns="91425">
+          <a:bodyPr spcFirstLastPara="1" wrap="square" lIns="91425" tIns="91425" rIns="91425" bIns="91425" anchor="b" anchorCtr="0">
             <a:noAutofit/>
           </a:bodyPr>
           <a:lstStyle>
@@ -1508,15 +1560,19 @@
               <a:defRPr sz="5200"/>
             </a:lvl9pPr>
           </a:lstStyle>
-          <a:p/>
+          <a:p>
+            <a:endParaRPr/>
+          </a:p>
         </p:txBody>
       </p:sp>
       <p:sp>
         <p:nvSpPr>
           <p:cNvPr id="11" name="Google Shape;11;p2"/>
-          <p:cNvSpPr txBox="1"/>
+          <p:cNvSpPr txBox="1">
+            <a:spLocks noGrp="1"/>
+          </p:cNvSpPr>
           <p:nvPr>
-            <p:ph idx="1" type="subTitle"/>
+            <p:ph type="subTitle" idx="1"/>
           </p:nvPr>
         </p:nvSpPr>
         <p:spPr>
@@ -1529,7 +1585,7 @@
           </a:prstGeom>
         </p:spPr>
         <p:txBody>
-          <a:bodyPr anchorCtr="0" anchor="t" bIns="91425" lIns="91425" spcFirstLastPara="1" rIns="91425" wrap="square" tIns="91425">
+          <a:bodyPr spcFirstLastPara="1" wrap="square" lIns="91425" tIns="91425" rIns="91425" bIns="91425" anchor="t" anchorCtr="0">
             <a:noAutofit/>
           </a:bodyPr>
           <a:lstStyle>
@@ -1660,15 +1716,19 @@
               <a:defRPr sz="2800"/>
             </a:lvl9pPr>
           </a:lstStyle>
-          <a:p/>
+          <a:p>
+            <a:endParaRPr/>
+          </a:p>
         </p:txBody>
       </p:sp>
       <p:sp>
         <p:nvSpPr>
           <p:cNvPr id="12" name="Google Shape;12;p2"/>
-          <p:cNvSpPr txBox="1"/>
+          <p:cNvSpPr txBox="1">
+            <a:spLocks noGrp="1"/>
+          </p:cNvSpPr>
           <p:nvPr>
-            <p:ph idx="12" type="sldNum"/>
+            <p:ph type="sldNum" idx="12"/>
           </p:nvPr>
         </p:nvSpPr>
         <p:spPr>
@@ -1681,7 +1741,7 @@
           </a:prstGeom>
         </p:spPr>
         <p:txBody>
-          <a:bodyPr anchorCtr="0" anchor="ctr" bIns="91425" lIns="91425" spcFirstLastPara="1" rIns="91425" wrap="square" tIns="91425">
+          <a:bodyPr spcFirstLastPara="1" wrap="square" lIns="91425" tIns="91425" rIns="91425" bIns="91425" anchor="ctr" anchorCtr="0">
             <a:noAutofit/>
           </a:bodyPr>
           <a:lstStyle>
@@ -1723,7 +1783,7 @@
             </a:lvl9pPr>
           </a:lstStyle>
           <a:p>
-            <a:pPr indent="0" lvl="0" marL="0" rtl="0" algn="r">
+            <a:pPr marL="0" lvl="0" indent="0" algn="r" rtl="0">
               <a:spcBef>
                 <a:spcPts val="0"/>
               </a:spcBef>
@@ -1749,11 +1809,11 @@
 </file>
 
 <file path=ppt/slideLayouts/slideLayout10.xml><?xml version="1.0" encoding="utf-8"?>
-<p:sldLayout xmlns:a="http://schemas.openxmlformats.org/drawingml/2006/main" xmlns:r="http://schemas.openxmlformats.org/officeDocument/2006/relationships" xmlns:mc="http://schemas.openxmlformats.org/markup-compatibility/2006" xmlns:mv="urn:schemas-microsoft-com:mac:vml" xmlns:p="http://schemas.openxmlformats.org/presentationml/2006/main" xmlns:c="http://schemas.openxmlformats.org/drawingml/2006/chart" xmlns:dgm="http://schemas.openxmlformats.org/drawingml/2006/diagram" xmlns:o="urn:schemas-microsoft-com:office:office" xmlns:v="urn:schemas-microsoft-com:vml" xmlns:pvml="urn:schemas-microsoft-com:office:powerpoint" xmlns:com="http://schemas.openxmlformats.org/drawingml/2006/compatibility" xmlns:p14="http://schemas.microsoft.com/office/powerpoint/2010/main" xmlns:p15="http://schemas.microsoft.com/office/powerpoint/2012/main" xmlns:ahyp="http://schemas.microsoft.com/office/drawing/2018/hyperlinkcolor" matchingName="Big number">
+<p:sldLayout xmlns:a="http://schemas.openxmlformats.org/drawingml/2006/main" xmlns:r="http://schemas.openxmlformats.org/officeDocument/2006/relationships" xmlns:p="http://schemas.openxmlformats.org/presentationml/2006/main" matchingName="Big number">
   <p:cSld name="BIG_NUMBER">
     <p:spTree>
       <p:nvGrpSpPr>
-        <p:cNvPr id="44" name="Shape 44"/>
+        <p:cNvPr id="1" name="Shape 44"/>
         <p:cNvGrpSpPr/>
         <p:nvPr/>
       </p:nvGrpSpPr>
@@ -1768,9 +1828,11 @@
       <p:sp>
         <p:nvSpPr>
           <p:cNvPr id="45" name="Google Shape;45;p11"/>
-          <p:cNvSpPr txBox="1"/>
+          <p:cNvSpPr txBox="1">
+            <a:spLocks noGrp="1"/>
+          </p:cNvSpPr>
           <p:nvPr>
-            <p:ph hasCustomPrompt="1" type="title"/>
+            <p:ph type="title" hasCustomPrompt="1"/>
           </p:nvPr>
         </p:nvSpPr>
         <p:spPr>
@@ -1783,7 +1845,7 @@
           </a:prstGeom>
         </p:spPr>
         <p:txBody>
-          <a:bodyPr anchorCtr="0" anchor="b" bIns="91425" lIns="91425" spcFirstLastPara="1" rIns="91425" wrap="square" tIns="91425">
+          <a:bodyPr spcFirstLastPara="1" wrap="square" lIns="91425" tIns="91425" rIns="91425" bIns="91425" anchor="b" anchorCtr="0">
             <a:noAutofit/>
           </a:bodyPr>
           <a:lstStyle>
@@ -1897,9 +1959,11 @@
       <p:sp>
         <p:nvSpPr>
           <p:cNvPr id="46" name="Google Shape;46;p11"/>
-          <p:cNvSpPr txBox="1"/>
+          <p:cNvSpPr txBox="1">
+            <a:spLocks noGrp="1"/>
+          </p:cNvSpPr>
           <p:nvPr>
-            <p:ph idx="1" type="body"/>
+            <p:ph type="body" idx="1"/>
           </p:nvPr>
         </p:nvSpPr>
         <p:spPr>
@@ -1912,11 +1976,11 @@
           </a:prstGeom>
         </p:spPr>
         <p:txBody>
-          <a:bodyPr anchorCtr="0" anchor="t" bIns="91425" lIns="91425" spcFirstLastPara="1" rIns="91425" wrap="square" tIns="91425">
+          <a:bodyPr spcFirstLastPara="1" wrap="square" lIns="91425" tIns="91425" rIns="91425" bIns="91425" anchor="t" anchorCtr="0">
             <a:noAutofit/>
           </a:bodyPr>
           <a:lstStyle>
-            <a:lvl1pPr indent="-342900" lvl="0" marL="457200" algn="ctr">
+            <a:lvl1pPr marL="457200" lvl="0" indent="-342900" algn="ctr">
               <a:spcBef>
                 <a:spcPts val="0"/>
               </a:spcBef>
@@ -1927,7 +1991,7 @@
               <a:buChar char="●"/>
               <a:defRPr/>
             </a:lvl1pPr>
-            <a:lvl2pPr indent="-317500" lvl="1" marL="914400" algn="ctr">
+            <a:lvl2pPr marL="914400" lvl="1" indent="-317500" algn="ctr">
               <a:spcBef>
                 <a:spcPts val="1600"/>
               </a:spcBef>
@@ -1938,7 +2002,7 @@
               <a:buChar char="○"/>
               <a:defRPr/>
             </a:lvl2pPr>
-            <a:lvl3pPr indent="-317500" lvl="2" marL="1371600" algn="ctr">
+            <a:lvl3pPr marL="1371600" lvl="2" indent="-317500" algn="ctr">
               <a:spcBef>
                 <a:spcPts val="1600"/>
               </a:spcBef>
@@ -1949,7 +2013,7 @@
               <a:buChar char="■"/>
               <a:defRPr/>
             </a:lvl3pPr>
-            <a:lvl4pPr indent="-317500" lvl="3" marL="1828800" algn="ctr">
+            <a:lvl4pPr marL="1828800" lvl="3" indent="-317500" algn="ctr">
               <a:spcBef>
                 <a:spcPts val="1600"/>
               </a:spcBef>
@@ -1960,7 +2024,7 @@
               <a:buChar char="●"/>
               <a:defRPr/>
             </a:lvl4pPr>
-            <a:lvl5pPr indent="-317500" lvl="4" marL="2286000" algn="ctr">
+            <a:lvl5pPr marL="2286000" lvl="4" indent="-317500" algn="ctr">
               <a:spcBef>
                 <a:spcPts val="1600"/>
               </a:spcBef>
@@ -1971,7 +2035,7 @@
               <a:buChar char="○"/>
               <a:defRPr/>
             </a:lvl5pPr>
-            <a:lvl6pPr indent="-317500" lvl="5" marL="2743200" algn="ctr">
+            <a:lvl6pPr marL="2743200" lvl="5" indent="-317500" algn="ctr">
               <a:spcBef>
                 <a:spcPts val="1600"/>
               </a:spcBef>
@@ -1982,7 +2046,7 @@
               <a:buChar char="■"/>
               <a:defRPr/>
             </a:lvl6pPr>
-            <a:lvl7pPr indent="-317500" lvl="6" marL="3200400" algn="ctr">
+            <a:lvl7pPr marL="3200400" lvl="6" indent="-317500" algn="ctr">
               <a:spcBef>
                 <a:spcPts val="1600"/>
               </a:spcBef>
@@ -1993,7 +2057,7 @@
               <a:buChar char="●"/>
               <a:defRPr/>
             </a:lvl7pPr>
-            <a:lvl8pPr indent="-317500" lvl="7" marL="3657600" algn="ctr">
+            <a:lvl8pPr marL="3657600" lvl="7" indent="-317500" algn="ctr">
               <a:spcBef>
                 <a:spcPts val="1600"/>
               </a:spcBef>
@@ -2004,7 +2068,7 @@
               <a:buChar char="○"/>
               <a:defRPr/>
             </a:lvl8pPr>
-            <a:lvl9pPr indent="-317500" lvl="8" marL="4114800" algn="ctr">
+            <a:lvl9pPr marL="4114800" lvl="8" indent="-317500" algn="ctr">
               <a:spcBef>
                 <a:spcPts val="1600"/>
               </a:spcBef>
@@ -2016,15 +2080,19 @@
               <a:defRPr/>
             </a:lvl9pPr>
           </a:lstStyle>
-          <a:p/>
+          <a:p>
+            <a:endParaRPr/>
+          </a:p>
         </p:txBody>
       </p:sp>
       <p:sp>
         <p:nvSpPr>
           <p:cNvPr id="47" name="Google Shape;47;p11"/>
-          <p:cNvSpPr txBox="1"/>
+          <p:cNvSpPr txBox="1">
+            <a:spLocks noGrp="1"/>
+          </p:cNvSpPr>
           <p:nvPr>
-            <p:ph idx="12" type="sldNum"/>
+            <p:ph type="sldNum" idx="12"/>
           </p:nvPr>
         </p:nvSpPr>
         <p:spPr>
@@ -2037,7 +2105,7 @@
           </a:prstGeom>
         </p:spPr>
         <p:txBody>
-          <a:bodyPr anchorCtr="0" anchor="ctr" bIns="91425" lIns="91425" spcFirstLastPara="1" rIns="91425" wrap="square" tIns="91425">
+          <a:bodyPr spcFirstLastPara="1" wrap="square" lIns="91425" tIns="91425" rIns="91425" bIns="91425" anchor="ctr" anchorCtr="0">
             <a:noAutofit/>
           </a:bodyPr>
           <a:lstStyle>
@@ -2079,7 +2147,7 @@
             </a:lvl9pPr>
           </a:lstStyle>
           <a:p>
-            <a:pPr indent="0" lvl="0" marL="0" rtl="0" algn="r">
+            <a:pPr marL="0" lvl="0" indent="0" algn="r" rtl="0">
               <a:spcBef>
                 <a:spcPts val="0"/>
               </a:spcBef>
@@ -2105,11 +2173,11 @@
 </file>
 
 <file path=ppt/slideLayouts/slideLayout11.xml><?xml version="1.0" encoding="utf-8"?>
-<p:sldLayout xmlns:a="http://schemas.openxmlformats.org/drawingml/2006/main" xmlns:r="http://schemas.openxmlformats.org/officeDocument/2006/relationships" xmlns:mc="http://schemas.openxmlformats.org/markup-compatibility/2006" xmlns:mv="urn:schemas-microsoft-com:mac:vml" xmlns:p="http://schemas.openxmlformats.org/presentationml/2006/main" xmlns:c="http://schemas.openxmlformats.org/drawingml/2006/chart" xmlns:dgm="http://schemas.openxmlformats.org/drawingml/2006/diagram" xmlns:o="urn:schemas-microsoft-com:office:office" xmlns:v="urn:schemas-microsoft-com:vml" xmlns:pvml="urn:schemas-microsoft-com:office:powerpoint" xmlns:com="http://schemas.openxmlformats.org/drawingml/2006/compatibility" xmlns:p14="http://schemas.microsoft.com/office/powerpoint/2010/main" xmlns:p15="http://schemas.microsoft.com/office/powerpoint/2012/main" xmlns:ahyp="http://schemas.microsoft.com/office/drawing/2018/hyperlinkcolor" matchingName="Blank" type="blank">
+<p:sldLayout xmlns:a="http://schemas.openxmlformats.org/drawingml/2006/main" xmlns:r="http://schemas.openxmlformats.org/officeDocument/2006/relationships" xmlns:p="http://schemas.openxmlformats.org/presentationml/2006/main" matchingName="Blank" type="blank">
   <p:cSld name="BLANK">
     <p:spTree>
       <p:nvGrpSpPr>
-        <p:cNvPr id="48" name="Shape 48"/>
+        <p:cNvPr id="1" name="Shape 48"/>
         <p:cNvGrpSpPr/>
         <p:nvPr/>
       </p:nvGrpSpPr>
@@ -2124,9 +2192,11 @@
       <p:sp>
         <p:nvSpPr>
           <p:cNvPr id="49" name="Google Shape;49;p12"/>
-          <p:cNvSpPr txBox="1"/>
+          <p:cNvSpPr txBox="1">
+            <a:spLocks noGrp="1"/>
+          </p:cNvSpPr>
           <p:nvPr>
-            <p:ph idx="12" type="sldNum"/>
+            <p:ph type="sldNum" idx="12"/>
           </p:nvPr>
         </p:nvSpPr>
         <p:spPr>
@@ -2139,7 +2209,7 @@
           </a:prstGeom>
         </p:spPr>
         <p:txBody>
-          <a:bodyPr anchorCtr="0" anchor="ctr" bIns="91425" lIns="91425" spcFirstLastPara="1" rIns="91425" wrap="square" tIns="91425">
+          <a:bodyPr spcFirstLastPara="1" wrap="square" lIns="91425" tIns="91425" rIns="91425" bIns="91425" anchor="ctr" anchorCtr="0">
             <a:noAutofit/>
           </a:bodyPr>
           <a:lstStyle>
@@ -2181,7 +2251,7 @@
             </a:lvl9pPr>
           </a:lstStyle>
           <a:p>
-            <a:pPr indent="0" lvl="0" marL="0" rtl="0" algn="r">
+            <a:pPr marL="0" lvl="0" indent="0" algn="r" rtl="0">
               <a:spcBef>
                 <a:spcPts val="0"/>
               </a:spcBef>
@@ -2207,11 +2277,11 @@
 </file>
 
 <file path=ppt/slideLayouts/slideLayout2.xml><?xml version="1.0" encoding="utf-8"?>
-<p:sldLayout xmlns:a="http://schemas.openxmlformats.org/drawingml/2006/main" xmlns:r="http://schemas.openxmlformats.org/officeDocument/2006/relationships" xmlns:mc="http://schemas.openxmlformats.org/markup-compatibility/2006" xmlns:mv="urn:schemas-microsoft-com:mac:vml" xmlns:p="http://schemas.openxmlformats.org/presentationml/2006/main" xmlns:c="http://schemas.openxmlformats.org/drawingml/2006/chart" xmlns:dgm="http://schemas.openxmlformats.org/drawingml/2006/diagram" xmlns:o="urn:schemas-microsoft-com:office:office" xmlns:v="urn:schemas-microsoft-com:vml" xmlns:pvml="urn:schemas-microsoft-com:office:powerpoint" xmlns:com="http://schemas.openxmlformats.org/drawingml/2006/compatibility" xmlns:p14="http://schemas.microsoft.com/office/powerpoint/2010/main" xmlns:p15="http://schemas.microsoft.com/office/powerpoint/2012/main" xmlns:ahyp="http://schemas.microsoft.com/office/drawing/2018/hyperlinkcolor" matchingName="Section header" type="secHead">
+<p:sldLayout xmlns:a="http://schemas.openxmlformats.org/drawingml/2006/main" xmlns:r="http://schemas.openxmlformats.org/officeDocument/2006/relationships" xmlns:p="http://schemas.openxmlformats.org/presentationml/2006/main" matchingName="Section header" type="secHead">
   <p:cSld name="SECTION_HEADER">
     <p:spTree>
       <p:nvGrpSpPr>
-        <p:cNvPr id="13" name="Shape 13"/>
+        <p:cNvPr id="1" name="Shape 13"/>
         <p:cNvGrpSpPr/>
         <p:nvPr/>
       </p:nvGrpSpPr>
@@ -2226,7 +2296,9 @@
       <p:sp>
         <p:nvSpPr>
           <p:cNvPr id="14" name="Google Shape;14;p3"/>
-          <p:cNvSpPr txBox="1"/>
+          <p:cNvSpPr txBox="1">
+            <a:spLocks noGrp="1"/>
+          </p:cNvSpPr>
           <p:nvPr>
             <p:ph type="title"/>
           </p:nvPr>
@@ -2241,7 +2313,7 @@
           </a:prstGeom>
         </p:spPr>
         <p:txBody>
-          <a:bodyPr anchorCtr="0" anchor="ctr" bIns="91425" lIns="91425" spcFirstLastPara="1" rIns="91425" wrap="square" tIns="91425">
+          <a:bodyPr spcFirstLastPara="1" wrap="square" lIns="91425" tIns="91425" rIns="91425" bIns="91425" anchor="ctr" anchorCtr="0">
             <a:noAutofit/>
           </a:bodyPr>
           <a:lstStyle>
@@ -2345,15 +2417,19 @@
               <a:defRPr sz="3600"/>
             </a:lvl9pPr>
           </a:lstStyle>
-          <a:p/>
+          <a:p>
+            <a:endParaRPr/>
+          </a:p>
         </p:txBody>
       </p:sp>
       <p:sp>
         <p:nvSpPr>
           <p:cNvPr id="15" name="Google Shape;15;p3"/>
-          <p:cNvSpPr txBox="1"/>
+          <p:cNvSpPr txBox="1">
+            <a:spLocks noGrp="1"/>
+          </p:cNvSpPr>
           <p:nvPr>
-            <p:ph idx="12" type="sldNum"/>
+            <p:ph type="sldNum" idx="12"/>
           </p:nvPr>
         </p:nvSpPr>
         <p:spPr>
@@ -2366,7 +2442,7 @@
           </a:prstGeom>
         </p:spPr>
         <p:txBody>
-          <a:bodyPr anchorCtr="0" anchor="ctr" bIns="91425" lIns="91425" spcFirstLastPara="1" rIns="91425" wrap="square" tIns="91425">
+          <a:bodyPr spcFirstLastPara="1" wrap="square" lIns="91425" tIns="91425" rIns="91425" bIns="91425" anchor="ctr" anchorCtr="0">
             <a:noAutofit/>
           </a:bodyPr>
           <a:lstStyle>
@@ -2408,7 +2484,7 @@
             </a:lvl9pPr>
           </a:lstStyle>
           <a:p>
-            <a:pPr indent="0" lvl="0" marL="0" rtl="0" algn="r">
+            <a:pPr marL="0" lvl="0" indent="0" algn="r" rtl="0">
               <a:spcBef>
                 <a:spcPts val="0"/>
               </a:spcBef>
@@ -2434,11 +2510,11 @@
 </file>
 
 <file path=ppt/slideLayouts/slideLayout3.xml><?xml version="1.0" encoding="utf-8"?>
-<p:sldLayout xmlns:a="http://schemas.openxmlformats.org/drawingml/2006/main" xmlns:r="http://schemas.openxmlformats.org/officeDocument/2006/relationships" xmlns:mc="http://schemas.openxmlformats.org/markup-compatibility/2006" xmlns:mv="urn:schemas-microsoft-com:mac:vml" xmlns:p="http://schemas.openxmlformats.org/presentationml/2006/main" xmlns:c="http://schemas.openxmlformats.org/drawingml/2006/chart" xmlns:dgm="http://schemas.openxmlformats.org/drawingml/2006/diagram" xmlns:o="urn:schemas-microsoft-com:office:office" xmlns:v="urn:schemas-microsoft-com:vml" xmlns:pvml="urn:schemas-microsoft-com:office:powerpoint" xmlns:com="http://schemas.openxmlformats.org/drawingml/2006/compatibility" xmlns:p14="http://schemas.microsoft.com/office/powerpoint/2010/main" xmlns:p15="http://schemas.microsoft.com/office/powerpoint/2012/main" xmlns:ahyp="http://schemas.microsoft.com/office/drawing/2018/hyperlinkcolor" matchingName="Title and body" type="tx">
+<p:sldLayout xmlns:a="http://schemas.openxmlformats.org/drawingml/2006/main" xmlns:r="http://schemas.openxmlformats.org/officeDocument/2006/relationships" xmlns:p="http://schemas.openxmlformats.org/presentationml/2006/main" matchingName="Title and body" type="tx">
   <p:cSld name="TITLE_AND_BODY">
     <p:spTree>
       <p:nvGrpSpPr>
-        <p:cNvPr id="16" name="Shape 16"/>
+        <p:cNvPr id="1" name="Shape 16"/>
         <p:cNvGrpSpPr/>
         <p:nvPr/>
       </p:nvGrpSpPr>
@@ -2453,7 +2529,9 @@
       <p:sp>
         <p:nvSpPr>
           <p:cNvPr id="17" name="Google Shape;17;p4"/>
-          <p:cNvSpPr txBox="1"/>
+          <p:cNvSpPr txBox="1">
+            <a:spLocks noGrp="1"/>
+          </p:cNvSpPr>
           <p:nvPr>
             <p:ph type="title"/>
           </p:nvPr>
@@ -2468,7 +2546,7 @@
           </a:prstGeom>
         </p:spPr>
         <p:txBody>
-          <a:bodyPr anchorCtr="0" anchor="t" bIns="91425" lIns="91425" spcFirstLastPara="1" rIns="91425" wrap="square" tIns="91425">
+          <a:bodyPr spcFirstLastPara="1" wrap="square" lIns="91425" tIns="91425" rIns="91425" bIns="91425" anchor="t" anchorCtr="0">
             <a:noAutofit/>
           </a:bodyPr>
           <a:lstStyle>
@@ -2572,15 +2650,19 @@
               <a:defRPr/>
             </a:lvl9pPr>
           </a:lstStyle>
-          <a:p/>
+          <a:p>
+            <a:endParaRPr/>
+          </a:p>
         </p:txBody>
       </p:sp>
       <p:sp>
         <p:nvSpPr>
           <p:cNvPr id="18" name="Google Shape;18;p4"/>
-          <p:cNvSpPr txBox="1"/>
+          <p:cNvSpPr txBox="1">
+            <a:spLocks noGrp="1"/>
+          </p:cNvSpPr>
           <p:nvPr>
-            <p:ph idx="1" type="body"/>
+            <p:ph type="body" idx="1"/>
           </p:nvPr>
         </p:nvSpPr>
         <p:spPr>
@@ -2593,11 +2675,11 @@
           </a:prstGeom>
         </p:spPr>
         <p:txBody>
-          <a:bodyPr anchorCtr="0" anchor="t" bIns="91425" lIns="91425" spcFirstLastPara="1" rIns="91425" wrap="square" tIns="91425">
+          <a:bodyPr spcFirstLastPara="1" wrap="square" lIns="91425" tIns="91425" rIns="91425" bIns="91425" anchor="t" anchorCtr="0">
             <a:noAutofit/>
           </a:bodyPr>
           <a:lstStyle>
-            <a:lvl1pPr indent="-342900" lvl="0" marL="457200">
+            <a:lvl1pPr marL="457200" lvl="0" indent="-342900">
               <a:spcBef>
                 <a:spcPts val="0"/>
               </a:spcBef>
@@ -2608,7 +2690,7 @@
               <a:buChar char="●"/>
               <a:defRPr/>
             </a:lvl1pPr>
-            <a:lvl2pPr indent="-317500" lvl="1" marL="914400">
+            <a:lvl2pPr marL="914400" lvl="1" indent="-317500">
               <a:spcBef>
                 <a:spcPts val="1600"/>
               </a:spcBef>
@@ -2619,7 +2701,7 @@
               <a:buChar char="○"/>
               <a:defRPr/>
             </a:lvl2pPr>
-            <a:lvl3pPr indent="-317500" lvl="2" marL="1371600">
+            <a:lvl3pPr marL="1371600" lvl="2" indent="-317500">
               <a:spcBef>
                 <a:spcPts val="1600"/>
               </a:spcBef>
@@ -2630,7 +2712,7 @@
               <a:buChar char="■"/>
               <a:defRPr/>
             </a:lvl3pPr>
-            <a:lvl4pPr indent="-317500" lvl="3" marL="1828800">
+            <a:lvl4pPr marL="1828800" lvl="3" indent="-317500">
               <a:spcBef>
                 <a:spcPts val="1600"/>
               </a:spcBef>
@@ -2641,7 +2723,7 @@
               <a:buChar char="●"/>
               <a:defRPr/>
             </a:lvl4pPr>
-            <a:lvl5pPr indent="-317500" lvl="4" marL="2286000">
+            <a:lvl5pPr marL="2286000" lvl="4" indent="-317500">
               <a:spcBef>
                 <a:spcPts val="1600"/>
               </a:spcBef>
@@ -2652,7 +2734,7 @@
               <a:buChar char="○"/>
               <a:defRPr/>
             </a:lvl5pPr>
-            <a:lvl6pPr indent="-317500" lvl="5" marL="2743200">
+            <a:lvl6pPr marL="2743200" lvl="5" indent="-317500">
               <a:spcBef>
                 <a:spcPts val="1600"/>
               </a:spcBef>
@@ -2663,7 +2745,7 @@
               <a:buChar char="■"/>
               <a:defRPr/>
             </a:lvl6pPr>
-            <a:lvl7pPr indent="-317500" lvl="6" marL="3200400">
+            <a:lvl7pPr marL="3200400" lvl="6" indent="-317500">
               <a:spcBef>
                 <a:spcPts val="1600"/>
               </a:spcBef>
@@ -2674,7 +2756,7 @@
               <a:buChar char="●"/>
               <a:defRPr/>
             </a:lvl7pPr>
-            <a:lvl8pPr indent="-317500" lvl="7" marL="3657600">
+            <a:lvl8pPr marL="3657600" lvl="7" indent="-317500">
               <a:spcBef>
                 <a:spcPts val="1600"/>
               </a:spcBef>
@@ -2685,7 +2767,7 @@
               <a:buChar char="○"/>
               <a:defRPr/>
             </a:lvl8pPr>
-            <a:lvl9pPr indent="-317500" lvl="8" marL="4114800">
+            <a:lvl9pPr marL="4114800" lvl="8" indent="-317500">
               <a:spcBef>
                 <a:spcPts val="1600"/>
               </a:spcBef>
@@ -2697,15 +2779,19 @@
               <a:defRPr/>
             </a:lvl9pPr>
           </a:lstStyle>
-          <a:p/>
+          <a:p>
+            <a:endParaRPr/>
+          </a:p>
         </p:txBody>
       </p:sp>
       <p:sp>
         <p:nvSpPr>
           <p:cNvPr id="19" name="Google Shape;19;p4"/>
-          <p:cNvSpPr txBox="1"/>
+          <p:cNvSpPr txBox="1">
+            <a:spLocks noGrp="1"/>
+          </p:cNvSpPr>
           <p:nvPr>
-            <p:ph idx="12" type="sldNum"/>
+            <p:ph type="sldNum" idx="12"/>
           </p:nvPr>
         </p:nvSpPr>
         <p:spPr>
@@ -2718,7 +2804,7 @@
           </a:prstGeom>
         </p:spPr>
         <p:txBody>
-          <a:bodyPr anchorCtr="0" anchor="ctr" bIns="91425" lIns="91425" spcFirstLastPara="1" rIns="91425" wrap="square" tIns="91425">
+          <a:bodyPr spcFirstLastPara="1" wrap="square" lIns="91425" tIns="91425" rIns="91425" bIns="91425" anchor="ctr" anchorCtr="0">
             <a:noAutofit/>
           </a:bodyPr>
           <a:lstStyle>
@@ -2760,7 +2846,7 @@
             </a:lvl9pPr>
           </a:lstStyle>
           <a:p>
-            <a:pPr indent="0" lvl="0" marL="0" rtl="0" algn="r">
+            <a:pPr marL="0" lvl="0" indent="0" algn="r" rtl="0">
               <a:spcBef>
                 <a:spcPts val="0"/>
               </a:spcBef>
@@ -2786,11 +2872,11 @@
 </file>
 
 <file path=ppt/slideLayouts/slideLayout4.xml><?xml version="1.0" encoding="utf-8"?>
-<p:sldLayout xmlns:a="http://schemas.openxmlformats.org/drawingml/2006/main" xmlns:r="http://schemas.openxmlformats.org/officeDocument/2006/relationships" xmlns:mc="http://schemas.openxmlformats.org/markup-compatibility/2006" xmlns:mv="urn:schemas-microsoft-com:mac:vml" xmlns:p="http://schemas.openxmlformats.org/presentationml/2006/main" xmlns:c="http://schemas.openxmlformats.org/drawingml/2006/chart" xmlns:dgm="http://schemas.openxmlformats.org/drawingml/2006/diagram" xmlns:o="urn:schemas-microsoft-com:office:office" xmlns:v="urn:schemas-microsoft-com:vml" xmlns:pvml="urn:schemas-microsoft-com:office:powerpoint" xmlns:com="http://schemas.openxmlformats.org/drawingml/2006/compatibility" xmlns:p14="http://schemas.microsoft.com/office/powerpoint/2010/main" xmlns:p15="http://schemas.microsoft.com/office/powerpoint/2012/main" xmlns:ahyp="http://schemas.microsoft.com/office/drawing/2018/hyperlinkcolor" matchingName="Title and two columns" type="twoColTx">
+<p:sldLayout xmlns:a="http://schemas.openxmlformats.org/drawingml/2006/main" xmlns:r="http://schemas.openxmlformats.org/officeDocument/2006/relationships" xmlns:p="http://schemas.openxmlformats.org/presentationml/2006/main" matchingName="Title and two columns" type="twoColTx">
   <p:cSld name="TITLE_AND_TWO_COLUMNS">
     <p:spTree>
       <p:nvGrpSpPr>
-        <p:cNvPr id="20" name="Shape 20"/>
+        <p:cNvPr id="1" name="Shape 20"/>
         <p:cNvGrpSpPr/>
         <p:nvPr/>
       </p:nvGrpSpPr>
@@ -2805,7 +2891,9 @@
       <p:sp>
         <p:nvSpPr>
           <p:cNvPr id="21" name="Google Shape;21;p5"/>
-          <p:cNvSpPr txBox="1"/>
+          <p:cNvSpPr txBox="1">
+            <a:spLocks noGrp="1"/>
+          </p:cNvSpPr>
           <p:nvPr>
             <p:ph type="title"/>
           </p:nvPr>
@@ -2820,7 +2908,7 @@
           </a:prstGeom>
         </p:spPr>
         <p:txBody>
-          <a:bodyPr anchorCtr="0" anchor="t" bIns="91425" lIns="91425" spcFirstLastPara="1" rIns="91425" wrap="square" tIns="91425">
+          <a:bodyPr spcFirstLastPara="1" wrap="square" lIns="91425" tIns="91425" rIns="91425" bIns="91425" anchor="t" anchorCtr="0">
             <a:noAutofit/>
           </a:bodyPr>
           <a:lstStyle>
@@ -2924,15 +3012,19 @@
               <a:defRPr/>
             </a:lvl9pPr>
           </a:lstStyle>
-          <a:p/>
+          <a:p>
+            <a:endParaRPr/>
+          </a:p>
         </p:txBody>
       </p:sp>
       <p:sp>
         <p:nvSpPr>
           <p:cNvPr id="22" name="Google Shape;22;p5"/>
-          <p:cNvSpPr txBox="1"/>
+          <p:cNvSpPr txBox="1">
+            <a:spLocks noGrp="1"/>
+          </p:cNvSpPr>
           <p:nvPr>
-            <p:ph idx="1" type="body"/>
+            <p:ph type="body" idx="1"/>
           </p:nvPr>
         </p:nvSpPr>
         <p:spPr>
@@ -2945,11 +3037,11 @@
           </a:prstGeom>
         </p:spPr>
         <p:txBody>
-          <a:bodyPr anchorCtr="0" anchor="t" bIns="91425" lIns="91425" spcFirstLastPara="1" rIns="91425" wrap="square" tIns="91425">
+          <a:bodyPr spcFirstLastPara="1" wrap="square" lIns="91425" tIns="91425" rIns="91425" bIns="91425" anchor="t" anchorCtr="0">
             <a:noAutofit/>
           </a:bodyPr>
           <a:lstStyle>
-            <a:lvl1pPr indent="-317500" lvl="0" marL="457200">
+            <a:lvl1pPr marL="457200" lvl="0" indent="-317500">
               <a:spcBef>
                 <a:spcPts val="0"/>
               </a:spcBef>
@@ -2960,7 +3052,7 @@
               <a:buChar char="●"/>
               <a:defRPr sz="1400"/>
             </a:lvl1pPr>
-            <a:lvl2pPr indent="-304800" lvl="1" marL="914400">
+            <a:lvl2pPr marL="914400" lvl="1" indent="-304800">
               <a:spcBef>
                 <a:spcPts val="1600"/>
               </a:spcBef>
@@ -2971,7 +3063,7 @@
               <a:buChar char="○"/>
               <a:defRPr sz="1200"/>
             </a:lvl2pPr>
-            <a:lvl3pPr indent="-304800" lvl="2" marL="1371600">
+            <a:lvl3pPr marL="1371600" lvl="2" indent="-304800">
               <a:spcBef>
                 <a:spcPts val="1600"/>
               </a:spcBef>
@@ -2982,7 +3074,7 @@
               <a:buChar char="■"/>
               <a:defRPr sz="1200"/>
             </a:lvl3pPr>
-            <a:lvl4pPr indent="-304800" lvl="3" marL="1828800">
+            <a:lvl4pPr marL="1828800" lvl="3" indent="-304800">
               <a:spcBef>
                 <a:spcPts val="1600"/>
               </a:spcBef>
@@ -2993,7 +3085,7 @@
               <a:buChar char="●"/>
               <a:defRPr sz="1200"/>
             </a:lvl4pPr>
-            <a:lvl5pPr indent="-304800" lvl="4" marL="2286000">
+            <a:lvl5pPr marL="2286000" lvl="4" indent="-304800">
               <a:spcBef>
                 <a:spcPts val="1600"/>
               </a:spcBef>
@@ -3004,7 +3096,7 @@
               <a:buChar char="○"/>
               <a:defRPr sz="1200"/>
             </a:lvl5pPr>
-            <a:lvl6pPr indent="-304800" lvl="5" marL="2743200">
+            <a:lvl6pPr marL="2743200" lvl="5" indent="-304800">
               <a:spcBef>
                 <a:spcPts val="1600"/>
               </a:spcBef>
@@ -3015,7 +3107,7 @@
               <a:buChar char="■"/>
               <a:defRPr sz="1200"/>
             </a:lvl6pPr>
-            <a:lvl7pPr indent="-304800" lvl="6" marL="3200400">
+            <a:lvl7pPr marL="3200400" lvl="6" indent="-304800">
               <a:spcBef>
                 <a:spcPts val="1600"/>
               </a:spcBef>
@@ -3026,7 +3118,7 @@
               <a:buChar char="●"/>
               <a:defRPr sz="1200"/>
             </a:lvl7pPr>
-            <a:lvl8pPr indent="-304800" lvl="7" marL="3657600">
+            <a:lvl8pPr marL="3657600" lvl="7" indent="-304800">
               <a:spcBef>
                 <a:spcPts val="1600"/>
               </a:spcBef>
@@ -3037,7 +3129,7 @@
               <a:buChar char="○"/>
               <a:defRPr sz="1200"/>
             </a:lvl8pPr>
-            <a:lvl9pPr indent="-304800" lvl="8" marL="4114800">
+            <a:lvl9pPr marL="4114800" lvl="8" indent="-304800">
               <a:spcBef>
                 <a:spcPts val="1600"/>
               </a:spcBef>
@@ -3049,15 +3141,19 @@
               <a:defRPr sz="1200"/>
             </a:lvl9pPr>
           </a:lstStyle>
-          <a:p/>
+          <a:p>
+            <a:endParaRPr/>
+          </a:p>
         </p:txBody>
       </p:sp>
       <p:sp>
         <p:nvSpPr>
           <p:cNvPr id="23" name="Google Shape;23;p5"/>
-          <p:cNvSpPr txBox="1"/>
+          <p:cNvSpPr txBox="1">
+            <a:spLocks noGrp="1"/>
+          </p:cNvSpPr>
           <p:nvPr>
-            <p:ph idx="2" type="body"/>
+            <p:ph type="body" idx="2"/>
           </p:nvPr>
         </p:nvSpPr>
         <p:spPr>
@@ -3070,11 +3166,11 @@
           </a:prstGeom>
         </p:spPr>
         <p:txBody>
-          <a:bodyPr anchorCtr="0" anchor="t" bIns="91425" lIns="91425" spcFirstLastPara="1" rIns="91425" wrap="square" tIns="91425">
+          <a:bodyPr spcFirstLastPara="1" wrap="square" lIns="91425" tIns="91425" rIns="91425" bIns="91425" anchor="t" anchorCtr="0">
             <a:noAutofit/>
           </a:bodyPr>
           <a:lstStyle>
-            <a:lvl1pPr indent="-317500" lvl="0" marL="457200">
+            <a:lvl1pPr marL="457200" lvl="0" indent="-317500">
               <a:spcBef>
                 <a:spcPts val="0"/>
               </a:spcBef>
@@ -3085,7 +3181,7 @@
               <a:buChar char="●"/>
               <a:defRPr sz="1400"/>
             </a:lvl1pPr>
-            <a:lvl2pPr indent="-304800" lvl="1" marL="914400">
+            <a:lvl2pPr marL="914400" lvl="1" indent="-304800">
               <a:spcBef>
                 <a:spcPts val="1600"/>
               </a:spcBef>
@@ -3096,7 +3192,7 @@
               <a:buChar char="○"/>
               <a:defRPr sz="1200"/>
             </a:lvl2pPr>
-            <a:lvl3pPr indent="-304800" lvl="2" marL="1371600">
+            <a:lvl3pPr marL="1371600" lvl="2" indent="-304800">
               <a:spcBef>
                 <a:spcPts val="1600"/>
               </a:spcBef>
@@ -3107,7 +3203,7 @@
               <a:buChar char="■"/>
               <a:defRPr sz="1200"/>
             </a:lvl3pPr>
-            <a:lvl4pPr indent="-304800" lvl="3" marL="1828800">
+            <a:lvl4pPr marL="1828800" lvl="3" indent="-304800">
               <a:spcBef>
                 <a:spcPts val="1600"/>
               </a:spcBef>
@@ -3118,7 +3214,7 @@
               <a:buChar char="●"/>
               <a:defRPr sz="1200"/>
             </a:lvl4pPr>
-            <a:lvl5pPr indent="-304800" lvl="4" marL="2286000">
+            <a:lvl5pPr marL="2286000" lvl="4" indent="-304800">
               <a:spcBef>
                 <a:spcPts val="1600"/>
               </a:spcBef>
@@ -3129,7 +3225,7 @@
               <a:buChar char="○"/>
               <a:defRPr sz="1200"/>
             </a:lvl5pPr>
-            <a:lvl6pPr indent="-304800" lvl="5" marL="2743200">
+            <a:lvl6pPr marL="2743200" lvl="5" indent="-304800">
               <a:spcBef>
                 <a:spcPts val="1600"/>
               </a:spcBef>
@@ -3140,7 +3236,7 @@
               <a:buChar char="■"/>
               <a:defRPr sz="1200"/>
             </a:lvl6pPr>
-            <a:lvl7pPr indent="-304800" lvl="6" marL="3200400">
+            <a:lvl7pPr marL="3200400" lvl="6" indent="-304800">
               <a:spcBef>
                 <a:spcPts val="1600"/>
               </a:spcBef>
@@ -3151,7 +3247,7 @@
               <a:buChar char="●"/>
               <a:defRPr sz="1200"/>
             </a:lvl7pPr>
-            <a:lvl8pPr indent="-304800" lvl="7" marL="3657600">
+            <a:lvl8pPr marL="3657600" lvl="7" indent="-304800">
               <a:spcBef>
                 <a:spcPts val="1600"/>
               </a:spcBef>
@@ -3162,7 +3258,7 @@
               <a:buChar char="○"/>
               <a:defRPr sz="1200"/>
             </a:lvl8pPr>
-            <a:lvl9pPr indent="-304800" lvl="8" marL="4114800">
+            <a:lvl9pPr marL="4114800" lvl="8" indent="-304800">
               <a:spcBef>
                 <a:spcPts val="1600"/>
               </a:spcBef>
@@ -3174,15 +3270,19 @@
               <a:defRPr sz="1200"/>
             </a:lvl9pPr>
           </a:lstStyle>
-          <a:p/>
+          <a:p>
+            <a:endParaRPr/>
+          </a:p>
         </p:txBody>
       </p:sp>
       <p:sp>
         <p:nvSpPr>
           <p:cNvPr id="24" name="Google Shape;24;p5"/>
-          <p:cNvSpPr txBox="1"/>
+          <p:cNvSpPr txBox="1">
+            <a:spLocks noGrp="1"/>
+          </p:cNvSpPr>
           <p:nvPr>
-            <p:ph idx="12" type="sldNum"/>
+            <p:ph type="sldNum" idx="12"/>
           </p:nvPr>
         </p:nvSpPr>
         <p:spPr>
@@ -3195,7 +3295,7 @@
           </a:prstGeom>
         </p:spPr>
         <p:txBody>
-          <a:bodyPr anchorCtr="0" anchor="ctr" bIns="91425" lIns="91425" spcFirstLastPara="1" rIns="91425" wrap="square" tIns="91425">
+          <a:bodyPr spcFirstLastPara="1" wrap="square" lIns="91425" tIns="91425" rIns="91425" bIns="91425" anchor="ctr" anchorCtr="0">
             <a:noAutofit/>
           </a:bodyPr>
           <a:lstStyle>
@@ -3237,7 +3337,7 @@
             </a:lvl9pPr>
           </a:lstStyle>
           <a:p>
-            <a:pPr indent="0" lvl="0" marL="0" rtl="0" algn="r">
+            <a:pPr marL="0" lvl="0" indent="0" algn="r" rtl="0">
               <a:spcBef>
                 <a:spcPts val="0"/>
               </a:spcBef>
@@ -3263,11 +3363,11 @@
 </file>
 
 <file path=ppt/slideLayouts/slideLayout5.xml><?xml version="1.0" encoding="utf-8"?>
-<p:sldLayout xmlns:a="http://schemas.openxmlformats.org/drawingml/2006/main" xmlns:r="http://schemas.openxmlformats.org/officeDocument/2006/relationships" xmlns:mc="http://schemas.openxmlformats.org/markup-compatibility/2006" xmlns:mv="urn:schemas-microsoft-com:mac:vml" xmlns:p="http://schemas.openxmlformats.org/presentationml/2006/main" xmlns:c="http://schemas.openxmlformats.org/drawingml/2006/chart" xmlns:dgm="http://schemas.openxmlformats.org/drawingml/2006/diagram" xmlns:o="urn:schemas-microsoft-com:office:office" xmlns:v="urn:schemas-microsoft-com:vml" xmlns:pvml="urn:schemas-microsoft-com:office:powerpoint" xmlns:com="http://schemas.openxmlformats.org/drawingml/2006/compatibility" xmlns:p14="http://schemas.microsoft.com/office/powerpoint/2010/main" xmlns:p15="http://schemas.microsoft.com/office/powerpoint/2012/main" xmlns:ahyp="http://schemas.microsoft.com/office/drawing/2018/hyperlinkcolor" matchingName="Title only" type="titleOnly">
+<p:sldLayout xmlns:a="http://schemas.openxmlformats.org/drawingml/2006/main" xmlns:r="http://schemas.openxmlformats.org/officeDocument/2006/relationships" xmlns:p="http://schemas.openxmlformats.org/presentationml/2006/main" matchingName="Title only" type="titleOnly">
   <p:cSld name="TITLE_ONLY">
     <p:spTree>
       <p:nvGrpSpPr>
-        <p:cNvPr id="25" name="Shape 25"/>
+        <p:cNvPr id="1" name="Shape 25"/>
         <p:cNvGrpSpPr/>
         <p:nvPr/>
       </p:nvGrpSpPr>
@@ -3282,7 +3382,9 @@
       <p:sp>
         <p:nvSpPr>
           <p:cNvPr id="26" name="Google Shape;26;p6"/>
-          <p:cNvSpPr txBox="1"/>
+          <p:cNvSpPr txBox="1">
+            <a:spLocks noGrp="1"/>
+          </p:cNvSpPr>
           <p:nvPr>
             <p:ph type="title"/>
           </p:nvPr>
@@ -3297,7 +3399,7 @@
           </a:prstGeom>
         </p:spPr>
         <p:txBody>
-          <a:bodyPr anchorCtr="0" anchor="t" bIns="91425" lIns="91425" spcFirstLastPara="1" rIns="91425" wrap="square" tIns="91425">
+          <a:bodyPr spcFirstLastPara="1" wrap="square" lIns="91425" tIns="91425" rIns="91425" bIns="91425" anchor="t" anchorCtr="0">
             <a:noAutofit/>
           </a:bodyPr>
           <a:lstStyle>
@@ -3401,15 +3503,19 @@
               <a:defRPr/>
             </a:lvl9pPr>
           </a:lstStyle>
-          <a:p/>
+          <a:p>
+            <a:endParaRPr/>
+          </a:p>
         </p:txBody>
       </p:sp>
       <p:sp>
         <p:nvSpPr>
           <p:cNvPr id="27" name="Google Shape;27;p6"/>
-          <p:cNvSpPr txBox="1"/>
+          <p:cNvSpPr txBox="1">
+            <a:spLocks noGrp="1"/>
+          </p:cNvSpPr>
           <p:nvPr>
-            <p:ph idx="12" type="sldNum"/>
+            <p:ph type="sldNum" idx="12"/>
           </p:nvPr>
         </p:nvSpPr>
         <p:spPr>
@@ -3422,7 +3528,7 @@
           </a:prstGeom>
         </p:spPr>
         <p:txBody>
-          <a:bodyPr anchorCtr="0" anchor="ctr" bIns="91425" lIns="91425" spcFirstLastPara="1" rIns="91425" wrap="square" tIns="91425">
+          <a:bodyPr spcFirstLastPara="1" wrap="square" lIns="91425" tIns="91425" rIns="91425" bIns="91425" anchor="ctr" anchorCtr="0">
             <a:noAutofit/>
           </a:bodyPr>
           <a:lstStyle>
@@ -3464,7 +3570,7 @@
             </a:lvl9pPr>
           </a:lstStyle>
           <a:p>
-            <a:pPr indent="0" lvl="0" marL="0" rtl="0" algn="r">
+            <a:pPr marL="0" lvl="0" indent="0" algn="r" rtl="0">
               <a:spcBef>
                 <a:spcPts val="0"/>
               </a:spcBef>
@@ -3490,11 +3596,11 @@
 </file>
 
 <file path=ppt/slideLayouts/slideLayout6.xml><?xml version="1.0" encoding="utf-8"?>
-<p:sldLayout xmlns:a="http://schemas.openxmlformats.org/drawingml/2006/main" xmlns:r="http://schemas.openxmlformats.org/officeDocument/2006/relationships" xmlns:mc="http://schemas.openxmlformats.org/markup-compatibility/2006" xmlns:mv="urn:schemas-microsoft-com:mac:vml" xmlns:p="http://schemas.openxmlformats.org/presentationml/2006/main" xmlns:c="http://schemas.openxmlformats.org/drawingml/2006/chart" xmlns:dgm="http://schemas.openxmlformats.org/drawingml/2006/diagram" xmlns:o="urn:schemas-microsoft-com:office:office" xmlns:v="urn:schemas-microsoft-com:vml" xmlns:pvml="urn:schemas-microsoft-com:office:powerpoint" xmlns:com="http://schemas.openxmlformats.org/drawingml/2006/compatibility" xmlns:p14="http://schemas.microsoft.com/office/powerpoint/2010/main" xmlns:p15="http://schemas.microsoft.com/office/powerpoint/2012/main" xmlns:ahyp="http://schemas.microsoft.com/office/drawing/2018/hyperlinkcolor" matchingName="One column text">
+<p:sldLayout xmlns:a="http://schemas.openxmlformats.org/drawingml/2006/main" xmlns:r="http://schemas.openxmlformats.org/officeDocument/2006/relationships" xmlns:p="http://schemas.openxmlformats.org/presentationml/2006/main" matchingName="One column text">
   <p:cSld name="ONE_COLUMN_TEXT">
     <p:spTree>
       <p:nvGrpSpPr>
-        <p:cNvPr id="28" name="Shape 28"/>
+        <p:cNvPr id="1" name="Shape 28"/>
         <p:cNvGrpSpPr/>
         <p:nvPr/>
       </p:nvGrpSpPr>
@@ -3509,7 +3615,9 @@
       <p:sp>
         <p:nvSpPr>
           <p:cNvPr id="29" name="Google Shape;29;p7"/>
-          <p:cNvSpPr txBox="1"/>
+          <p:cNvSpPr txBox="1">
+            <a:spLocks noGrp="1"/>
+          </p:cNvSpPr>
           <p:nvPr>
             <p:ph type="title"/>
           </p:nvPr>
@@ -3524,7 +3632,7 @@
           </a:prstGeom>
         </p:spPr>
         <p:txBody>
-          <a:bodyPr anchorCtr="0" anchor="b" bIns="91425" lIns="91425" spcFirstLastPara="1" rIns="91425" wrap="square" tIns="91425">
+          <a:bodyPr spcFirstLastPara="1" wrap="square" lIns="91425" tIns="91425" rIns="91425" bIns="91425" anchor="b" anchorCtr="0">
             <a:noAutofit/>
           </a:bodyPr>
           <a:lstStyle>
@@ -3628,15 +3736,19 @@
               <a:defRPr sz="2400"/>
             </a:lvl9pPr>
           </a:lstStyle>
-          <a:p/>
+          <a:p>
+            <a:endParaRPr/>
+          </a:p>
         </p:txBody>
       </p:sp>
       <p:sp>
         <p:nvSpPr>
           <p:cNvPr id="30" name="Google Shape;30;p7"/>
-          <p:cNvSpPr txBox="1"/>
+          <p:cNvSpPr txBox="1">
+            <a:spLocks noGrp="1"/>
+          </p:cNvSpPr>
           <p:nvPr>
-            <p:ph idx="1" type="body"/>
+            <p:ph type="body" idx="1"/>
           </p:nvPr>
         </p:nvSpPr>
         <p:spPr>
@@ -3649,11 +3761,11 @@
           </a:prstGeom>
         </p:spPr>
         <p:txBody>
-          <a:bodyPr anchorCtr="0" anchor="t" bIns="91425" lIns="91425" spcFirstLastPara="1" rIns="91425" wrap="square" tIns="91425">
+          <a:bodyPr spcFirstLastPara="1" wrap="square" lIns="91425" tIns="91425" rIns="91425" bIns="91425" anchor="t" anchorCtr="0">
             <a:noAutofit/>
           </a:bodyPr>
           <a:lstStyle>
-            <a:lvl1pPr indent="-304800" lvl="0" marL="457200">
+            <a:lvl1pPr marL="457200" lvl="0" indent="-304800">
               <a:spcBef>
                 <a:spcPts val="0"/>
               </a:spcBef>
@@ -3664,7 +3776,7 @@
               <a:buChar char="●"/>
               <a:defRPr sz="1200"/>
             </a:lvl1pPr>
-            <a:lvl2pPr indent="-304800" lvl="1" marL="914400">
+            <a:lvl2pPr marL="914400" lvl="1" indent="-304800">
               <a:spcBef>
                 <a:spcPts val="1600"/>
               </a:spcBef>
@@ -3675,7 +3787,7 @@
               <a:buChar char="○"/>
               <a:defRPr sz="1200"/>
             </a:lvl2pPr>
-            <a:lvl3pPr indent="-304800" lvl="2" marL="1371600">
+            <a:lvl3pPr marL="1371600" lvl="2" indent="-304800">
               <a:spcBef>
                 <a:spcPts val="1600"/>
               </a:spcBef>
@@ -3686,7 +3798,7 @@
               <a:buChar char="■"/>
               <a:defRPr sz="1200"/>
             </a:lvl3pPr>
-            <a:lvl4pPr indent="-304800" lvl="3" marL="1828800">
+            <a:lvl4pPr marL="1828800" lvl="3" indent="-304800">
               <a:spcBef>
                 <a:spcPts val="1600"/>
               </a:spcBef>
@@ -3697,7 +3809,7 @@
               <a:buChar char="●"/>
               <a:defRPr sz="1200"/>
             </a:lvl4pPr>
-            <a:lvl5pPr indent="-304800" lvl="4" marL="2286000">
+            <a:lvl5pPr marL="2286000" lvl="4" indent="-304800">
               <a:spcBef>
                 <a:spcPts val="1600"/>
               </a:spcBef>
@@ -3708,7 +3820,7 @@
               <a:buChar char="○"/>
               <a:defRPr sz="1200"/>
             </a:lvl5pPr>
-            <a:lvl6pPr indent="-304800" lvl="5" marL="2743200">
+            <a:lvl6pPr marL="2743200" lvl="5" indent="-304800">
               <a:spcBef>
                 <a:spcPts val="1600"/>
               </a:spcBef>
@@ -3719,7 +3831,7 @@
               <a:buChar char="■"/>
               <a:defRPr sz="1200"/>
             </a:lvl6pPr>
-            <a:lvl7pPr indent="-304800" lvl="6" marL="3200400">
+            <a:lvl7pPr marL="3200400" lvl="6" indent="-304800">
               <a:spcBef>
                 <a:spcPts val="1600"/>
               </a:spcBef>
@@ -3730,7 +3842,7 @@
               <a:buChar char="●"/>
               <a:defRPr sz="1200"/>
             </a:lvl7pPr>
-            <a:lvl8pPr indent="-304800" lvl="7" marL="3657600">
+            <a:lvl8pPr marL="3657600" lvl="7" indent="-304800">
               <a:spcBef>
                 <a:spcPts val="1600"/>
               </a:spcBef>
@@ -3741,7 +3853,7 @@
               <a:buChar char="○"/>
               <a:defRPr sz="1200"/>
             </a:lvl8pPr>
-            <a:lvl9pPr indent="-304800" lvl="8" marL="4114800">
+            <a:lvl9pPr marL="4114800" lvl="8" indent="-304800">
               <a:spcBef>
                 <a:spcPts val="1600"/>
               </a:spcBef>
@@ -3753,15 +3865,19 @@
               <a:defRPr sz="1200"/>
             </a:lvl9pPr>
           </a:lstStyle>
-          <a:p/>
+          <a:p>
+            <a:endParaRPr/>
+          </a:p>
         </p:txBody>
       </p:sp>
       <p:sp>
         <p:nvSpPr>
           <p:cNvPr id="31" name="Google Shape;31;p7"/>
-          <p:cNvSpPr txBox="1"/>
+          <p:cNvSpPr txBox="1">
+            <a:spLocks noGrp="1"/>
+          </p:cNvSpPr>
           <p:nvPr>
-            <p:ph idx="12" type="sldNum"/>
+            <p:ph type="sldNum" idx="12"/>
           </p:nvPr>
         </p:nvSpPr>
         <p:spPr>
@@ -3774,7 +3890,7 @@
           </a:prstGeom>
         </p:spPr>
         <p:txBody>
-          <a:bodyPr anchorCtr="0" anchor="ctr" bIns="91425" lIns="91425" spcFirstLastPara="1" rIns="91425" wrap="square" tIns="91425">
+          <a:bodyPr spcFirstLastPara="1" wrap="square" lIns="91425" tIns="91425" rIns="91425" bIns="91425" anchor="ctr" anchorCtr="0">
             <a:noAutofit/>
           </a:bodyPr>
           <a:lstStyle>
@@ -3816,7 +3932,7 @@
             </a:lvl9pPr>
           </a:lstStyle>
           <a:p>
-            <a:pPr indent="0" lvl="0" marL="0" rtl="0" algn="r">
+            <a:pPr marL="0" lvl="0" indent="0" algn="r" rtl="0">
               <a:spcBef>
                 <a:spcPts val="0"/>
               </a:spcBef>
@@ -3842,11 +3958,11 @@
 </file>
 
 <file path=ppt/slideLayouts/slideLayout7.xml><?xml version="1.0" encoding="utf-8"?>
-<p:sldLayout xmlns:a="http://schemas.openxmlformats.org/drawingml/2006/main" xmlns:r="http://schemas.openxmlformats.org/officeDocument/2006/relationships" xmlns:mc="http://schemas.openxmlformats.org/markup-compatibility/2006" xmlns:mv="urn:schemas-microsoft-com:mac:vml" xmlns:p="http://schemas.openxmlformats.org/presentationml/2006/main" xmlns:c="http://schemas.openxmlformats.org/drawingml/2006/chart" xmlns:dgm="http://schemas.openxmlformats.org/drawingml/2006/diagram" xmlns:o="urn:schemas-microsoft-com:office:office" xmlns:v="urn:schemas-microsoft-com:vml" xmlns:pvml="urn:schemas-microsoft-com:office:powerpoint" xmlns:com="http://schemas.openxmlformats.org/drawingml/2006/compatibility" xmlns:p14="http://schemas.microsoft.com/office/powerpoint/2010/main" xmlns:p15="http://schemas.microsoft.com/office/powerpoint/2012/main" xmlns:ahyp="http://schemas.microsoft.com/office/drawing/2018/hyperlinkcolor" matchingName="Main point">
+<p:sldLayout xmlns:a="http://schemas.openxmlformats.org/drawingml/2006/main" xmlns:r="http://schemas.openxmlformats.org/officeDocument/2006/relationships" xmlns:p="http://schemas.openxmlformats.org/presentationml/2006/main" matchingName="Main point">
   <p:cSld name="MAIN_POINT">
     <p:spTree>
       <p:nvGrpSpPr>
-        <p:cNvPr id="32" name="Shape 32"/>
+        <p:cNvPr id="1" name="Shape 32"/>
         <p:cNvGrpSpPr/>
         <p:nvPr/>
       </p:nvGrpSpPr>
@@ -3861,7 +3977,9 @@
       <p:sp>
         <p:nvSpPr>
           <p:cNvPr id="33" name="Google Shape;33;p8"/>
-          <p:cNvSpPr txBox="1"/>
+          <p:cNvSpPr txBox="1">
+            <a:spLocks noGrp="1"/>
+          </p:cNvSpPr>
           <p:nvPr>
             <p:ph type="title"/>
           </p:nvPr>
@@ -3876,7 +3994,7 @@
           </a:prstGeom>
         </p:spPr>
         <p:txBody>
-          <a:bodyPr anchorCtr="0" anchor="ctr" bIns="91425" lIns="91425" spcFirstLastPara="1" rIns="91425" wrap="square" tIns="91425">
+          <a:bodyPr spcFirstLastPara="1" wrap="square" lIns="91425" tIns="91425" rIns="91425" bIns="91425" anchor="ctr" anchorCtr="0">
             <a:noAutofit/>
           </a:bodyPr>
           <a:lstStyle>
@@ -3980,15 +4098,19 @@
               <a:defRPr sz="4800"/>
             </a:lvl9pPr>
           </a:lstStyle>
-          <a:p/>
+          <a:p>
+            <a:endParaRPr/>
+          </a:p>
         </p:txBody>
       </p:sp>
       <p:sp>
         <p:nvSpPr>
           <p:cNvPr id="34" name="Google Shape;34;p8"/>
-          <p:cNvSpPr txBox="1"/>
+          <p:cNvSpPr txBox="1">
+            <a:spLocks noGrp="1"/>
+          </p:cNvSpPr>
           <p:nvPr>
-            <p:ph idx="12" type="sldNum"/>
+            <p:ph type="sldNum" idx="12"/>
           </p:nvPr>
         </p:nvSpPr>
         <p:spPr>
@@ -4001,7 +4123,7 @@
           </a:prstGeom>
         </p:spPr>
         <p:txBody>
-          <a:bodyPr anchorCtr="0" anchor="ctr" bIns="91425" lIns="91425" spcFirstLastPara="1" rIns="91425" wrap="square" tIns="91425">
+          <a:bodyPr spcFirstLastPara="1" wrap="square" lIns="91425" tIns="91425" rIns="91425" bIns="91425" anchor="ctr" anchorCtr="0">
             <a:noAutofit/>
           </a:bodyPr>
           <a:lstStyle>
@@ -4043,7 +4165,7 @@
             </a:lvl9pPr>
           </a:lstStyle>
           <a:p>
-            <a:pPr indent="0" lvl="0" marL="0" rtl="0" algn="r">
+            <a:pPr marL="0" lvl="0" indent="0" algn="r" rtl="0">
               <a:spcBef>
                 <a:spcPts val="0"/>
               </a:spcBef>
@@ -4069,11 +4191,11 @@
 </file>
 
 <file path=ppt/slideLayouts/slideLayout8.xml><?xml version="1.0" encoding="utf-8"?>
-<p:sldLayout xmlns:a="http://schemas.openxmlformats.org/drawingml/2006/main" xmlns:r="http://schemas.openxmlformats.org/officeDocument/2006/relationships" xmlns:mc="http://schemas.openxmlformats.org/markup-compatibility/2006" xmlns:mv="urn:schemas-microsoft-com:mac:vml" xmlns:p="http://schemas.openxmlformats.org/presentationml/2006/main" xmlns:c="http://schemas.openxmlformats.org/drawingml/2006/chart" xmlns:dgm="http://schemas.openxmlformats.org/drawingml/2006/diagram" xmlns:o="urn:schemas-microsoft-com:office:office" xmlns:v="urn:schemas-microsoft-com:vml" xmlns:pvml="urn:schemas-microsoft-com:office:powerpoint" xmlns:com="http://schemas.openxmlformats.org/drawingml/2006/compatibility" xmlns:p14="http://schemas.microsoft.com/office/powerpoint/2010/main" xmlns:p15="http://schemas.microsoft.com/office/powerpoint/2012/main" xmlns:ahyp="http://schemas.microsoft.com/office/drawing/2018/hyperlinkcolor" matchingName="Section title and description">
+<p:sldLayout xmlns:a="http://schemas.openxmlformats.org/drawingml/2006/main" xmlns:r="http://schemas.openxmlformats.org/officeDocument/2006/relationships" xmlns:p="http://schemas.openxmlformats.org/presentationml/2006/main" matchingName="Section title and description">
   <p:cSld name="SECTION_TITLE_AND_DESCRIPTION">
     <p:spTree>
       <p:nvGrpSpPr>
-        <p:cNvPr id="35" name="Shape 35"/>
+        <p:cNvPr id="1" name="Shape 35"/>
         <p:cNvGrpSpPr/>
         <p:nvPr/>
       </p:nvGrpSpPr>
@@ -4107,12 +4229,12 @@
           </a:ln>
         </p:spPr>
         <p:txBody>
-          <a:bodyPr anchorCtr="0" anchor="ctr" bIns="91425" lIns="91425" spcFirstLastPara="1" rIns="91425" wrap="square" tIns="91425">
+          <a:bodyPr spcFirstLastPara="1" wrap="square" lIns="91425" tIns="91425" rIns="91425" bIns="91425" anchor="ctr" anchorCtr="0">
             <a:noAutofit/>
           </a:bodyPr>
           <a:lstStyle/>
           <a:p>
-            <a:pPr indent="0" lvl="0" marL="0" rtl="0" algn="l">
+            <a:pPr marL="0" lvl="0" indent="0" algn="l" rtl="0">
               <a:spcBef>
                 <a:spcPts val="0"/>
               </a:spcBef>
@@ -4121,9 +4243,6 @@
               </a:spcAft>
               <a:buNone/>
             </a:pPr>
-            <a:r>
-              <a:t/>
-            </a:r>
             <a:endParaRPr/>
           </a:p>
         </p:txBody>
@@ -4131,7 +4250,9 @@
       <p:sp>
         <p:nvSpPr>
           <p:cNvPr id="37" name="Google Shape;37;p9"/>
-          <p:cNvSpPr txBox="1"/>
+          <p:cNvSpPr txBox="1">
+            <a:spLocks noGrp="1"/>
+          </p:cNvSpPr>
           <p:nvPr>
             <p:ph type="title"/>
           </p:nvPr>
@@ -4146,7 +4267,7 @@
           </a:prstGeom>
         </p:spPr>
         <p:txBody>
-          <a:bodyPr anchorCtr="0" anchor="b" bIns="91425" lIns="91425" spcFirstLastPara="1" rIns="91425" wrap="square" tIns="91425">
+          <a:bodyPr spcFirstLastPara="1" wrap="square" lIns="91425" tIns="91425" rIns="91425" bIns="91425" anchor="b" anchorCtr="0">
             <a:noAutofit/>
           </a:bodyPr>
           <a:lstStyle>
@@ -4250,15 +4371,19 @@
               <a:defRPr sz="4200"/>
             </a:lvl9pPr>
           </a:lstStyle>
-          <a:p/>
+          <a:p>
+            <a:endParaRPr/>
+          </a:p>
         </p:txBody>
       </p:sp>
       <p:sp>
         <p:nvSpPr>
           <p:cNvPr id="38" name="Google Shape;38;p9"/>
-          <p:cNvSpPr txBox="1"/>
+          <p:cNvSpPr txBox="1">
+            <a:spLocks noGrp="1"/>
+          </p:cNvSpPr>
           <p:nvPr>
-            <p:ph idx="1" type="subTitle"/>
+            <p:ph type="subTitle" idx="1"/>
           </p:nvPr>
         </p:nvSpPr>
         <p:spPr>
@@ -4271,7 +4396,7 @@
           </a:prstGeom>
         </p:spPr>
         <p:txBody>
-          <a:bodyPr anchorCtr="0" anchor="t" bIns="91425" lIns="91425" spcFirstLastPara="1" rIns="91425" wrap="square" tIns="91425">
+          <a:bodyPr spcFirstLastPara="1" wrap="square" lIns="91425" tIns="91425" rIns="91425" bIns="91425" anchor="t" anchorCtr="0">
             <a:noAutofit/>
           </a:bodyPr>
           <a:lstStyle>
@@ -4402,15 +4527,19 @@
               <a:defRPr sz="2100"/>
             </a:lvl9pPr>
           </a:lstStyle>
-          <a:p/>
+          <a:p>
+            <a:endParaRPr/>
+          </a:p>
         </p:txBody>
       </p:sp>
       <p:sp>
         <p:nvSpPr>
           <p:cNvPr id="39" name="Google Shape;39;p9"/>
-          <p:cNvSpPr txBox="1"/>
+          <p:cNvSpPr txBox="1">
+            <a:spLocks noGrp="1"/>
+          </p:cNvSpPr>
           <p:nvPr>
-            <p:ph idx="2" type="body"/>
+            <p:ph type="body" idx="2"/>
           </p:nvPr>
         </p:nvSpPr>
         <p:spPr>
@@ -4423,11 +4552,11 @@
           </a:prstGeom>
         </p:spPr>
         <p:txBody>
-          <a:bodyPr anchorCtr="0" anchor="ctr" bIns="91425" lIns="91425" spcFirstLastPara="1" rIns="91425" wrap="square" tIns="91425">
+          <a:bodyPr spcFirstLastPara="1" wrap="square" lIns="91425" tIns="91425" rIns="91425" bIns="91425" anchor="ctr" anchorCtr="0">
             <a:noAutofit/>
           </a:bodyPr>
           <a:lstStyle>
-            <a:lvl1pPr indent="-342900" lvl="0" marL="457200">
+            <a:lvl1pPr marL="457200" lvl="0" indent="-342900">
               <a:spcBef>
                 <a:spcPts val="0"/>
               </a:spcBef>
@@ -4438,7 +4567,7 @@
               <a:buChar char="●"/>
               <a:defRPr/>
             </a:lvl1pPr>
-            <a:lvl2pPr indent="-317500" lvl="1" marL="914400">
+            <a:lvl2pPr marL="914400" lvl="1" indent="-317500">
               <a:spcBef>
                 <a:spcPts val="1600"/>
               </a:spcBef>
@@ -4449,7 +4578,7 @@
               <a:buChar char="○"/>
               <a:defRPr/>
             </a:lvl2pPr>
-            <a:lvl3pPr indent="-317500" lvl="2" marL="1371600">
+            <a:lvl3pPr marL="1371600" lvl="2" indent="-317500">
               <a:spcBef>
                 <a:spcPts val="1600"/>
               </a:spcBef>
@@ -4460,7 +4589,7 @@
               <a:buChar char="■"/>
               <a:defRPr/>
             </a:lvl3pPr>
-            <a:lvl4pPr indent="-317500" lvl="3" marL="1828800">
+            <a:lvl4pPr marL="1828800" lvl="3" indent="-317500">
               <a:spcBef>
                 <a:spcPts val="1600"/>
               </a:spcBef>
@@ -4471,7 +4600,7 @@
               <a:buChar char="●"/>
               <a:defRPr/>
             </a:lvl4pPr>
-            <a:lvl5pPr indent="-317500" lvl="4" marL="2286000">
+            <a:lvl5pPr marL="2286000" lvl="4" indent="-317500">
               <a:spcBef>
                 <a:spcPts val="1600"/>
               </a:spcBef>
@@ -4482,7 +4611,7 @@
               <a:buChar char="○"/>
               <a:defRPr/>
             </a:lvl5pPr>
-            <a:lvl6pPr indent="-317500" lvl="5" marL="2743200">
+            <a:lvl6pPr marL="2743200" lvl="5" indent="-317500">
               <a:spcBef>
                 <a:spcPts val="1600"/>
               </a:spcBef>
@@ -4493,7 +4622,7 @@
               <a:buChar char="■"/>
               <a:defRPr/>
             </a:lvl6pPr>
-            <a:lvl7pPr indent="-317500" lvl="6" marL="3200400">
+            <a:lvl7pPr marL="3200400" lvl="6" indent="-317500">
               <a:spcBef>
                 <a:spcPts val="1600"/>
               </a:spcBef>
@@ -4504,7 +4633,7 @@
               <a:buChar char="●"/>
               <a:defRPr/>
             </a:lvl7pPr>
-            <a:lvl8pPr indent="-317500" lvl="7" marL="3657600">
+            <a:lvl8pPr marL="3657600" lvl="7" indent="-317500">
               <a:spcBef>
                 <a:spcPts val="1600"/>
               </a:spcBef>
@@ -4515,7 +4644,7 @@
               <a:buChar char="○"/>
               <a:defRPr/>
             </a:lvl8pPr>
-            <a:lvl9pPr indent="-317500" lvl="8" marL="4114800">
+            <a:lvl9pPr marL="4114800" lvl="8" indent="-317500">
               <a:spcBef>
                 <a:spcPts val="1600"/>
               </a:spcBef>
@@ -4527,15 +4656,19 @@
               <a:defRPr/>
             </a:lvl9pPr>
           </a:lstStyle>
-          <a:p/>
+          <a:p>
+            <a:endParaRPr/>
+          </a:p>
         </p:txBody>
       </p:sp>
       <p:sp>
         <p:nvSpPr>
           <p:cNvPr id="40" name="Google Shape;40;p9"/>
-          <p:cNvSpPr txBox="1"/>
+          <p:cNvSpPr txBox="1">
+            <a:spLocks noGrp="1"/>
+          </p:cNvSpPr>
           <p:nvPr>
-            <p:ph idx="12" type="sldNum"/>
+            <p:ph type="sldNum" idx="12"/>
           </p:nvPr>
         </p:nvSpPr>
         <p:spPr>
@@ -4548,7 +4681,7 @@
           </a:prstGeom>
         </p:spPr>
         <p:txBody>
-          <a:bodyPr anchorCtr="0" anchor="ctr" bIns="91425" lIns="91425" spcFirstLastPara="1" rIns="91425" wrap="square" tIns="91425">
+          <a:bodyPr spcFirstLastPara="1" wrap="square" lIns="91425" tIns="91425" rIns="91425" bIns="91425" anchor="ctr" anchorCtr="0">
             <a:noAutofit/>
           </a:bodyPr>
           <a:lstStyle>
@@ -4590,7 +4723,7 @@
             </a:lvl9pPr>
           </a:lstStyle>
           <a:p>
-            <a:pPr indent="0" lvl="0" marL="0" rtl="0" algn="r">
+            <a:pPr marL="0" lvl="0" indent="0" algn="r" rtl="0">
               <a:spcBef>
                 <a:spcPts val="0"/>
               </a:spcBef>
@@ -4616,11 +4749,11 @@
 </file>
 
 <file path=ppt/slideLayouts/slideLayout9.xml><?xml version="1.0" encoding="utf-8"?>
-<p:sldLayout xmlns:a="http://schemas.openxmlformats.org/drawingml/2006/main" xmlns:r="http://schemas.openxmlformats.org/officeDocument/2006/relationships" xmlns:mc="http://schemas.openxmlformats.org/markup-compatibility/2006" xmlns:mv="urn:schemas-microsoft-com:mac:vml" xmlns:p="http://schemas.openxmlformats.org/presentationml/2006/main" xmlns:c="http://schemas.openxmlformats.org/drawingml/2006/chart" xmlns:dgm="http://schemas.openxmlformats.org/drawingml/2006/diagram" xmlns:o="urn:schemas-microsoft-com:office:office" xmlns:v="urn:schemas-microsoft-com:vml" xmlns:pvml="urn:schemas-microsoft-com:office:powerpoint" xmlns:com="http://schemas.openxmlformats.org/drawingml/2006/compatibility" xmlns:p14="http://schemas.microsoft.com/office/powerpoint/2010/main" xmlns:p15="http://schemas.microsoft.com/office/powerpoint/2012/main" xmlns:ahyp="http://schemas.microsoft.com/office/drawing/2018/hyperlinkcolor" matchingName="Caption">
+<p:sldLayout xmlns:a="http://schemas.openxmlformats.org/drawingml/2006/main" xmlns:r="http://schemas.openxmlformats.org/officeDocument/2006/relationships" xmlns:p="http://schemas.openxmlformats.org/presentationml/2006/main" matchingName="Caption">
   <p:cSld name="CAPTION_ONLY">
     <p:spTree>
       <p:nvGrpSpPr>
-        <p:cNvPr id="41" name="Shape 41"/>
+        <p:cNvPr id="1" name="Shape 41"/>
         <p:cNvGrpSpPr/>
         <p:nvPr/>
       </p:nvGrpSpPr>
@@ -4635,9 +4768,11 @@
       <p:sp>
         <p:nvSpPr>
           <p:cNvPr id="42" name="Google Shape;42;p10"/>
-          <p:cNvSpPr txBox="1"/>
+          <p:cNvSpPr txBox="1">
+            <a:spLocks noGrp="1"/>
+          </p:cNvSpPr>
           <p:nvPr>
-            <p:ph idx="1" type="body"/>
+            <p:ph type="body" idx="1"/>
           </p:nvPr>
         </p:nvSpPr>
         <p:spPr>
@@ -4650,11 +4785,11 @@
           </a:prstGeom>
         </p:spPr>
         <p:txBody>
-          <a:bodyPr anchorCtr="0" anchor="ctr" bIns="91425" lIns="91425" spcFirstLastPara="1" rIns="91425" wrap="square" tIns="91425">
+          <a:bodyPr spcFirstLastPara="1" wrap="square" lIns="91425" tIns="91425" rIns="91425" bIns="91425" anchor="ctr" anchorCtr="0">
             <a:noAutofit/>
           </a:bodyPr>
           <a:lstStyle>
-            <a:lvl1pPr indent="-228600" lvl="0" marL="457200">
+            <a:lvl1pPr marL="457200" lvl="0" indent="-228600">
               <a:lnSpc>
                 <a:spcPct val="100000"/>
               </a:lnSpc>
@@ -4669,15 +4804,19 @@
               <a:defRPr/>
             </a:lvl1pPr>
           </a:lstStyle>
-          <a:p/>
+          <a:p>
+            <a:endParaRPr/>
+          </a:p>
         </p:txBody>
       </p:sp>
       <p:sp>
         <p:nvSpPr>
           <p:cNvPr id="43" name="Google Shape;43;p10"/>
-          <p:cNvSpPr txBox="1"/>
+          <p:cNvSpPr txBox="1">
+            <a:spLocks noGrp="1"/>
+          </p:cNvSpPr>
           <p:nvPr>
-            <p:ph idx="12" type="sldNum"/>
+            <p:ph type="sldNum" idx="12"/>
           </p:nvPr>
         </p:nvSpPr>
         <p:spPr>
@@ -4690,7 +4829,7 @@
           </a:prstGeom>
         </p:spPr>
         <p:txBody>
-          <a:bodyPr anchorCtr="0" anchor="ctr" bIns="91425" lIns="91425" spcFirstLastPara="1" rIns="91425" wrap="square" tIns="91425">
+          <a:bodyPr spcFirstLastPara="1" wrap="square" lIns="91425" tIns="91425" rIns="91425" bIns="91425" anchor="ctr" anchorCtr="0">
             <a:noAutofit/>
           </a:bodyPr>
           <a:lstStyle>
@@ -4732,7 +4871,7 @@
             </a:lvl9pPr>
           </a:lstStyle>
           <a:p>
-            <a:pPr indent="0" lvl="0" marL="0" rtl="0" algn="r">
+            <a:pPr marL="0" lvl="0" indent="0" algn="r" rtl="0">
               <a:spcBef>
                 <a:spcPts val="0"/>
               </a:spcBef>
@@ -4758,18 +4897,19 @@
 </file>
 
 <file path=ppt/slideMasters/slideMaster1.xml><?xml version="1.0" encoding="utf-8"?>
-<p:sldMaster xmlns:a="http://schemas.openxmlformats.org/drawingml/2006/main" xmlns:r="http://schemas.openxmlformats.org/officeDocument/2006/relationships" xmlns:mc="http://schemas.openxmlformats.org/markup-compatibility/2006" xmlns:mv="urn:schemas-microsoft-com:mac:vml" xmlns:p="http://schemas.openxmlformats.org/presentationml/2006/main" xmlns:c="http://schemas.openxmlformats.org/drawingml/2006/chart" xmlns:dgm="http://schemas.openxmlformats.org/drawingml/2006/diagram" xmlns:o="urn:schemas-microsoft-com:office:office" xmlns:v="urn:schemas-microsoft-com:vml" xmlns:pvml="urn:schemas-microsoft-com:office:powerpoint" xmlns:com="http://schemas.openxmlformats.org/drawingml/2006/compatibility" xmlns:p14="http://schemas.microsoft.com/office/powerpoint/2010/main" xmlns:p15="http://schemas.microsoft.com/office/powerpoint/2012/main" xmlns:ahyp="http://schemas.microsoft.com/office/drawing/2018/hyperlinkcolor">
+<p:sldMaster xmlns:a="http://schemas.openxmlformats.org/drawingml/2006/main" xmlns:r="http://schemas.openxmlformats.org/officeDocument/2006/relationships" xmlns:p="http://schemas.openxmlformats.org/presentationml/2006/main">
   <p:cSld name="simple-light-2">
     <p:bg>
       <p:bgPr>
         <a:solidFill>
           <a:schemeClr val="lt1"/>
         </a:solidFill>
+        <a:effectLst/>
       </p:bgPr>
     </p:bg>
     <p:spTree>
       <p:nvGrpSpPr>
-        <p:cNvPr id="5" name="Shape 5"/>
+        <p:cNvPr id="1" name="Shape 5"/>
         <p:cNvGrpSpPr/>
         <p:nvPr/>
       </p:nvGrpSpPr>
@@ -4784,7 +4924,9 @@
       <p:sp>
         <p:nvSpPr>
           <p:cNvPr id="6" name="Google Shape;6;p1"/>
-          <p:cNvSpPr txBox="1"/>
+          <p:cNvSpPr txBox="1">
+            <a:spLocks noGrp="1"/>
+          </p:cNvSpPr>
           <p:nvPr>
             <p:ph type="title"/>
           </p:nvPr>
@@ -4803,7 +4945,7 @@
           </a:ln>
         </p:spPr>
         <p:txBody>
-          <a:bodyPr anchorCtr="0" anchor="t" bIns="91425" lIns="91425" spcFirstLastPara="1" rIns="91425" wrap="square" tIns="91425">
+          <a:bodyPr spcFirstLastPara="1" wrap="square" lIns="91425" tIns="91425" rIns="91425" bIns="91425" anchor="t" anchorCtr="0">
             <a:noAutofit/>
           </a:bodyPr>
           <a:lstStyle>
@@ -4970,15 +5112,19 @@
               </a:defRPr>
             </a:lvl9pPr>
           </a:lstStyle>
-          <a:p/>
+          <a:p>
+            <a:endParaRPr/>
+          </a:p>
         </p:txBody>
       </p:sp>
       <p:sp>
         <p:nvSpPr>
           <p:cNvPr id="7" name="Google Shape;7;p1"/>
-          <p:cNvSpPr txBox="1"/>
+          <p:cNvSpPr txBox="1">
+            <a:spLocks noGrp="1"/>
+          </p:cNvSpPr>
           <p:nvPr>
-            <p:ph idx="1" type="body"/>
+            <p:ph type="body" idx="1"/>
           </p:nvPr>
         </p:nvSpPr>
         <p:spPr>
@@ -4995,11 +5141,11 @@
           </a:ln>
         </p:spPr>
         <p:txBody>
-          <a:bodyPr anchorCtr="0" anchor="t" bIns="91425" lIns="91425" spcFirstLastPara="1" rIns="91425" wrap="square" tIns="91425">
+          <a:bodyPr spcFirstLastPara="1" wrap="square" lIns="91425" tIns="91425" rIns="91425" bIns="91425" anchor="t" anchorCtr="0">
             <a:noAutofit/>
           </a:bodyPr>
           <a:lstStyle>
-            <a:lvl1pPr indent="-342900" lvl="0" marL="457200">
+            <a:lvl1pPr marL="457200" lvl="0" indent="-342900">
               <a:lnSpc>
                 <a:spcPct val="115000"/>
               </a:lnSpc>
@@ -5020,7 +5166,7 @@
                 </a:solidFill>
               </a:defRPr>
             </a:lvl1pPr>
-            <a:lvl2pPr indent="-317500" lvl="1" marL="914400">
+            <a:lvl2pPr marL="914400" lvl="1" indent="-317500">
               <a:lnSpc>
                 <a:spcPct val="115000"/>
               </a:lnSpc>
@@ -5041,7 +5187,7 @@
                 </a:solidFill>
               </a:defRPr>
             </a:lvl2pPr>
-            <a:lvl3pPr indent="-317500" lvl="2" marL="1371600">
+            <a:lvl3pPr marL="1371600" lvl="2" indent="-317500">
               <a:lnSpc>
                 <a:spcPct val="115000"/>
               </a:lnSpc>
@@ -5062,7 +5208,7 @@
                 </a:solidFill>
               </a:defRPr>
             </a:lvl3pPr>
-            <a:lvl4pPr indent="-317500" lvl="3" marL="1828800">
+            <a:lvl4pPr marL="1828800" lvl="3" indent="-317500">
               <a:lnSpc>
                 <a:spcPct val="115000"/>
               </a:lnSpc>
@@ -5083,7 +5229,7 @@
                 </a:solidFill>
               </a:defRPr>
             </a:lvl4pPr>
-            <a:lvl5pPr indent="-317500" lvl="4" marL="2286000">
+            <a:lvl5pPr marL="2286000" lvl="4" indent="-317500">
               <a:lnSpc>
                 <a:spcPct val="115000"/>
               </a:lnSpc>
@@ -5104,7 +5250,7 @@
                 </a:solidFill>
               </a:defRPr>
             </a:lvl5pPr>
-            <a:lvl6pPr indent="-317500" lvl="5" marL="2743200">
+            <a:lvl6pPr marL="2743200" lvl="5" indent="-317500">
               <a:lnSpc>
                 <a:spcPct val="115000"/>
               </a:lnSpc>
@@ -5125,7 +5271,7 @@
                 </a:solidFill>
               </a:defRPr>
             </a:lvl6pPr>
-            <a:lvl7pPr indent="-317500" lvl="6" marL="3200400">
+            <a:lvl7pPr marL="3200400" lvl="6" indent="-317500">
               <a:lnSpc>
                 <a:spcPct val="115000"/>
               </a:lnSpc>
@@ -5146,7 +5292,7 @@
                 </a:solidFill>
               </a:defRPr>
             </a:lvl7pPr>
-            <a:lvl8pPr indent="-317500" lvl="7" marL="3657600">
+            <a:lvl8pPr marL="3657600" lvl="7" indent="-317500">
               <a:lnSpc>
                 <a:spcPct val="115000"/>
               </a:lnSpc>
@@ -5167,7 +5313,7 @@
                 </a:solidFill>
               </a:defRPr>
             </a:lvl8pPr>
-            <a:lvl9pPr indent="-317500" lvl="8" marL="4114800">
+            <a:lvl9pPr marL="4114800" lvl="8" indent="-317500">
               <a:lnSpc>
                 <a:spcPct val="115000"/>
               </a:lnSpc>
@@ -5189,15 +5335,19 @@
               </a:defRPr>
             </a:lvl9pPr>
           </a:lstStyle>
-          <a:p/>
+          <a:p>
+            <a:endParaRPr/>
+          </a:p>
         </p:txBody>
       </p:sp>
       <p:sp>
         <p:nvSpPr>
           <p:cNvPr id="8" name="Google Shape;8;p1"/>
-          <p:cNvSpPr txBox="1"/>
+          <p:cNvSpPr txBox="1">
+            <a:spLocks noGrp="1"/>
+          </p:cNvSpPr>
           <p:nvPr>
-            <p:ph idx="12" type="sldNum"/>
+            <p:ph type="sldNum" idx="12"/>
           </p:nvPr>
         </p:nvSpPr>
         <p:spPr>
@@ -5214,7 +5364,7 @@
           </a:ln>
         </p:spPr>
         <p:txBody>
-          <a:bodyPr anchorCtr="0" anchor="ctr" bIns="91425" lIns="91425" spcFirstLastPara="1" rIns="91425" wrap="square" tIns="91425">
+          <a:bodyPr spcFirstLastPara="1" wrap="square" lIns="91425" tIns="91425" rIns="91425" bIns="91425" anchor="ctr" anchorCtr="0">
             <a:noAutofit/>
           </a:bodyPr>
           <a:lstStyle>
@@ -5292,7 +5442,7 @@
             </a:lvl9pPr>
           </a:lstStyle>
           <a:p>
-            <a:pPr indent="0" lvl="0" marL="0" rtl="0" algn="r">
+            <a:pPr marL="0" lvl="0" indent="0" algn="r" rtl="0">
               <a:spcBef>
                 <a:spcPts val="0"/>
               </a:spcBef>
@@ -5311,7 +5461,7 @@
       </p:sp>
     </p:spTree>
   </p:cSld>
-  <p:clrMap accent1="accent1" accent2="accent2" accent3="accent3" accent4="accent4" accent5="accent5" accent6="accent6" bg1="lt1" bg2="dk2" tx1="dk1" tx2="lt2" folHlink="folHlink" hlink="hlink"/>
+  <p:clrMap bg1="lt1" tx1="dk1" bg2="dk2" tx2="lt2" accent1="accent1" accent2="accent2" accent3="accent3" accent4="accent4" accent5="accent5" accent6="accent6" hlink="hlink" folHlink="folHlink"/>
   <p:sldLayoutIdLst>
     <p:sldLayoutId id="2147483648" r:id="rId1"/>
     <p:sldLayoutId id="2147483649" r:id="rId2"/>
@@ -5325,10 +5475,10 @@
     <p:sldLayoutId id="2147483657" r:id="rId10"/>
     <p:sldLayoutId id="2147483658" r:id="rId11"/>
   </p:sldLayoutIdLst>
-  <p:hf dt="0" ftr="0" hdr="0" sldNum="0"/>
+  <p:hf sldNum="0" hdr="0" ftr="0" dt="0"/>
   <p:txStyles>
     <p:titleStyle>
-      <a:defPPr lvl="0" marR="0" rtl="0" algn="l">
+      <a:defPPr marR="0" lvl="0" algn="l" rtl="0">
         <a:lnSpc>
           <a:spcPct val="100000"/>
         </a:lnSpc>
@@ -5339,7 +5489,7 @@
           <a:spcPts val="0"/>
         </a:spcAft>
       </a:defPPr>
-      <a:lvl1pPr lvl="0" marR="0" rtl="0" algn="l">
+      <a:lvl1pPr marR="0" lvl="0" algn="l" rtl="0">
         <a:lnSpc>
           <a:spcPct val="100000"/>
         </a:lnSpc>
@@ -5353,7 +5503,7 @@
           <a:srgbClr val="000000"/>
         </a:buClr>
         <a:buFont typeface="Arial"/>
-        <a:defRPr b="0" i="0" sz="1400" u="none" cap="none" strike="noStrike">
+        <a:defRPr sz="1400" b="0" i="0" u="none" strike="noStrike" cap="none">
           <a:solidFill>
             <a:srgbClr val="000000"/>
           </a:solidFill>
@@ -5363,7 +5513,7 @@
           <a:sym typeface="Arial"/>
         </a:defRPr>
       </a:lvl1pPr>
-      <a:lvl2pPr lvl="1" marR="0" rtl="0" algn="l">
+      <a:lvl2pPr marR="0" lvl="1" algn="l" rtl="0">
         <a:lnSpc>
           <a:spcPct val="100000"/>
         </a:lnSpc>
@@ -5377,7 +5527,7 @@
           <a:srgbClr val="000000"/>
         </a:buClr>
         <a:buFont typeface="Arial"/>
-        <a:defRPr b="0" i="0" sz="1400" u="none" cap="none" strike="noStrike">
+        <a:defRPr sz="1400" b="0" i="0" u="none" strike="noStrike" cap="none">
           <a:solidFill>
             <a:srgbClr val="000000"/>
           </a:solidFill>
@@ -5387,7 +5537,7 @@
           <a:sym typeface="Arial"/>
         </a:defRPr>
       </a:lvl2pPr>
-      <a:lvl3pPr lvl="2" marR="0" rtl="0" algn="l">
+      <a:lvl3pPr marR="0" lvl="2" algn="l" rtl="0">
         <a:lnSpc>
           <a:spcPct val="100000"/>
         </a:lnSpc>
@@ -5401,7 +5551,7 @@
           <a:srgbClr val="000000"/>
         </a:buClr>
         <a:buFont typeface="Arial"/>
-        <a:defRPr b="0" i="0" sz="1400" u="none" cap="none" strike="noStrike">
+        <a:defRPr sz="1400" b="0" i="0" u="none" strike="noStrike" cap="none">
           <a:solidFill>
             <a:srgbClr val="000000"/>
           </a:solidFill>
@@ -5411,7 +5561,7 @@
           <a:sym typeface="Arial"/>
         </a:defRPr>
       </a:lvl3pPr>
-      <a:lvl4pPr lvl="3" marR="0" rtl="0" algn="l">
+      <a:lvl4pPr marR="0" lvl="3" algn="l" rtl="0">
         <a:lnSpc>
           <a:spcPct val="100000"/>
         </a:lnSpc>
@@ -5425,7 +5575,7 @@
           <a:srgbClr val="000000"/>
         </a:buClr>
         <a:buFont typeface="Arial"/>
-        <a:defRPr b="0" i="0" sz="1400" u="none" cap="none" strike="noStrike">
+        <a:defRPr sz="1400" b="0" i="0" u="none" strike="noStrike" cap="none">
           <a:solidFill>
             <a:srgbClr val="000000"/>
           </a:solidFill>
@@ -5435,7 +5585,7 @@
           <a:sym typeface="Arial"/>
         </a:defRPr>
       </a:lvl4pPr>
-      <a:lvl5pPr lvl="4" marR="0" rtl="0" algn="l">
+      <a:lvl5pPr marR="0" lvl="4" algn="l" rtl="0">
         <a:lnSpc>
           <a:spcPct val="100000"/>
         </a:lnSpc>
@@ -5449,7 +5599,7 @@
           <a:srgbClr val="000000"/>
         </a:buClr>
         <a:buFont typeface="Arial"/>
-        <a:defRPr b="0" i="0" sz="1400" u="none" cap="none" strike="noStrike">
+        <a:defRPr sz="1400" b="0" i="0" u="none" strike="noStrike" cap="none">
           <a:solidFill>
             <a:srgbClr val="000000"/>
           </a:solidFill>
@@ -5459,7 +5609,7 @@
           <a:sym typeface="Arial"/>
         </a:defRPr>
       </a:lvl5pPr>
-      <a:lvl6pPr lvl="5" marR="0" rtl="0" algn="l">
+      <a:lvl6pPr marR="0" lvl="5" algn="l" rtl="0">
         <a:lnSpc>
           <a:spcPct val="100000"/>
         </a:lnSpc>
@@ -5473,7 +5623,7 @@
           <a:srgbClr val="000000"/>
         </a:buClr>
         <a:buFont typeface="Arial"/>
-        <a:defRPr b="0" i="0" sz="1400" u="none" cap="none" strike="noStrike">
+        <a:defRPr sz="1400" b="0" i="0" u="none" strike="noStrike" cap="none">
           <a:solidFill>
             <a:srgbClr val="000000"/>
           </a:solidFill>
@@ -5483,7 +5633,7 @@
           <a:sym typeface="Arial"/>
         </a:defRPr>
       </a:lvl6pPr>
-      <a:lvl7pPr lvl="6" marR="0" rtl="0" algn="l">
+      <a:lvl7pPr marR="0" lvl="6" algn="l" rtl="0">
         <a:lnSpc>
           <a:spcPct val="100000"/>
         </a:lnSpc>
@@ -5497,7 +5647,7 @@
           <a:srgbClr val="000000"/>
         </a:buClr>
         <a:buFont typeface="Arial"/>
-        <a:defRPr b="0" i="0" sz="1400" u="none" cap="none" strike="noStrike">
+        <a:defRPr sz="1400" b="0" i="0" u="none" strike="noStrike" cap="none">
           <a:solidFill>
             <a:srgbClr val="000000"/>
           </a:solidFill>
@@ -5507,7 +5657,7 @@
           <a:sym typeface="Arial"/>
         </a:defRPr>
       </a:lvl7pPr>
-      <a:lvl8pPr lvl="7" marR="0" rtl="0" algn="l">
+      <a:lvl8pPr marR="0" lvl="7" algn="l" rtl="0">
         <a:lnSpc>
           <a:spcPct val="100000"/>
         </a:lnSpc>
@@ -5521,7 +5671,7 @@
           <a:srgbClr val="000000"/>
         </a:buClr>
         <a:buFont typeface="Arial"/>
-        <a:defRPr b="0" i="0" sz="1400" u="none" cap="none" strike="noStrike">
+        <a:defRPr sz="1400" b="0" i="0" u="none" strike="noStrike" cap="none">
           <a:solidFill>
             <a:srgbClr val="000000"/>
           </a:solidFill>
@@ -5531,7 +5681,7 @@
           <a:sym typeface="Arial"/>
         </a:defRPr>
       </a:lvl8pPr>
-      <a:lvl9pPr lvl="8" marR="0" rtl="0" algn="l">
+      <a:lvl9pPr marR="0" lvl="8" algn="l" rtl="0">
         <a:lnSpc>
           <a:spcPct val="100000"/>
         </a:lnSpc>
@@ -5545,7 +5695,7 @@
           <a:srgbClr val="000000"/>
         </a:buClr>
         <a:buFont typeface="Arial"/>
-        <a:defRPr b="0" i="0" sz="1400" u="none" cap="none" strike="noStrike">
+        <a:defRPr sz="1400" b="0" i="0" u="none" strike="noStrike" cap="none">
           <a:solidFill>
             <a:srgbClr val="000000"/>
           </a:solidFill>
@@ -5557,7 +5707,7 @@
       </a:lvl9pPr>
     </p:titleStyle>
     <p:bodyStyle>
-      <a:defPPr lvl="0" marR="0" rtl="0" algn="l">
+      <a:defPPr marR="0" lvl="0" algn="l" rtl="0">
         <a:lnSpc>
           <a:spcPct val="100000"/>
         </a:lnSpc>
@@ -5568,7 +5718,7 @@
           <a:spcPts val="0"/>
         </a:spcAft>
       </a:defPPr>
-      <a:lvl1pPr lvl="0" marR="0" rtl="0" algn="l">
+      <a:lvl1pPr marR="0" lvl="0" algn="l" rtl="0">
         <a:lnSpc>
           <a:spcPct val="100000"/>
         </a:lnSpc>
@@ -5582,7 +5732,7 @@
           <a:srgbClr val="000000"/>
         </a:buClr>
         <a:buFont typeface="Arial"/>
-        <a:defRPr b="0" i="0" sz="1400" u="none" cap="none" strike="noStrike">
+        <a:defRPr sz="1400" b="0" i="0" u="none" strike="noStrike" cap="none">
           <a:solidFill>
             <a:srgbClr val="000000"/>
           </a:solidFill>
@@ -5592,7 +5742,7 @@
           <a:sym typeface="Arial"/>
         </a:defRPr>
       </a:lvl1pPr>
-      <a:lvl2pPr lvl="1" marR="0" rtl="0" algn="l">
+      <a:lvl2pPr marR="0" lvl="1" algn="l" rtl="0">
         <a:lnSpc>
           <a:spcPct val="100000"/>
         </a:lnSpc>
@@ -5606,7 +5756,7 @@
           <a:srgbClr val="000000"/>
         </a:buClr>
         <a:buFont typeface="Arial"/>
-        <a:defRPr b="0" i="0" sz="1400" u="none" cap="none" strike="noStrike">
+        <a:defRPr sz="1400" b="0" i="0" u="none" strike="noStrike" cap="none">
           <a:solidFill>
             <a:srgbClr val="000000"/>
           </a:solidFill>
@@ -5616,7 +5766,7 @@
           <a:sym typeface="Arial"/>
         </a:defRPr>
       </a:lvl2pPr>
-      <a:lvl3pPr lvl="2" marR="0" rtl="0" algn="l">
+      <a:lvl3pPr marR="0" lvl="2" algn="l" rtl="0">
         <a:lnSpc>
           <a:spcPct val="100000"/>
         </a:lnSpc>
@@ -5630,7 +5780,7 @@
           <a:srgbClr val="000000"/>
         </a:buClr>
         <a:buFont typeface="Arial"/>
-        <a:defRPr b="0" i="0" sz="1400" u="none" cap="none" strike="noStrike">
+        <a:defRPr sz="1400" b="0" i="0" u="none" strike="noStrike" cap="none">
           <a:solidFill>
             <a:srgbClr val="000000"/>
           </a:solidFill>
@@ -5640,7 +5790,7 @@
           <a:sym typeface="Arial"/>
         </a:defRPr>
       </a:lvl3pPr>
-      <a:lvl4pPr lvl="3" marR="0" rtl="0" algn="l">
+      <a:lvl4pPr marR="0" lvl="3" algn="l" rtl="0">
         <a:lnSpc>
           <a:spcPct val="100000"/>
         </a:lnSpc>
@@ -5654,7 +5804,7 @@
           <a:srgbClr val="000000"/>
         </a:buClr>
         <a:buFont typeface="Arial"/>
-        <a:defRPr b="0" i="0" sz="1400" u="none" cap="none" strike="noStrike">
+        <a:defRPr sz="1400" b="0" i="0" u="none" strike="noStrike" cap="none">
           <a:solidFill>
             <a:srgbClr val="000000"/>
           </a:solidFill>
@@ -5664,7 +5814,7 @@
           <a:sym typeface="Arial"/>
         </a:defRPr>
       </a:lvl4pPr>
-      <a:lvl5pPr lvl="4" marR="0" rtl="0" algn="l">
+      <a:lvl5pPr marR="0" lvl="4" algn="l" rtl="0">
         <a:lnSpc>
           <a:spcPct val="100000"/>
         </a:lnSpc>
@@ -5678,7 +5828,7 @@
           <a:srgbClr val="000000"/>
         </a:buClr>
         <a:buFont typeface="Arial"/>
-        <a:defRPr b="0" i="0" sz="1400" u="none" cap="none" strike="noStrike">
+        <a:defRPr sz="1400" b="0" i="0" u="none" strike="noStrike" cap="none">
           <a:solidFill>
             <a:srgbClr val="000000"/>
           </a:solidFill>
@@ -5688,7 +5838,7 @@
           <a:sym typeface="Arial"/>
         </a:defRPr>
       </a:lvl5pPr>
-      <a:lvl6pPr lvl="5" marR="0" rtl="0" algn="l">
+      <a:lvl6pPr marR="0" lvl="5" algn="l" rtl="0">
         <a:lnSpc>
           <a:spcPct val="100000"/>
         </a:lnSpc>
@@ -5702,7 +5852,7 @@
           <a:srgbClr val="000000"/>
         </a:buClr>
         <a:buFont typeface="Arial"/>
-        <a:defRPr b="0" i="0" sz="1400" u="none" cap="none" strike="noStrike">
+        <a:defRPr sz="1400" b="0" i="0" u="none" strike="noStrike" cap="none">
           <a:solidFill>
             <a:srgbClr val="000000"/>
           </a:solidFill>
@@ -5712,7 +5862,7 @@
           <a:sym typeface="Arial"/>
         </a:defRPr>
       </a:lvl6pPr>
-      <a:lvl7pPr lvl="6" marR="0" rtl="0" algn="l">
+      <a:lvl7pPr marR="0" lvl="6" algn="l" rtl="0">
         <a:lnSpc>
           <a:spcPct val="100000"/>
         </a:lnSpc>
@@ -5726,7 +5876,7 @@
           <a:srgbClr val="000000"/>
         </a:buClr>
         <a:buFont typeface="Arial"/>
-        <a:defRPr b="0" i="0" sz="1400" u="none" cap="none" strike="noStrike">
+        <a:defRPr sz="1400" b="0" i="0" u="none" strike="noStrike" cap="none">
           <a:solidFill>
             <a:srgbClr val="000000"/>
           </a:solidFill>
@@ -5736,7 +5886,7 @@
           <a:sym typeface="Arial"/>
         </a:defRPr>
       </a:lvl7pPr>
-      <a:lvl8pPr lvl="7" marR="0" rtl="0" algn="l">
+      <a:lvl8pPr marR="0" lvl="7" algn="l" rtl="0">
         <a:lnSpc>
           <a:spcPct val="100000"/>
         </a:lnSpc>
@@ -5750,7 +5900,7 @@
           <a:srgbClr val="000000"/>
         </a:buClr>
         <a:buFont typeface="Arial"/>
-        <a:defRPr b="0" i="0" sz="1400" u="none" cap="none" strike="noStrike">
+        <a:defRPr sz="1400" b="0" i="0" u="none" strike="noStrike" cap="none">
           <a:solidFill>
             <a:srgbClr val="000000"/>
           </a:solidFill>
@@ -5760,7 +5910,7 @@
           <a:sym typeface="Arial"/>
         </a:defRPr>
       </a:lvl8pPr>
-      <a:lvl9pPr lvl="8" marR="0" rtl="0" algn="l">
+      <a:lvl9pPr marR="0" lvl="8" algn="l" rtl="0">
         <a:lnSpc>
           <a:spcPct val="100000"/>
         </a:lnSpc>
@@ -5774,7 +5924,7 @@
           <a:srgbClr val="000000"/>
         </a:buClr>
         <a:buFont typeface="Arial"/>
-        <a:defRPr b="0" i="0" sz="1400" u="none" cap="none" strike="noStrike">
+        <a:defRPr sz="1400" b="0" i="0" u="none" strike="noStrike" cap="none">
           <a:solidFill>
             <a:srgbClr val="000000"/>
           </a:solidFill>
@@ -5786,7 +5936,7 @@
       </a:lvl9pPr>
     </p:bodyStyle>
     <p:otherStyle>
-      <a:defPPr lvl="0" marR="0" rtl="0" algn="l">
+      <a:defPPr marR="0" lvl="0" algn="l" rtl="0">
         <a:lnSpc>
           <a:spcPct val="100000"/>
         </a:lnSpc>
@@ -5797,7 +5947,7 @@
           <a:spcPts val="0"/>
         </a:spcAft>
       </a:defPPr>
-      <a:lvl1pPr lvl="0" marR="0" rtl="0" algn="l">
+      <a:lvl1pPr marR="0" lvl="0" algn="l" rtl="0">
         <a:lnSpc>
           <a:spcPct val="100000"/>
         </a:lnSpc>
@@ -5811,7 +5961,7 @@
           <a:srgbClr val="000000"/>
         </a:buClr>
         <a:buFont typeface="Arial"/>
-        <a:defRPr b="0" i="0" sz="1400" u="none" cap="none" strike="noStrike">
+        <a:defRPr sz="1400" b="0" i="0" u="none" strike="noStrike" cap="none">
           <a:solidFill>
             <a:srgbClr val="000000"/>
           </a:solidFill>
@@ -5821,7 +5971,7 @@
           <a:sym typeface="Arial"/>
         </a:defRPr>
       </a:lvl1pPr>
-      <a:lvl2pPr lvl="1" marR="0" rtl="0" algn="l">
+      <a:lvl2pPr marR="0" lvl="1" algn="l" rtl="0">
         <a:lnSpc>
           <a:spcPct val="100000"/>
         </a:lnSpc>
@@ -5835,7 +5985,7 @@
           <a:srgbClr val="000000"/>
         </a:buClr>
         <a:buFont typeface="Arial"/>
-        <a:defRPr b="0" i="0" sz="1400" u="none" cap="none" strike="noStrike">
+        <a:defRPr sz="1400" b="0" i="0" u="none" strike="noStrike" cap="none">
           <a:solidFill>
             <a:srgbClr val="000000"/>
           </a:solidFill>
@@ -5845,7 +5995,7 @@
           <a:sym typeface="Arial"/>
         </a:defRPr>
       </a:lvl2pPr>
-      <a:lvl3pPr lvl="2" marR="0" rtl="0" algn="l">
+      <a:lvl3pPr marR="0" lvl="2" algn="l" rtl="0">
         <a:lnSpc>
           <a:spcPct val="100000"/>
         </a:lnSpc>
@@ -5859,7 +6009,7 @@
           <a:srgbClr val="000000"/>
         </a:buClr>
         <a:buFont typeface="Arial"/>
-        <a:defRPr b="0" i="0" sz="1400" u="none" cap="none" strike="noStrike">
+        <a:defRPr sz="1400" b="0" i="0" u="none" strike="noStrike" cap="none">
           <a:solidFill>
             <a:srgbClr val="000000"/>
           </a:solidFill>
@@ -5869,7 +6019,7 @@
           <a:sym typeface="Arial"/>
         </a:defRPr>
       </a:lvl3pPr>
-      <a:lvl4pPr lvl="3" marR="0" rtl="0" algn="l">
+      <a:lvl4pPr marR="0" lvl="3" algn="l" rtl="0">
         <a:lnSpc>
           <a:spcPct val="100000"/>
         </a:lnSpc>
@@ -5883,7 +6033,7 @@
           <a:srgbClr val="000000"/>
         </a:buClr>
         <a:buFont typeface="Arial"/>
-        <a:defRPr b="0" i="0" sz="1400" u="none" cap="none" strike="noStrike">
+        <a:defRPr sz="1400" b="0" i="0" u="none" strike="noStrike" cap="none">
           <a:solidFill>
             <a:srgbClr val="000000"/>
           </a:solidFill>
@@ -5893,7 +6043,7 @@
           <a:sym typeface="Arial"/>
         </a:defRPr>
       </a:lvl4pPr>
-      <a:lvl5pPr lvl="4" marR="0" rtl="0" algn="l">
+      <a:lvl5pPr marR="0" lvl="4" algn="l" rtl="0">
         <a:lnSpc>
           <a:spcPct val="100000"/>
         </a:lnSpc>
@@ -5907,7 +6057,7 @@
           <a:srgbClr val="000000"/>
         </a:buClr>
         <a:buFont typeface="Arial"/>
-        <a:defRPr b="0" i="0" sz="1400" u="none" cap="none" strike="noStrike">
+        <a:defRPr sz="1400" b="0" i="0" u="none" strike="noStrike" cap="none">
           <a:solidFill>
             <a:srgbClr val="000000"/>
           </a:solidFill>
@@ -5917,7 +6067,7 @@
           <a:sym typeface="Arial"/>
         </a:defRPr>
       </a:lvl5pPr>
-      <a:lvl6pPr lvl="5" marR="0" rtl="0" algn="l">
+      <a:lvl6pPr marR="0" lvl="5" algn="l" rtl="0">
         <a:lnSpc>
           <a:spcPct val="100000"/>
         </a:lnSpc>
@@ -5931,7 +6081,7 @@
           <a:srgbClr val="000000"/>
         </a:buClr>
         <a:buFont typeface="Arial"/>
-        <a:defRPr b="0" i="0" sz="1400" u="none" cap="none" strike="noStrike">
+        <a:defRPr sz="1400" b="0" i="0" u="none" strike="noStrike" cap="none">
           <a:solidFill>
             <a:srgbClr val="000000"/>
           </a:solidFill>
@@ -5941,7 +6091,7 @@
           <a:sym typeface="Arial"/>
         </a:defRPr>
       </a:lvl6pPr>
-      <a:lvl7pPr lvl="6" marR="0" rtl="0" algn="l">
+      <a:lvl7pPr marR="0" lvl="6" algn="l" rtl="0">
         <a:lnSpc>
           <a:spcPct val="100000"/>
         </a:lnSpc>
@@ -5955,7 +6105,7 @@
           <a:srgbClr val="000000"/>
         </a:buClr>
         <a:buFont typeface="Arial"/>
-        <a:defRPr b="0" i="0" sz="1400" u="none" cap="none" strike="noStrike">
+        <a:defRPr sz="1400" b="0" i="0" u="none" strike="noStrike" cap="none">
           <a:solidFill>
             <a:srgbClr val="000000"/>
           </a:solidFill>
@@ -5965,7 +6115,7 @@
           <a:sym typeface="Arial"/>
         </a:defRPr>
       </a:lvl7pPr>
-      <a:lvl8pPr lvl="7" marR="0" rtl="0" algn="l">
+      <a:lvl8pPr marR="0" lvl="7" algn="l" rtl="0">
         <a:lnSpc>
           <a:spcPct val="100000"/>
         </a:lnSpc>
@@ -5979,7 +6129,7 @@
           <a:srgbClr val="000000"/>
         </a:buClr>
         <a:buFont typeface="Arial"/>
-        <a:defRPr b="0" i="0" sz="1400" u="none" cap="none" strike="noStrike">
+        <a:defRPr sz="1400" b="0" i="0" u="none" strike="noStrike" cap="none">
           <a:solidFill>
             <a:srgbClr val="000000"/>
           </a:solidFill>
@@ -5989,7 +6139,7 @@
           <a:sym typeface="Arial"/>
         </a:defRPr>
       </a:lvl8pPr>
-      <a:lvl9pPr lvl="8" marR="0" rtl="0" algn="l">
+      <a:lvl9pPr marR="0" lvl="8" algn="l" rtl="0">
         <a:lnSpc>
           <a:spcPct val="100000"/>
         </a:lnSpc>
@@ -6003,7 +6153,7 @@
           <a:srgbClr val="000000"/>
         </a:buClr>
         <a:buFont typeface="Arial"/>
-        <a:defRPr b="0" i="0" sz="1400" u="none" cap="none" strike="noStrike">
+        <a:defRPr sz="1400" b="0" i="0" u="none" strike="noStrike" cap="none">
           <a:solidFill>
             <a:srgbClr val="000000"/>
           </a:solidFill>
@@ -6019,11 +6169,11 @@
 </file>
 
 <file path=ppt/slides/slide1.xml><?xml version="1.0" encoding="utf-8"?>
-<p:sld xmlns:a="http://schemas.openxmlformats.org/drawingml/2006/main" xmlns:r="http://schemas.openxmlformats.org/officeDocument/2006/relationships" xmlns:mc="http://schemas.openxmlformats.org/markup-compatibility/2006" xmlns:mv="urn:schemas-microsoft-com:mac:vml" xmlns:p="http://schemas.openxmlformats.org/presentationml/2006/main" xmlns:c="http://schemas.openxmlformats.org/drawingml/2006/chart" xmlns:dgm="http://schemas.openxmlformats.org/drawingml/2006/diagram" xmlns:o="urn:schemas-microsoft-com:office:office" xmlns:v="urn:schemas-microsoft-com:vml" xmlns:pvml="urn:schemas-microsoft-com:office:powerpoint" xmlns:com="http://schemas.openxmlformats.org/drawingml/2006/compatibility" xmlns:p14="http://schemas.microsoft.com/office/powerpoint/2010/main" xmlns:p15="http://schemas.microsoft.com/office/powerpoint/2012/main" xmlns:ahyp="http://schemas.microsoft.com/office/drawing/2018/hyperlinkcolor">
+<p:sld xmlns:a="http://schemas.openxmlformats.org/drawingml/2006/main" xmlns:r="http://schemas.openxmlformats.org/officeDocument/2006/relationships" xmlns:p="http://schemas.openxmlformats.org/presentationml/2006/main">
   <p:cSld>
     <p:spTree>
       <p:nvGrpSpPr>
-        <p:cNvPr id="53" name="Shape 53"/>
+        <p:cNvPr id="1" name="Shape 53"/>
         <p:cNvGrpSpPr/>
         <p:nvPr/>
       </p:nvGrpSpPr>
@@ -6038,7 +6188,9 @@
       <p:sp>
         <p:nvSpPr>
           <p:cNvPr id="54" name="Google Shape;54;p13"/>
-          <p:cNvSpPr txBox="1"/>
+          <p:cNvSpPr txBox="1">
+            <a:spLocks noGrp="1"/>
+          </p:cNvSpPr>
           <p:nvPr>
             <p:ph type="ctrTitle"/>
           </p:nvPr>
@@ -6053,12 +6205,12 @@
           </a:prstGeom>
         </p:spPr>
         <p:txBody>
-          <a:bodyPr anchorCtr="0" anchor="b" bIns="91425" lIns="91425" spcFirstLastPara="1" rIns="91425" wrap="square" tIns="91425">
+          <a:bodyPr spcFirstLastPara="1" wrap="square" lIns="91425" tIns="91425" rIns="91425" bIns="91425" anchor="b" anchorCtr="0">
             <a:noAutofit/>
           </a:bodyPr>
           <a:lstStyle/>
           <a:p>
-            <a:pPr indent="0" lvl="0" marL="0" rtl="0" algn="ctr">
+            <a:pPr marL="0" lvl="0" indent="0" algn="ctr" rtl="0">
               <a:spcBef>
                 <a:spcPts val="0"/>
               </a:spcBef>
@@ -6068,69 +6220,37 @@
               <a:buNone/>
             </a:pPr>
             <a:r>
-              <a:rPr lang="en"/>
-              <a:t>Project Title</a:t>
+              <a:rPr lang="en-US" dirty="0"/>
+              <a:t>Nerd Trivia</a:t>
             </a:r>
-            <a:endParaRPr/>
           </a:p>
         </p:txBody>
       </p:sp>
       <p:sp>
         <p:nvSpPr>
-          <p:cNvPr id="55" name="Google Shape;55;p13"/>
-          <p:cNvSpPr txBox="1"/>
+          <p:cNvPr id="3" name="Subtitle 2">
+            <a:extLst>
+              <a:ext uri="{FF2B5EF4-FFF2-40B4-BE49-F238E27FC236}">
+                <a16:creationId xmlns:a16="http://schemas.microsoft.com/office/drawing/2014/main" id="{1ED5690E-1B1B-6D60-F920-523E735F77A2}"/>
+              </a:ext>
+            </a:extLst>
+          </p:cNvPr>
+          <p:cNvSpPr>
+            <a:spLocks noGrp="1"/>
+          </p:cNvSpPr>
           <p:nvPr>
-            <p:ph idx="1" type="subTitle"/>
+            <p:ph type="subTitle" idx="1"/>
           </p:nvPr>
         </p:nvSpPr>
-        <p:spPr>
-          <a:xfrm>
-            <a:off x="311700" y="2834125"/>
-            <a:ext cx="8520600" cy="792600"/>
-          </a:xfrm>
-          <a:prstGeom prst="rect">
-            <a:avLst/>
-          </a:prstGeom>
-        </p:spPr>
+        <p:spPr/>
         <p:txBody>
-          <a:bodyPr anchorCtr="0" anchor="t" bIns="91425" lIns="91425" spcFirstLastPara="1" rIns="91425" wrap="square" tIns="91425">
-            <a:noAutofit/>
-          </a:bodyPr>
+          <a:bodyPr/>
           <a:lstStyle/>
           <a:p>
-            <a:pPr indent="0" lvl="0" marL="0" rtl="0" algn="ctr">
-              <a:spcBef>
-                <a:spcPts val="0"/>
-              </a:spcBef>
-              <a:spcAft>
-                <a:spcPts val="0"/>
-              </a:spcAft>
-              <a:buNone/>
-            </a:pPr>
             <a:r>
-              <a:rPr lang="en">
-                <a:solidFill>
-                  <a:srgbClr val="FFFFFF"/>
-                </a:solidFill>
-                <a:highlight>
-                  <a:srgbClr val="FF0000"/>
-                </a:highlight>
-              </a:rPr>
-              <a:t>MAKE A COPY!</a:t>
+              <a:rPr lang="en-US" dirty="0"/>
+              <a:t>Challenge yourself and learn!</a:t>
             </a:r>
-            <a:r>
-              <a:rPr lang="en">
-                <a:highlight>
-                  <a:srgbClr val="FFFF00"/>
-                </a:highlight>
-              </a:rPr>
-              <a:t> DO NOT REQUEST EDIT ACCESS</a:t>
-            </a:r>
-            <a:endParaRPr>
-              <a:highlight>
-                <a:srgbClr val="FFFF00"/>
-              </a:highlight>
-            </a:endParaRPr>
           </a:p>
         </p:txBody>
       </p:sp>
@@ -6143,11 +6263,11 @@
 </file>
 
 <file path=ppt/slides/slide2.xml><?xml version="1.0" encoding="utf-8"?>
-<p:sld xmlns:a="http://schemas.openxmlformats.org/drawingml/2006/main" xmlns:r="http://schemas.openxmlformats.org/officeDocument/2006/relationships" xmlns:mc="http://schemas.openxmlformats.org/markup-compatibility/2006" xmlns:mv="urn:schemas-microsoft-com:mac:vml" xmlns:p="http://schemas.openxmlformats.org/presentationml/2006/main" xmlns:c="http://schemas.openxmlformats.org/drawingml/2006/chart" xmlns:dgm="http://schemas.openxmlformats.org/drawingml/2006/diagram" xmlns:o="urn:schemas-microsoft-com:office:office" xmlns:v="urn:schemas-microsoft-com:vml" xmlns:pvml="urn:schemas-microsoft-com:office:powerpoint" xmlns:com="http://schemas.openxmlformats.org/drawingml/2006/compatibility" xmlns:p14="http://schemas.microsoft.com/office/powerpoint/2010/main" xmlns:p15="http://schemas.microsoft.com/office/powerpoint/2012/main" xmlns:ahyp="http://schemas.microsoft.com/office/drawing/2018/hyperlinkcolor">
+<p:sld xmlns:a="http://schemas.openxmlformats.org/drawingml/2006/main" xmlns:r="http://schemas.openxmlformats.org/officeDocument/2006/relationships" xmlns:p="http://schemas.openxmlformats.org/presentationml/2006/main">
   <p:cSld>
     <p:spTree>
       <p:nvGrpSpPr>
-        <p:cNvPr id="59" name="Shape 59"/>
+        <p:cNvPr id="1" name="Shape 59"/>
         <p:cNvGrpSpPr/>
         <p:nvPr/>
       </p:nvGrpSpPr>
@@ -6162,7 +6282,9 @@
       <p:sp>
         <p:nvSpPr>
           <p:cNvPr id="60" name="Google Shape;60;p14"/>
-          <p:cNvSpPr txBox="1"/>
+          <p:cNvSpPr txBox="1">
+            <a:spLocks noGrp="1"/>
+          </p:cNvSpPr>
           <p:nvPr>
             <p:ph type="title"/>
           </p:nvPr>
@@ -6177,12 +6299,12 @@
           </a:prstGeom>
         </p:spPr>
         <p:txBody>
-          <a:bodyPr anchorCtr="0" anchor="ctr" bIns="91425" lIns="91425" spcFirstLastPara="1" rIns="91425" wrap="square" tIns="91425">
+          <a:bodyPr spcFirstLastPara="1" wrap="square" lIns="91425" tIns="91425" rIns="91425" bIns="91425" anchor="ctr" anchorCtr="0">
             <a:noAutofit/>
           </a:bodyPr>
           <a:lstStyle/>
           <a:p>
-            <a:pPr indent="0" lvl="0" marL="0" rtl="0" algn="ctr">
+            <a:pPr marL="0" lvl="0" indent="0" algn="ctr" rtl="0">
               <a:spcBef>
                 <a:spcPts val="0"/>
               </a:spcBef>
@@ -6208,11 +6330,11 @@
 </file>
 
 <file path=ppt/slides/slide3.xml><?xml version="1.0" encoding="utf-8"?>
-<p:sld xmlns:a="http://schemas.openxmlformats.org/drawingml/2006/main" xmlns:r="http://schemas.openxmlformats.org/officeDocument/2006/relationships" xmlns:mc="http://schemas.openxmlformats.org/markup-compatibility/2006" xmlns:mv="urn:schemas-microsoft-com:mac:vml" xmlns:p="http://schemas.openxmlformats.org/presentationml/2006/main" xmlns:c="http://schemas.openxmlformats.org/drawingml/2006/chart" xmlns:dgm="http://schemas.openxmlformats.org/drawingml/2006/diagram" xmlns:o="urn:schemas-microsoft-com:office:office" xmlns:v="urn:schemas-microsoft-com:vml" xmlns:pvml="urn:schemas-microsoft-com:office:powerpoint" xmlns:com="http://schemas.openxmlformats.org/drawingml/2006/compatibility" xmlns:p14="http://schemas.microsoft.com/office/powerpoint/2010/main" xmlns:p15="http://schemas.microsoft.com/office/powerpoint/2012/main" xmlns:ahyp="http://schemas.microsoft.com/office/drawing/2018/hyperlinkcolor">
+<p:sld xmlns:a="http://schemas.openxmlformats.org/drawingml/2006/main" xmlns:r="http://schemas.openxmlformats.org/officeDocument/2006/relationships" xmlns:p="http://schemas.openxmlformats.org/presentationml/2006/main">
   <p:cSld>
     <p:spTree>
       <p:nvGrpSpPr>
-        <p:cNvPr id="64" name="Shape 64"/>
+        <p:cNvPr id="1" name="Shape 64"/>
         <p:cNvGrpSpPr/>
         <p:nvPr/>
       </p:nvGrpSpPr>
@@ -6227,7 +6349,9 @@
       <p:sp>
         <p:nvSpPr>
           <p:cNvPr id="65" name="Google Shape;65;p15"/>
-          <p:cNvSpPr txBox="1"/>
+          <p:cNvSpPr txBox="1">
+            <a:spLocks noGrp="1"/>
+          </p:cNvSpPr>
           <p:nvPr>
             <p:ph type="title"/>
           </p:nvPr>
@@ -6242,12 +6366,12 @@
           </a:prstGeom>
         </p:spPr>
         <p:txBody>
-          <a:bodyPr anchorCtr="0" anchor="t" bIns="91425" lIns="91425" spcFirstLastPara="1" rIns="91425" wrap="square" tIns="91425">
+          <a:bodyPr spcFirstLastPara="1" wrap="square" lIns="91425" tIns="91425" rIns="91425" bIns="91425" anchor="t" anchorCtr="0">
             <a:noAutofit/>
           </a:bodyPr>
           <a:lstStyle/>
           <a:p>
-            <a:pPr indent="0" lvl="0" marL="0" rtl="0" algn="l">
+            <a:pPr marL="0" lvl="0" indent="0" algn="l" rtl="0">
               <a:spcBef>
                 <a:spcPts val="0"/>
               </a:spcBef>
@@ -6257,19 +6381,21 @@
               <a:buNone/>
             </a:pPr>
             <a:r>
-              <a:rPr lang="en"/>
+              <a:rPr lang="en" dirty="0"/>
               <a:t>Concept</a:t>
             </a:r>
-            <a:endParaRPr/>
+            <a:endParaRPr dirty="0"/>
           </a:p>
         </p:txBody>
       </p:sp>
       <p:sp>
         <p:nvSpPr>
           <p:cNvPr id="66" name="Google Shape;66;p15"/>
-          <p:cNvSpPr txBox="1"/>
+          <p:cNvSpPr txBox="1">
+            <a:spLocks noGrp="1"/>
+          </p:cNvSpPr>
           <p:nvPr>
-            <p:ph idx="1" type="body"/>
+            <p:ph type="body" idx="1"/>
           </p:nvPr>
         </p:nvSpPr>
         <p:spPr>
@@ -6282,12 +6408,12 @@
           </a:prstGeom>
         </p:spPr>
         <p:txBody>
-          <a:bodyPr anchorCtr="0" anchor="t" bIns="91425" lIns="91425" spcFirstLastPara="1" rIns="91425" wrap="square" tIns="91425">
+          <a:bodyPr spcFirstLastPara="1" wrap="square" lIns="91425" tIns="91425" rIns="91425" bIns="91425" anchor="t" anchorCtr="0">
             <a:noAutofit/>
           </a:bodyPr>
           <a:lstStyle/>
           <a:p>
-            <a:pPr indent="-342900" lvl="0" marL="457200" rtl="0" algn="l">
+            <a:pPr marL="457200" lvl="0" indent="-342900" algn="l" rtl="0">
               <a:spcBef>
                 <a:spcPts val="0"/>
               </a:spcBef>
@@ -6298,13 +6424,17 @@
               <a:buChar char="●"/>
             </a:pPr>
             <a:r>
-              <a:rPr lang="en"/>
-              <a:t>Description</a:t>
+              <a:rPr lang="en" dirty="0"/>
+              <a:t>The </a:t>
             </a:r>
-            <a:endParaRPr/>
+            <a:r>
+              <a:rPr lang="en-US" dirty="0"/>
+              <a:t>Nerd Trivia game is a web application that presents the user with 20 randomized multiple-choice questions on the subject of general video games. The user enters their name for personalization. Each question has a points rating weight according to the difficulty. After completing the questions, the final score is displayed on a summary screen.</a:t>
+            </a:r>
+            <a:endParaRPr dirty="0"/>
           </a:p>
           <a:p>
-            <a:pPr indent="-342900" lvl="0" marL="457200" rtl="0" algn="l">
+            <a:pPr marL="457200" lvl="0" indent="-342900" algn="l" rtl="0">
               <a:spcBef>
                 <a:spcPts val="0"/>
               </a:spcBef>
@@ -6315,13 +6445,13 @@
               <a:buChar char="●"/>
             </a:pPr>
             <a:r>
-              <a:rPr lang="en"/>
-              <a:t>Motivation for development?</a:t>
+              <a:rPr lang="en-US" dirty="0"/>
+              <a:t>Trivia games like this are a great way to compare your knowledge against others, and often a way to learn more than when you started.</a:t>
             </a:r>
-            <a:endParaRPr/>
+            <a:endParaRPr dirty="0"/>
           </a:p>
           <a:p>
-            <a:pPr indent="-342900" lvl="0" marL="457200" rtl="0" algn="l">
+            <a:pPr marL="457200" lvl="0" indent="-342900" algn="l" rtl="0">
               <a:spcBef>
                 <a:spcPts val="0"/>
               </a:spcBef>
@@ -6332,10 +6462,48 @@
               <a:buChar char="●"/>
             </a:pPr>
             <a:r>
-              <a:rPr lang="en"/>
-              <a:t>User story</a:t>
+              <a:rPr lang="en-US" dirty="0"/>
+              <a:t>User story:</a:t>
             </a:r>
-            <a:endParaRPr/>
+          </a:p>
+          <a:p>
+            <a:pPr marL="571500" lvl="1" indent="0">
+              <a:spcBef>
+                <a:spcPts val="0"/>
+              </a:spcBef>
+              <a:buSzPts val="1800"/>
+              <a:buNone/>
+            </a:pPr>
+            <a:r>
+              <a:rPr lang="en-US" dirty="0"/>
+              <a:t>AS A user</a:t>
+            </a:r>
+          </a:p>
+          <a:p>
+            <a:pPr marL="571500" lvl="1" indent="0">
+              <a:spcBef>
+                <a:spcPts val="0"/>
+              </a:spcBef>
+              <a:buSzPts val="1800"/>
+              <a:buNone/>
+            </a:pPr>
+            <a:r>
+              <a:rPr lang="en-US" dirty="0"/>
+              <a:t>I WANT to play a quiz game</a:t>
+            </a:r>
+          </a:p>
+          <a:p>
+            <a:pPr marL="571500" lvl="1" indent="0">
+              <a:spcBef>
+                <a:spcPts val="0"/>
+              </a:spcBef>
+              <a:buSzPts val="1800"/>
+              <a:buNone/>
+            </a:pPr>
+            <a:r>
+              <a:rPr lang="en-US" dirty="0"/>
+              <a:t>SO THAT I can test my knowledge of video games</a:t>
+            </a:r>
           </a:p>
         </p:txBody>
       </p:sp>
@@ -6348,11 +6516,11 @@
 </file>
 
 <file path=ppt/slides/slide4.xml><?xml version="1.0" encoding="utf-8"?>
-<p:sld xmlns:a="http://schemas.openxmlformats.org/drawingml/2006/main" xmlns:r="http://schemas.openxmlformats.org/officeDocument/2006/relationships" xmlns:mc="http://schemas.openxmlformats.org/markup-compatibility/2006" xmlns:mv="urn:schemas-microsoft-com:mac:vml" xmlns:p="http://schemas.openxmlformats.org/presentationml/2006/main" xmlns:c="http://schemas.openxmlformats.org/drawingml/2006/chart" xmlns:dgm="http://schemas.openxmlformats.org/drawingml/2006/diagram" xmlns:o="urn:schemas-microsoft-com:office:office" xmlns:v="urn:schemas-microsoft-com:vml" xmlns:pvml="urn:schemas-microsoft-com:office:powerpoint" xmlns:com="http://schemas.openxmlformats.org/drawingml/2006/compatibility" xmlns:p14="http://schemas.microsoft.com/office/powerpoint/2010/main" xmlns:p15="http://schemas.microsoft.com/office/powerpoint/2012/main" xmlns:ahyp="http://schemas.microsoft.com/office/drawing/2018/hyperlinkcolor">
+<p:sld xmlns:a="http://schemas.openxmlformats.org/drawingml/2006/main" xmlns:r="http://schemas.openxmlformats.org/officeDocument/2006/relationships" xmlns:p="http://schemas.openxmlformats.org/presentationml/2006/main">
   <p:cSld>
     <p:spTree>
       <p:nvGrpSpPr>
-        <p:cNvPr id="70" name="Shape 70"/>
+        <p:cNvPr id="1" name="Shape 70"/>
         <p:cNvGrpSpPr/>
         <p:nvPr/>
       </p:nvGrpSpPr>
@@ -6367,7 +6535,9 @@
       <p:sp>
         <p:nvSpPr>
           <p:cNvPr id="71" name="Google Shape;71;p16"/>
-          <p:cNvSpPr txBox="1"/>
+          <p:cNvSpPr txBox="1">
+            <a:spLocks noGrp="1"/>
+          </p:cNvSpPr>
           <p:nvPr>
             <p:ph type="title"/>
           </p:nvPr>
@@ -6382,12 +6552,12 @@
           </a:prstGeom>
         </p:spPr>
         <p:txBody>
-          <a:bodyPr anchorCtr="0" anchor="t" bIns="91425" lIns="91425" spcFirstLastPara="1" rIns="91425" wrap="square" tIns="91425">
+          <a:bodyPr spcFirstLastPara="1" wrap="square" lIns="91425" tIns="91425" rIns="91425" bIns="91425" anchor="t" anchorCtr="0">
             <a:noAutofit/>
           </a:bodyPr>
           <a:lstStyle/>
           <a:p>
-            <a:pPr indent="0" lvl="0" marL="0" rtl="0" algn="l">
+            <a:pPr marL="0" lvl="0" indent="0" algn="l" rtl="0">
               <a:spcBef>
                 <a:spcPts val="0"/>
               </a:spcBef>
@@ -6407,9 +6577,11 @@
       <p:sp>
         <p:nvSpPr>
           <p:cNvPr id="72" name="Google Shape;72;p16"/>
-          <p:cNvSpPr txBox="1"/>
+          <p:cNvSpPr txBox="1">
+            <a:spLocks noGrp="1"/>
+          </p:cNvSpPr>
           <p:nvPr>
-            <p:ph idx="1" type="body"/>
+            <p:ph type="body" idx="1"/>
           </p:nvPr>
         </p:nvSpPr>
         <p:spPr>
@@ -6422,12 +6594,12 @@
           </a:prstGeom>
         </p:spPr>
         <p:txBody>
-          <a:bodyPr anchorCtr="0" anchor="t" bIns="91425" lIns="91425" spcFirstLastPara="1" rIns="91425" wrap="square" tIns="91425">
+          <a:bodyPr spcFirstLastPara="1" wrap="square" lIns="91425" tIns="91425" rIns="91425" bIns="91425" anchor="t" anchorCtr="0">
             <a:noAutofit/>
           </a:bodyPr>
           <a:lstStyle/>
           <a:p>
-            <a:pPr indent="-342900" lvl="0" marL="457200" rtl="0" algn="l">
+            <a:pPr marL="457200" lvl="0" indent="-342900" algn="l" rtl="0">
               <a:spcBef>
                 <a:spcPts val="0"/>
               </a:spcBef>
@@ -6438,61 +6610,158 @@
               <a:buChar char="●"/>
             </a:pPr>
             <a:r>
-              <a:rPr lang="en"/>
-              <a:t>Technologies used</a:t>
+              <a:rPr lang="en" dirty="0"/>
+              <a:t>Technologies used include:</a:t>
             </a:r>
-            <a:endParaRPr/>
           </a:p>
           <a:p>
-            <a:pPr indent="-342900" lvl="0" marL="457200" rtl="0" algn="l">
-              <a:spcBef>
-                <a:spcPts val="0"/>
-              </a:spcBef>
-              <a:spcAft>
-                <a:spcPts val="0"/>
-              </a:spcAft>
+            <a:pPr lvl="1" indent="-342900">
+              <a:spcBef>
+                <a:spcPts val="0"/>
+              </a:spcBef>
               <a:buSzPts val="1800"/>
               <a:buChar char="●"/>
             </a:pPr>
             <a:r>
-              <a:rPr lang="en"/>
-              <a:t>Breakdown of tasks and roles</a:t>
+              <a:rPr lang="en-US" dirty="0"/>
+              <a:t>HTML</a:t>
             </a:r>
-            <a:endParaRPr/>
           </a:p>
           <a:p>
-            <a:pPr indent="-342900" lvl="0" marL="457200" rtl="0" algn="l">
-              <a:spcBef>
-                <a:spcPts val="0"/>
-              </a:spcBef>
-              <a:spcAft>
-                <a:spcPts val="0"/>
-              </a:spcAft>
+            <a:pPr lvl="1" indent="-342900">
+              <a:spcBef>
+                <a:spcPts val="0"/>
+              </a:spcBef>
               <a:buSzPts val="1800"/>
               <a:buChar char="●"/>
             </a:pPr>
             <a:r>
-              <a:rPr lang="en"/>
-              <a:t>Challenges</a:t>
+              <a:rPr lang="en-US" dirty="0"/>
+              <a:t>The tailwind CSS Framework, implementing a non-native modal dialog</a:t>
             </a:r>
-            <a:endParaRPr/>
           </a:p>
           <a:p>
-            <a:pPr indent="-342900" lvl="0" marL="457200" rtl="0" algn="l">
-              <a:spcBef>
-                <a:spcPts val="0"/>
-              </a:spcBef>
-              <a:spcAft>
-                <a:spcPts val="0"/>
-              </a:spcAft>
+            <a:pPr lvl="1" indent="-342900">
+              <a:spcBef>
+                <a:spcPts val="0"/>
+              </a:spcBef>
               <a:buSzPts val="1800"/>
               <a:buChar char="●"/>
             </a:pPr>
             <a:r>
-              <a:rPr lang="en"/>
-              <a:t>Successes</a:t>
+              <a:rPr lang="en-US" dirty="0"/>
+              <a:t>JavaScript, used to store and retrieve the data in client-side persistent storage</a:t>
             </a:r>
-            <a:endParaRPr/>
+          </a:p>
+          <a:p>
+            <a:pPr lvl="1" indent="-342900">
+              <a:spcBef>
+                <a:spcPts val="0"/>
+              </a:spcBef>
+              <a:buSzPts val="1800"/>
+              <a:buChar char="●"/>
+            </a:pPr>
+            <a:r>
+              <a:rPr lang="en-US" dirty="0"/>
+              <a:t>GitHub Pages to host the site</a:t>
+            </a:r>
+          </a:p>
+          <a:p>
+            <a:pPr marL="457200" lvl="0" indent="-342900" algn="l" rtl="0">
+              <a:spcBef>
+                <a:spcPts val="0"/>
+              </a:spcBef>
+              <a:spcAft>
+                <a:spcPts val="0"/>
+              </a:spcAft>
+              <a:buSzPts val="1800"/>
+              <a:buChar char="●"/>
+            </a:pPr>
+            <a:r>
+              <a:rPr lang="en" dirty="0"/>
+              <a:t>Breakdown of tasks and roles: TODO (tasks)</a:t>
+            </a:r>
+          </a:p>
+          <a:p>
+            <a:pPr lvl="1" indent="-342900">
+              <a:spcBef>
+                <a:spcPts val="0"/>
+              </a:spcBef>
+              <a:buSzPts val="1800"/>
+              <a:buChar char="●"/>
+            </a:pPr>
+            <a:r>
+              <a:rPr lang="en-US" dirty="0"/>
+              <a:t>Html: </a:t>
+            </a:r>
+            <a:r>
+              <a:rPr lang="en-US" dirty="0" err="1"/>
+              <a:t>Elhadj</a:t>
+            </a:r>
+            <a:r>
+              <a:rPr lang="en-US" dirty="0"/>
+              <a:t> Bah, River Hagen</a:t>
+            </a:r>
+          </a:p>
+          <a:p>
+            <a:pPr lvl="1" indent="-342900">
+              <a:spcBef>
+                <a:spcPts val="0"/>
+              </a:spcBef>
+              <a:buSzPts val="1800"/>
+              <a:buChar char="●"/>
+            </a:pPr>
+            <a:r>
+              <a:rPr lang="en-US" dirty="0"/>
+              <a:t>CSS Framework: Dillon Duran</a:t>
+            </a:r>
+          </a:p>
+          <a:p>
+            <a:pPr lvl="1" indent="-342900">
+              <a:spcBef>
+                <a:spcPts val="0"/>
+              </a:spcBef>
+              <a:buSzPts val="1800"/>
+              <a:buChar char="●"/>
+            </a:pPr>
+            <a:r>
+              <a:rPr lang="en-US" dirty="0"/>
+              <a:t>JavaScript: Clint, Jones, Robert Grabowski</a:t>
+            </a:r>
+          </a:p>
+          <a:p>
+            <a:pPr marL="457200" lvl="0" indent="-342900" algn="l" rtl="0">
+              <a:spcBef>
+                <a:spcPts val="0"/>
+              </a:spcBef>
+              <a:spcAft>
+                <a:spcPts val="0"/>
+              </a:spcAft>
+              <a:buSzPts val="1800"/>
+              <a:buChar char="●"/>
+            </a:pPr>
+            <a:r>
+              <a:rPr lang="en" dirty="0"/>
+              <a:t>Challenges: TODO</a:t>
+            </a:r>
+            <a:endParaRPr dirty="0"/>
+          </a:p>
+          <a:p>
+            <a:pPr marL="457200" lvl="0" indent="-342900" algn="l" rtl="0">
+              <a:spcBef>
+                <a:spcPts val="0"/>
+              </a:spcBef>
+              <a:spcAft>
+                <a:spcPts val="0"/>
+              </a:spcAft>
+              <a:buSzPts val="1800"/>
+              <a:buChar char="●"/>
+            </a:pPr>
+            <a:r>
+              <a:rPr lang="en" dirty="0"/>
+              <a:t>Successes : TODO</a:t>
+            </a:r>
+            <a:endParaRPr dirty="0"/>
           </a:p>
         </p:txBody>
       </p:sp>
@@ -6505,11 +6774,11 @@
 </file>
 
 <file path=ppt/slides/slide5.xml><?xml version="1.0" encoding="utf-8"?>
-<p:sld xmlns:a="http://schemas.openxmlformats.org/drawingml/2006/main" xmlns:r="http://schemas.openxmlformats.org/officeDocument/2006/relationships" xmlns:mc="http://schemas.openxmlformats.org/markup-compatibility/2006" xmlns:mv="urn:schemas-microsoft-com:mac:vml" xmlns:p="http://schemas.openxmlformats.org/presentationml/2006/main" xmlns:c="http://schemas.openxmlformats.org/drawingml/2006/chart" xmlns:dgm="http://schemas.openxmlformats.org/drawingml/2006/diagram" xmlns:o="urn:schemas-microsoft-com:office:office" xmlns:v="urn:schemas-microsoft-com:vml" xmlns:pvml="urn:schemas-microsoft-com:office:powerpoint" xmlns:com="http://schemas.openxmlformats.org/drawingml/2006/compatibility" xmlns:p14="http://schemas.microsoft.com/office/powerpoint/2010/main" xmlns:p15="http://schemas.microsoft.com/office/powerpoint/2012/main" xmlns:ahyp="http://schemas.microsoft.com/office/drawing/2018/hyperlinkcolor">
+<p:sld xmlns:a="http://schemas.openxmlformats.org/drawingml/2006/main" xmlns:r="http://schemas.openxmlformats.org/officeDocument/2006/relationships" xmlns:p="http://schemas.openxmlformats.org/presentationml/2006/main">
   <p:cSld>
     <p:spTree>
       <p:nvGrpSpPr>
-        <p:cNvPr id="76" name="Shape 76"/>
+        <p:cNvPr id="1" name="Shape 76"/>
         <p:cNvGrpSpPr/>
         <p:nvPr/>
       </p:nvGrpSpPr>
@@ -6524,7 +6793,9 @@
       <p:sp>
         <p:nvSpPr>
           <p:cNvPr id="77" name="Google Shape;77;p17"/>
-          <p:cNvSpPr txBox="1"/>
+          <p:cNvSpPr txBox="1">
+            <a:spLocks noGrp="1"/>
+          </p:cNvSpPr>
           <p:nvPr>
             <p:ph type="title"/>
           </p:nvPr>
@@ -6539,12 +6810,12 @@
           </a:prstGeom>
         </p:spPr>
         <p:txBody>
-          <a:bodyPr anchorCtr="0" anchor="ctr" bIns="91425" lIns="91425" spcFirstLastPara="1" rIns="91425" wrap="square" tIns="91425">
+          <a:bodyPr spcFirstLastPara="1" wrap="square" lIns="91425" tIns="91425" rIns="91425" bIns="91425" anchor="ctr" anchorCtr="0">
             <a:noAutofit/>
           </a:bodyPr>
           <a:lstStyle/>
           <a:p>
-            <a:pPr indent="0" lvl="0" marL="0" rtl="0" algn="ctr">
+            <a:pPr marL="0" lvl="0" indent="0" algn="ctr" rtl="0">
               <a:spcBef>
                 <a:spcPts val="0"/>
               </a:spcBef>
@@ -6570,11 +6841,11 @@
 </file>
 
 <file path=ppt/slides/slide6.xml><?xml version="1.0" encoding="utf-8"?>
-<p:sld xmlns:a="http://schemas.openxmlformats.org/drawingml/2006/main" xmlns:r="http://schemas.openxmlformats.org/officeDocument/2006/relationships" xmlns:mc="http://schemas.openxmlformats.org/markup-compatibility/2006" xmlns:mv="urn:schemas-microsoft-com:mac:vml" xmlns:p="http://schemas.openxmlformats.org/presentationml/2006/main" xmlns:c="http://schemas.openxmlformats.org/drawingml/2006/chart" xmlns:dgm="http://schemas.openxmlformats.org/drawingml/2006/diagram" xmlns:o="urn:schemas-microsoft-com:office:office" xmlns:v="urn:schemas-microsoft-com:vml" xmlns:pvml="urn:schemas-microsoft-com:office:powerpoint" xmlns:com="http://schemas.openxmlformats.org/drawingml/2006/compatibility" xmlns:p14="http://schemas.microsoft.com/office/powerpoint/2010/main" xmlns:p15="http://schemas.microsoft.com/office/powerpoint/2012/main" xmlns:ahyp="http://schemas.microsoft.com/office/drawing/2018/hyperlinkcolor">
+<p:sld xmlns:a="http://schemas.openxmlformats.org/drawingml/2006/main" xmlns:r="http://schemas.openxmlformats.org/officeDocument/2006/relationships" xmlns:p="http://schemas.openxmlformats.org/presentationml/2006/main">
   <p:cSld>
     <p:spTree>
       <p:nvGrpSpPr>
-        <p:cNvPr id="81" name="Shape 81"/>
+        <p:cNvPr id="1" name="Shape 81"/>
         <p:cNvGrpSpPr/>
         <p:nvPr/>
       </p:nvGrpSpPr>
@@ -6589,7 +6860,9 @@
       <p:sp>
         <p:nvSpPr>
           <p:cNvPr id="82" name="Google Shape;82;p18"/>
-          <p:cNvSpPr txBox="1"/>
+          <p:cNvSpPr txBox="1">
+            <a:spLocks noGrp="1"/>
+          </p:cNvSpPr>
           <p:nvPr>
             <p:ph type="title"/>
           </p:nvPr>
@@ -6604,12 +6877,12 @@
           </a:prstGeom>
         </p:spPr>
         <p:txBody>
-          <a:bodyPr anchorCtr="0" anchor="t" bIns="91425" lIns="91425" spcFirstLastPara="1" rIns="91425" wrap="square" tIns="91425">
+          <a:bodyPr spcFirstLastPara="1" wrap="square" lIns="91425" tIns="91425" rIns="91425" bIns="91425" anchor="t" anchorCtr="0">
             <a:noAutofit/>
           </a:bodyPr>
           <a:lstStyle/>
           <a:p>
-            <a:pPr indent="0" lvl="0" marL="0" rtl="0" algn="l">
+            <a:pPr marL="0" lvl="0" indent="0" algn="l" rtl="0">
               <a:spcBef>
                 <a:spcPts val="0"/>
               </a:spcBef>
@@ -6629,9 +6902,11 @@
       <p:sp>
         <p:nvSpPr>
           <p:cNvPr id="83" name="Google Shape;83;p18"/>
-          <p:cNvSpPr txBox="1"/>
+          <p:cNvSpPr txBox="1">
+            <a:spLocks noGrp="1"/>
+          </p:cNvSpPr>
           <p:nvPr>
-            <p:ph idx="1" type="body"/>
+            <p:ph type="body" idx="1"/>
           </p:nvPr>
         </p:nvSpPr>
         <p:spPr>
@@ -6644,24 +6919,70 @@
           </a:prstGeom>
         </p:spPr>
         <p:txBody>
-          <a:bodyPr anchorCtr="0" anchor="t" bIns="91425" lIns="91425" spcFirstLastPara="1" rIns="91425" wrap="square" tIns="91425">
+          <a:bodyPr spcFirstLastPara="1" wrap="square" lIns="91425" tIns="91425" rIns="91425" bIns="91425" anchor="t" anchorCtr="0">
             <a:noAutofit/>
           </a:bodyPr>
           <a:lstStyle/>
           <a:p>
-            <a:pPr indent="0" lvl="0" marL="0" rtl="0" algn="l">
+            <a:pPr marL="285750" lvl="0" indent="-285750" algn="l" rtl="0">
               <a:spcBef>
                 <a:spcPts val="0"/>
               </a:spcBef>
               <a:spcAft>
                 <a:spcPts val="1600"/>
               </a:spcAft>
-              <a:buNone/>
+              <a:buFontTx/>
+              <a:buChar char="-"/>
             </a:pPr>
             <a:r>
-              <a:t/>
+              <a:rPr lang="en-US" dirty="0"/>
+              <a:t>TODO</a:t>
             </a:r>
-            <a:endParaRPr/>
+          </a:p>
+          <a:p>
+            <a:pPr marL="285750" lvl="0" indent="-285750" algn="l" rtl="0">
+              <a:spcBef>
+                <a:spcPts val="0"/>
+              </a:spcBef>
+              <a:spcAft>
+                <a:spcPts val="1600"/>
+              </a:spcAft>
+              <a:buFontTx/>
+              <a:buChar char="-"/>
+            </a:pPr>
+            <a:r>
+              <a:rPr lang="en-US" dirty="0"/>
+              <a:t>Support additional subjects, expand the number of questions, bonus round, track score ranking for multiple players for a top score</a:t>
+            </a:r>
+          </a:p>
+          <a:p>
+            <a:pPr marL="285750" lvl="0" indent="-285750" algn="l" rtl="0">
+              <a:spcBef>
+                <a:spcPts val="0"/>
+              </a:spcBef>
+              <a:spcAft>
+                <a:spcPts val="1600"/>
+              </a:spcAft>
+              <a:buFontTx/>
+              <a:buChar char="-"/>
+            </a:pPr>
+            <a:r>
+              <a:rPr lang="en-US" dirty="0"/>
+              <a:t>Store questions, answers, username and their highest score ranking in a database</a:t>
+            </a:r>
+          </a:p>
+          <a:p>
+            <a:pPr marL="285750" lvl="0" indent="-285750" algn="l" rtl="0">
+              <a:spcBef>
+                <a:spcPts val="0"/>
+              </a:spcBef>
+              <a:spcAft>
+                <a:spcPts val="1600"/>
+              </a:spcAft>
+              <a:buFontTx/>
+              <a:buChar char="-"/>
+            </a:pPr>
+            <a:endParaRPr lang="en-US" dirty="0"/>
           </a:p>
         </p:txBody>
       </p:sp>
@@ -6674,11 +6995,11 @@
 </file>
 
 <file path=ppt/slides/slide7.xml><?xml version="1.0" encoding="utf-8"?>
-<p:sld xmlns:a="http://schemas.openxmlformats.org/drawingml/2006/main" xmlns:r="http://schemas.openxmlformats.org/officeDocument/2006/relationships" xmlns:mc="http://schemas.openxmlformats.org/markup-compatibility/2006" xmlns:mv="urn:schemas-microsoft-com:mac:vml" xmlns:p="http://schemas.openxmlformats.org/presentationml/2006/main" xmlns:c="http://schemas.openxmlformats.org/drawingml/2006/chart" xmlns:dgm="http://schemas.openxmlformats.org/drawingml/2006/diagram" xmlns:o="urn:schemas-microsoft-com:office:office" xmlns:v="urn:schemas-microsoft-com:vml" xmlns:pvml="urn:schemas-microsoft-com:office:powerpoint" xmlns:com="http://schemas.openxmlformats.org/drawingml/2006/compatibility" xmlns:p14="http://schemas.microsoft.com/office/powerpoint/2010/main" xmlns:p15="http://schemas.microsoft.com/office/powerpoint/2012/main" xmlns:ahyp="http://schemas.microsoft.com/office/drawing/2018/hyperlinkcolor">
+<p:sld xmlns:a="http://schemas.openxmlformats.org/drawingml/2006/main" xmlns:r="http://schemas.openxmlformats.org/officeDocument/2006/relationships" xmlns:p="http://schemas.openxmlformats.org/presentationml/2006/main">
   <p:cSld>
     <p:spTree>
       <p:nvGrpSpPr>
-        <p:cNvPr id="87" name="Shape 87"/>
+        <p:cNvPr id="1" name="Shape 87"/>
         <p:cNvGrpSpPr/>
         <p:nvPr/>
       </p:nvGrpSpPr>
@@ -6693,7 +7014,9 @@
       <p:sp>
         <p:nvSpPr>
           <p:cNvPr id="88" name="Google Shape;88;p19"/>
-          <p:cNvSpPr txBox="1"/>
+          <p:cNvSpPr txBox="1">
+            <a:spLocks noGrp="1"/>
+          </p:cNvSpPr>
           <p:nvPr>
             <p:ph type="title"/>
           </p:nvPr>
@@ -6708,12 +7031,12 @@
           </a:prstGeom>
         </p:spPr>
         <p:txBody>
-          <a:bodyPr anchorCtr="0" anchor="t" bIns="91425" lIns="91425" spcFirstLastPara="1" rIns="91425" wrap="square" tIns="91425">
+          <a:bodyPr spcFirstLastPara="1" wrap="square" lIns="91425" tIns="91425" rIns="91425" bIns="91425" anchor="t" anchorCtr="0">
             <a:noAutofit/>
           </a:bodyPr>
           <a:lstStyle/>
           <a:p>
-            <a:pPr indent="0" lvl="0" marL="0" rtl="0" algn="l">
+            <a:pPr marL="0" lvl="0" indent="0" algn="l" rtl="0">
               <a:spcBef>
                 <a:spcPts val="0"/>
               </a:spcBef>
@@ -6733,9 +7056,11 @@
       <p:sp>
         <p:nvSpPr>
           <p:cNvPr id="89" name="Google Shape;89;p19"/>
-          <p:cNvSpPr txBox="1"/>
+          <p:cNvSpPr txBox="1">
+            <a:spLocks noGrp="1"/>
+          </p:cNvSpPr>
           <p:nvPr>
-            <p:ph idx="1" type="body"/>
+            <p:ph type="body" idx="1"/>
           </p:nvPr>
         </p:nvSpPr>
         <p:spPr>
@@ -6748,12 +7073,12 @@
           </a:prstGeom>
         </p:spPr>
         <p:txBody>
-          <a:bodyPr anchorCtr="0" anchor="t" bIns="91425" lIns="91425" spcFirstLastPara="1" rIns="91425" wrap="square" tIns="91425">
+          <a:bodyPr spcFirstLastPara="1" wrap="square" lIns="91425" tIns="91425" rIns="91425" bIns="91425" anchor="t" anchorCtr="0">
             <a:noAutofit/>
           </a:bodyPr>
           <a:lstStyle/>
           <a:p>
-            <a:pPr indent="-342900" lvl="0" marL="457200" rtl="0" algn="l">
+            <a:pPr marL="457200" lvl="0" indent="-342900" algn="l" rtl="0">
               <a:spcBef>
                 <a:spcPts val="0"/>
               </a:spcBef>
@@ -6764,13 +7089,13 @@
               <a:buChar char="●"/>
             </a:pPr>
             <a:r>
-              <a:rPr lang="en"/>
-              <a:t>Deployed</a:t>
+              <a:rPr lang="en" dirty="0"/>
+              <a:t>Deployed: TODO</a:t>
             </a:r>
-            <a:endParaRPr/>
+            <a:endParaRPr dirty="0"/>
           </a:p>
           <a:p>
-            <a:pPr indent="-342900" lvl="0" marL="457200" rtl="0" algn="l">
+            <a:pPr marL="457200" lvl="0" indent="-342900" algn="l" rtl="0">
               <a:spcBef>
                 <a:spcPts val="0"/>
               </a:spcBef>
@@ -6781,10 +7106,71 @@
               <a:buChar char="●"/>
             </a:pPr>
             <a:r>
-              <a:rPr lang="en"/>
-              <a:t>GitHub repo</a:t>
+              <a:rPr lang="en" dirty="0"/>
+              <a:t>GitHub repo:</a:t>
             </a:r>
-            <a:endParaRPr/>
+          </a:p>
+          <a:p>
+            <a:pPr lvl="1" indent="-342900">
+              <a:spcBef>
+                <a:spcPts val="0"/>
+              </a:spcBef>
+              <a:buSzPts val="1800"/>
+              <a:buChar char="●"/>
+            </a:pPr>
+            <a:r>
+              <a:rPr lang="en-US" dirty="0"/>
+              <a:t>Home page: </a:t>
+            </a:r>
+            <a:r>
+              <a:rPr lang="en-US" b="0" i="0" u="sng" dirty="0">
+                <a:effectLst/>
+                <a:latin typeface="Slack-Lato"/>
+                <a:hlinkClick r:id="rId3"/>
+              </a:rPr>
+              <a:t>https://github.com/clintsrc/nerd-trivia</a:t>
+            </a:r>
+            <a:endParaRPr lang="en-US" b="0" i="0" u="sng" dirty="0">
+              <a:effectLst/>
+              <a:latin typeface="Slack-Lato"/>
+            </a:endParaRPr>
+          </a:p>
+          <a:p>
+            <a:pPr lvl="1" indent="-342900">
+              <a:spcBef>
+                <a:spcPts val="0"/>
+              </a:spcBef>
+              <a:buSzPts val="1800"/>
+              <a:buFont typeface="Arial"/>
+              <a:buChar char="●"/>
+            </a:pPr>
+            <a:r>
+              <a:rPr lang="en" dirty="0"/>
+              <a:t>Repository:</a:t>
+            </a:r>
+            <a:r>
+              <a:rPr lang="en-US" dirty="0"/>
+              <a:t> </a:t>
+            </a:r>
+            <a:r>
+              <a:rPr lang="en-US" dirty="0" err="1">
+                <a:hlinkClick r:id="rId4"/>
+              </a:rPr>
+              <a:t>git@github.com:clintsrc</a:t>
+            </a:r>
+            <a:r>
+              <a:rPr lang="en-US" dirty="0">
+                <a:hlinkClick r:id="rId4"/>
+              </a:rPr>
+              <a:t>/nerd-</a:t>
+            </a:r>
+            <a:r>
+              <a:rPr lang="en-US" dirty="0" err="1">
+                <a:hlinkClick r:id="rId4"/>
+              </a:rPr>
+              <a:t>trivia.git</a:t>
+            </a:r>
+            <a:endParaRPr lang="en-US" dirty="0"/>
           </a:p>
         </p:txBody>
       </p:sp>
@@ -6797,7 +7183,288 @@
 </file>
 
 <file path=ppt/theme/theme1.xml><?xml version="1.0" encoding="utf-8"?>
-<a:theme xmlns:a="http://schemas.openxmlformats.org/drawingml/2006/main" xmlns:r="http://schemas.openxmlformats.org/officeDocument/2006/relationships">
+<a:theme xmlns:a="http://schemas.openxmlformats.org/drawingml/2006/main" name="Simple Light">
+  <a:themeElements>
+    <a:clrScheme name="Simple Light">
+      <a:dk1>
+        <a:srgbClr val="000000"/>
+      </a:dk1>
+      <a:lt1>
+        <a:srgbClr val="FFFFFF"/>
+      </a:lt1>
+      <a:dk2>
+        <a:srgbClr val="595959"/>
+      </a:dk2>
+      <a:lt2>
+        <a:srgbClr val="EEEEEE"/>
+      </a:lt2>
+      <a:accent1>
+        <a:srgbClr val="FFAB40"/>
+      </a:accent1>
+      <a:accent2>
+        <a:srgbClr val="212121"/>
+      </a:accent2>
+      <a:accent3>
+        <a:srgbClr val="78909C"/>
+      </a:accent3>
+      <a:accent4>
+        <a:srgbClr val="FFAB40"/>
+      </a:accent4>
+      <a:accent5>
+        <a:srgbClr val="0097A7"/>
+      </a:accent5>
+      <a:accent6>
+        <a:srgbClr val="EEFF41"/>
+      </a:accent6>
+      <a:hlink>
+        <a:srgbClr val="0097A7"/>
+      </a:hlink>
+      <a:folHlink>
+        <a:srgbClr val="0097A7"/>
+      </a:folHlink>
+    </a:clrScheme>
+    <a:fontScheme name="Office">
+      <a:majorFont>
+        <a:latin typeface="Arial"/>
+        <a:ea typeface=""/>
+        <a:cs typeface=""/>
+        <a:font script="Jpan" typeface="ＭＳ Ｐゴシック"/>
+        <a:font script="Hang" typeface="맑은 고딕"/>
+        <a:font script="Hans" typeface="宋体"/>
+        <a:font script="Hant" typeface="新細明體"/>
+        <a:font script="Arab" typeface="Times New Roman"/>
+        <a:font script="Hebr" typeface="Times New Roman"/>
+        <a:font script="Thai" typeface="Angsana New"/>
+        <a:font script="Ethi" typeface="Nyala"/>
+        <a:font script="Beng" typeface="Vrinda"/>
+        <a:font script="Gujr" typeface="Shruti"/>
+        <a:font script="Khmr" typeface="MoolBoran"/>
+        <a:font script="Knda" typeface="Tunga"/>
+        <a:font script="Guru" typeface="Raavi"/>
+        <a:font script="Cans" typeface="Euphemia"/>
+        <a:font script="Cher" typeface="Plantagenet Cherokee"/>
+        <a:font script="Yiii" typeface="Microsoft Yi Baiti"/>
+        <a:font script="Tibt" typeface="Microsoft Himalaya"/>
+        <a:font script="Thaa" typeface="MV Boli"/>
+        <a:font script="Deva" typeface="Mangal"/>
+        <a:font script="Telu" typeface="Gautami"/>
+        <a:font script="Taml" typeface="Latha"/>
+        <a:font script="Syrc" typeface="Estrangelo Edessa"/>
+        <a:font script="Orya" typeface="Kalinga"/>
+        <a:font script="Mlym" typeface="Kartika"/>
+        <a:font script="Laoo" typeface="DokChampa"/>
+        <a:font script="Sinh" typeface="Iskoola Pota"/>
+        <a:font script="Mong" typeface="Mongolian Baiti"/>
+        <a:font script="Viet" typeface="Times New Roman"/>
+        <a:font script="Uigh" typeface="Microsoft Uighur"/>
+        <a:font script="Geor" typeface="Sylfaen"/>
+      </a:majorFont>
+      <a:minorFont>
+        <a:latin typeface="Arial"/>
+        <a:ea typeface=""/>
+        <a:cs typeface=""/>
+        <a:font script="Jpan" typeface="ＭＳ Ｐゴシック"/>
+        <a:font script="Hang" typeface="맑은 고딕"/>
+        <a:font script="Hans" typeface="宋体"/>
+        <a:font script="Hant" typeface="新細明體"/>
+        <a:font script="Arab" typeface="Arial"/>
+        <a:font script="Hebr" typeface="Arial"/>
+        <a:font script="Thai" typeface="Cordia New"/>
+        <a:font script="Ethi" typeface="Nyala"/>
+        <a:font script="Beng" typeface="Vrinda"/>
+        <a:font script="Gujr" typeface="Shruti"/>
+        <a:font script="Khmr" typeface="DaunPenh"/>
+        <a:font script="Knda" typeface="Tunga"/>
+        <a:font script="Guru" typeface="Raavi"/>
+        <a:font script="Cans" typeface="Euphemia"/>
+        <a:font script="Cher" typeface="Plantagenet Cherokee"/>
+        <a:font script="Yiii" typeface="Microsoft Yi Baiti"/>
+        <a:font script="Tibt" typeface="Microsoft Himalaya"/>
+        <a:font script="Thaa" typeface="MV Boli"/>
+        <a:font script="Deva" typeface="Mangal"/>
+        <a:font script="Telu" typeface="Gautami"/>
+        <a:font script="Taml" typeface="Latha"/>
+        <a:font script="Syrc" typeface="Estrangelo Edessa"/>
+        <a:font script="Orya" typeface="Kalinga"/>
+        <a:font script="Mlym" typeface="Kartika"/>
+        <a:font script="Laoo" typeface="DokChampa"/>
+        <a:font script="Sinh" typeface="Iskoola Pota"/>
+        <a:font script="Mong" typeface="Mongolian Baiti"/>
+        <a:font script="Viet" typeface="Arial"/>
+        <a:font script="Uigh" typeface="Microsoft Uighur"/>
+        <a:font script="Geor" typeface="Sylfaen"/>
+      </a:minorFont>
+    </a:fontScheme>
+    <a:fmtScheme name="Office">
+      <a:fillStyleLst>
+        <a:solidFill>
+          <a:schemeClr val="phClr"/>
+        </a:solidFill>
+        <a:gradFill rotWithShape="1">
+          <a:gsLst>
+            <a:gs pos="0">
+              <a:schemeClr val="phClr">
+                <a:tint val="50000"/>
+                <a:satMod val="300000"/>
+              </a:schemeClr>
+            </a:gs>
+            <a:gs pos="35000">
+              <a:schemeClr val="phClr">
+                <a:tint val="37000"/>
+                <a:satMod val="300000"/>
+              </a:schemeClr>
+            </a:gs>
+            <a:gs pos="100000">
+              <a:schemeClr val="phClr">
+                <a:tint val="15000"/>
+                <a:satMod val="350000"/>
+              </a:schemeClr>
+            </a:gs>
+          </a:gsLst>
+          <a:lin ang="16200000" scaled="1"/>
+        </a:gradFill>
+        <a:gradFill rotWithShape="1">
+          <a:gsLst>
+            <a:gs pos="0">
+              <a:schemeClr val="phClr">
+                <a:tint val="100000"/>
+                <a:shade val="100000"/>
+                <a:satMod val="130000"/>
+              </a:schemeClr>
+            </a:gs>
+            <a:gs pos="100000">
+              <a:schemeClr val="phClr">
+                <a:tint val="50000"/>
+                <a:shade val="100000"/>
+                <a:satMod val="350000"/>
+              </a:schemeClr>
+            </a:gs>
+          </a:gsLst>
+          <a:lin ang="16200000" scaled="0"/>
+        </a:gradFill>
+      </a:fillStyleLst>
+      <a:lnStyleLst>
+        <a:ln w="9525" cap="flat" cmpd="sng" algn="ctr">
+          <a:solidFill>
+            <a:schemeClr val="phClr">
+              <a:shade val="95000"/>
+              <a:satMod val="105000"/>
+            </a:schemeClr>
+          </a:solidFill>
+          <a:prstDash val="solid"/>
+        </a:ln>
+        <a:ln w="25400" cap="flat" cmpd="sng" algn="ctr">
+          <a:solidFill>
+            <a:schemeClr val="phClr"/>
+          </a:solidFill>
+          <a:prstDash val="solid"/>
+        </a:ln>
+        <a:ln w="38100" cap="flat" cmpd="sng" algn="ctr">
+          <a:solidFill>
+            <a:schemeClr val="phClr"/>
+          </a:solidFill>
+          <a:prstDash val="solid"/>
+        </a:ln>
+      </a:lnStyleLst>
+      <a:effectStyleLst>
+        <a:effectStyle>
+          <a:effectLst>
+            <a:outerShdw blurRad="40000" dist="20000" dir="5400000" rotWithShape="0">
+              <a:srgbClr val="000000">
+                <a:alpha val="38000"/>
+              </a:srgbClr>
+            </a:outerShdw>
+          </a:effectLst>
+        </a:effectStyle>
+        <a:effectStyle>
+          <a:effectLst>
+            <a:outerShdw blurRad="40000" dist="23000" dir="5400000" rotWithShape="0">
+              <a:srgbClr val="000000">
+                <a:alpha val="35000"/>
+              </a:srgbClr>
+            </a:outerShdw>
+          </a:effectLst>
+        </a:effectStyle>
+        <a:effectStyle>
+          <a:effectLst>
+            <a:outerShdw blurRad="40000" dist="23000" dir="5400000" rotWithShape="0">
+              <a:srgbClr val="000000">
+                <a:alpha val="35000"/>
+              </a:srgbClr>
+            </a:outerShdw>
+          </a:effectLst>
+          <a:scene3d>
+            <a:camera prst="orthographicFront">
+              <a:rot lat="0" lon="0" rev="0"/>
+            </a:camera>
+            <a:lightRig rig="threePt" dir="t">
+              <a:rot lat="0" lon="0" rev="1200000"/>
+            </a:lightRig>
+          </a:scene3d>
+          <a:sp3d>
+            <a:bevelT w="63500" h="25400"/>
+          </a:sp3d>
+        </a:effectStyle>
+      </a:effectStyleLst>
+      <a:bgFillStyleLst>
+        <a:solidFill>
+          <a:schemeClr val="phClr"/>
+        </a:solidFill>
+        <a:gradFill rotWithShape="1">
+          <a:gsLst>
+            <a:gs pos="0">
+              <a:schemeClr val="phClr">
+                <a:tint val="40000"/>
+                <a:satMod val="350000"/>
+              </a:schemeClr>
+            </a:gs>
+            <a:gs pos="40000">
+              <a:schemeClr val="phClr">
+                <a:tint val="45000"/>
+                <a:shade val="99000"/>
+                <a:satMod val="350000"/>
+              </a:schemeClr>
+            </a:gs>
+            <a:gs pos="100000">
+              <a:schemeClr val="phClr">
+                <a:shade val="20000"/>
+                <a:satMod val="255000"/>
+              </a:schemeClr>
+            </a:gs>
+          </a:gsLst>
+          <a:path path="circle">
+            <a:fillToRect l="50000" t="-80000" r="50000" b="180000"/>
+          </a:path>
+        </a:gradFill>
+        <a:gradFill rotWithShape="1">
+          <a:gsLst>
+            <a:gs pos="0">
+              <a:schemeClr val="phClr">
+                <a:tint val="80000"/>
+                <a:satMod val="300000"/>
+              </a:schemeClr>
+            </a:gs>
+            <a:gs pos="100000">
+              <a:schemeClr val="phClr">
+                <a:shade val="30000"/>
+                <a:satMod val="200000"/>
+              </a:schemeClr>
+            </a:gs>
+          </a:gsLst>
+          <a:path path="circle">
+            <a:fillToRect l="50000" t="50000" r="50000" b="50000"/>
+          </a:path>
+        </a:gradFill>
+      </a:bgFillStyleLst>
+    </a:fmtScheme>
+  </a:themeElements>
+  <a:objectDefaults/>
+  <a:extraClrSchemeLst/>
+</a:theme>
+</file>
+
+<file path=ppt/theme/theme2.xml><?xml version="1.0" encoding="utf-8"?>
+<a:theme xmlns:a="http://schemas.openxmlformats.org/drawingml/2006/main">
   <a:themeElements>
     <a:clrScheme name="Default">
       <a:dk1>
@@ -7072,284 +7739,7 @@
       </a:bgFillStyleLst>
     </a:fmtScheme>
   </a:themeElements>
-</a:theme>
-</file>
-
-<file path=ppt/theme/theme2.xml><?xml version="1.0" encoding="utf-8"?>
-<a:theme xmlns:a="http://schemas.openxmlformats.org/drawingml/2006/main" xmlns:r="http://schemas.openxmlformats.org/officeDocument/2006/relationships" name="Simple Light">
-  <a:themeElements>
-    <a:clrScheme name="Simple Light">
-      <a:dk1>
-        <a:srgbClr val="000000"/>
-      </a:dk1>
-      <a:lt1>
-        <a:srgbClr val="FFFFFF"/>
-      </a:lt1>
-      <a:dk2>
-        <a:srgbClr val="595959"/>
-      </a:dk2>
-      <a:lt2>
-        <a:srgbClr val="EEEEEE"/>
-      </a:lt2>
-      <a:accent1>
-        <a:srgbClr val="FFAB40"/>
-      </a:accent1>
-      <a:accent2>
-        <a:srgbClr val="212121"/>
-      </a:accent2>
-      <a:accent3>
-        <a:srgbClr val="78909C"/>
-      </a:accent3>
-      <a:accent4>
-        <a:srgbClr val="FFAB40"/>
-      </a:accent4>
-      <a:accent5>
-        <a:srgbClr val="0097A7"/>
-      </a:accent5>
-      <a:accent6>
-        <a:srgbClr val="EEFF41"/>
-      </a:accent6>
-      <a:hlink>
-        <a:srgbClr val="0097A7"/>
-      </a:hlink>
-      <a:folHlink>
-        <a:srgbClr val="0097A7"/>
-      </a:folHlink>
-    </a:clrScheme>
-    <a:fontScheme name="Office">
-      <a:majorFont>
-        <a:latin typeface="Arial"/>
-        <a:ea typeface=""/>
-        <a:cs typeface=""/>
-        <a:font script="Jpan" typeface="ＭＳ Ｐゴシック"/>
-        <a:font script="Hang" typeface="맑은 고딕"/>
-        <a:font script="Hans" typeface="宋体"/>
-        <a:font script="Hant" typeface="新細明體"/>
-        <a:font script="Arab" typeface="Times New Roman"/>
-        <a:font script="Hebr" typeface="Times New Roman"/>
-        <a:font script="Thai" typeface="Angsana New"/>
-        <a:font script="Ethi" typeface="Nyala"/>
-        <a:font script="Beng" typeface="Vrinda"/>
-        <a:font script="Gujr" typeface="Shruti"/>
-        <a:font script="Khmr" typeface="MoolBoran"/>
-        <a:font script="Knda" typeface="Tunga"/>
-        <a:font script="Guru" typeface="Raavi"/>
-        <a:font script="Cans" typeface="Euphemia"/>
-        <a:font script="Cher" typeface="Plantagenet Cherokee"/>
-        <a:font script="Yiii" typeface="Microsoft Yi Baiti"/>
-        <a:font script="Tibt" typeface="Microsoft Himalaya"/>
-        <a:font script="Thaa" typeface="MV Boli"/>
-        <a:font script="Deva" typeface="Mangal"/>
-        <a:font script="Telu" typeface="Gautami"/>
-        <a:font script="Taml" typeface="Latha"/>
-        <a:font script="Syrc" typeface="Estrangelo Edessa"/>
-        <a:font script="Orya" typeface="Kalinga"/>
-        <a:font script="Mlym" typeface="Kartika"/>
-        <a:font script="Laoo" typeface="DokChampa"/>
-        <a:font script="Sinh" typeface="Iskoola Pota"/>
-        <a:font script="Mong" typeface="Mongolian Baiti"/>
-        <a:font script="Viet" typeface="Times New Roman"/>
-        <a:font script="Uigh" typeface="Microsoft Uighur"/>
-        <a:font script="Geor" typeface="Sylfaen"/>
-      </a:majorFont>
-      <a:minorFont>
-        <a:latin typeface="Arial"/>
-        <a:ea typeface=""/>
-        <a:cs typeface=""/>
-        <a:font script="Jpan" typeface="ＭＳ Ｐゴシック"/>
-        <a:font script="Hang" typeface="맑은 고딕"/>
-        <a:font script="Hans" typeface="宋体"/>
-        <a:font script="Hant" typeface="新細明體"/>
-        <a:font script="Arab" typeface="Arial"/>
-        <a:font script="Hebr" typeface="Arial"/>
-        <a:font script="Thai" typeface="Cordia New"/>
-        <a:font script="Ethi" typeface="Nyala"/>
-        <a:font script="Beng" typeface="Vrinda"/>
-        <a:font script="Gujr" typeface="Shruti"/>
-        <a:font script="Khmr" typeface="DaunPenh"/>
-        <a:font script="Knda" typeface="Tunga"/>
-        <a:font script="Guru" typeface="Raavi"/>
-        <a:font script="Cans" typeface="Euphemia"/>
-        <a:font script="Cher" typeface="Plantagenet Cherokee"/>
-        <a:font script="Yiii" typeface="Microsoft Yi Baiti"/>
-        <a:font script="Tibt" typeface="Microsoft Himalaya"/>
-        <a:font script="Thaa" typeface="MV Boli"/>
-        <a:font script="Deva" typeface="Mangal"/>
-        <a:font script="Telu" typeface="Gautami"/>
-        <a:font script="Taml" typeface="Latha"/>
-        <a:font script="Syrc" typeface="Estrangelo Edessa"/>
-        <a:font script="Orya" typeface="Kalinga"/>
-        <a:font script="Mlym" typeface="Kartika"/>
-        <a:font script="Laoo" typeface="DokChampa"/>
-        <a:font script="Sinh" typeface="Iskoola Pota"/>
-        <a:font script="Mong" typeface="Mongolian Baiti"/>
-        <a:font script="Viet" typeface="Arial"/>
-        <a:font script="Uigh" typeface="Microsoft Uighur"/>
-        <a:font script="Geor" typeface="Sylfaen"/>
-      </a:minorFont>
-    </a:fontScheme>
-    <a:fmtScheme name="Office">
-      <a:fillStyleLst>
-        <a:solidFill>
-          <a:schemeClr val="phClr"/>
-        </a:solidFill>
-        <a:gradFill rotWithShape="1">
-          <a:gsLst>
-            <a:gs pos="0">
-              <a:schemeClr val="phClr">
-                <a:tint val="50000"/>
-                <a:satMod val="300000"/>
-              </a:schemeClr>
-            </a:gs>
-            <a:gs pos="35000">
-              <a:schemeClr val="phClr">
-                <a:tint val="37000"/>
-                <a:satMod val="300000"/>
-              </a:schemeClr>
-            </a:gs>
-            <a:gs pos="100000">
-              <a:schemeClr val="phClr">
-                <a:tint val="15000"/>
-                <a:satMod val="350000"/>
-              </a:schemeClr>
-            </a:gs>
-          </a:gsLst>
-          <a:lin ang="16200000" scaled="1"/>
-        </a:gradFill>
-        <a:gradFill rotWithShape="1">
-          <a:gsLst>
-            <a:gs pos="0">
-              <a:schemeClr val="phClr">
-                <a:tint val="100000"/>
-                <a:shade val="100000"/>
-                <a:satMod val="130000"/>
-              </a:schemeClr>
-            </a:gs>
-            <a:gs pos="100000">
-              <a:schemeClr val="phClr">
-                <a:tint val="50000"/>
-                <a:shade val="100000"/>
-                <a:satMod val="350000"/>
-              </a:schemeClr>
-            </a:gs>
-          </a:gsLst>
-          <a:lin ang="16200000" scaled="0"/>
-        </a:gradFill>
-      </a:fillStyleLst>
-      <a:lnStyleLst>
-        <a:ln w="9525" cap="flat" cmpd="sng" algn="ctr">
-          <a:solidFill>
-            <a:schemeClr val="phClr">
-              <a:shade val="95000"/>
-              <a:satMod val="105000"/>
-            </a:schemeClr>
-          </a:solidFill>
-          <a:prstDash val="solid"/>
-        </a:ln>
-        <a:ln w="25400" cap="flat" cmpd="sng" algn="ctr">
-          <a:solidFill>
-            <a:schemeClr val="phClr"/>
-          </a:solidFill>
-          <a:prstDash val="solid"/>
-        </a:ln>
-        <a:ln w="38100" cap="flat" cmpd="sng" algn="ctr">
-          <a:solidFill>
-            <a:schemeClr val="phClr"/>
-          </a:solidFill>
-          <a:prstDash val="solid"/>
-        </a:ln>
-      </a:lnStyleLst>
-      <a:effectStyleLst>
-        <a:effectStyle>
-          <a:effectLst>
-            <a:outerShdw blurRad="40000" dist="20000" dir="5400000" rotWithShape="0">
-              <a:srgbClr val="000000">
-                <a:alpha val="38000"/>
-              </a:srgbClr>
-            </a:outerShdw>
-          </a:effectLst>
-        </a:effectStyle>
-        <a:effectStyle>
-          <a:effectLst>
-            <a:outerShdw blurRad="40000" dist="23000" dir="5400000" rotWithShape="0">
-              <a:srgbClr val="000000">
-                <a:alpha val="35000"/>
-              </a:srgbClr>
-            </a:outerShdw>
-          </a:effectLst>
-        </a:effectStyle>
-        <a:effectStyle>
-          <a:effectLst>
-            <a:outerShdw blurRad="40000" dist="23000" dir="5400000" rotWithShape="0">
-              <a:srgbClr val="000000">
-                <a:alpha val="35000"/>
-              </a:srgbClr>
-            </a:outerShdw>
-          </a:effectLst>
-          <a:scene3d>
-            <a:camera prst="orthographicFront">
-              <a:rot lat="0" lon="0" rev="0"/>
-            </a:camera>
-            <a:lightRig rig="threePt" dir="t">
-              <a:rot lat="0" lon="0" rev="1200000"/>
-            </a:lightRig>
-          </a:scene3d>
-          <a:sp3d>
-            <a:bevelT w="63500" h="25400"/>
-          </a:sp3d>
-        </a:effectStyle>
-      </a:effectStyleLst>
-      <a:bgFillStyleLst>
-        <a:solidFill>
-          <a:schemeClr val="phClr"/>
-        </a:solidFill>
-        <a:gradFill rotWithShape="1">
-          <a:gsLst>
-            <a:gs pos="0">
-              <a:schemeClr val="phClr">
-                <a:tint val="40000"/>
-                <a:satMod val="350000"/>
-              </a:schemeClr>
-            </a:gs>
-            <a:gs pos="40000">
-              <a:schemeClr val="phClr">
-                <a:tint val="45000"/>
-                <a:shade val="99000"/>
-                <a:satMod val="350000"/>
-              </a:schemeClr>
-            </a:gs>
-            <a:gs pos="100000">
-              <a:schemeClr val="phClr">
-                <a:shade val="20000"/>
-                <a:satMod val="255000"/>
-              </a:schemeClr>
-            </a:gs>
-          </a:gsLst>
-          <a:path path="circle">
-            <a:fillToRect l="50000" t="-80000" r="50000" b="180000"/>
-          </a:path>
-        </a:gradFill>
-        <a:gradFill rotWithShape="1">
-          <a:gsLst>
-            <a:gs pos="0">
-              <a:schemeClr val="phClr">
-                <a:tint val="80000"/>
-                <a:satMod val="300000"/>
-              </a:schemeClr>
-            </a:gs>
-            <a:gs pos="100000">
-              <a:schemeClr val="phClr">
-                <a:shade val="30000"/>
-                <a:satMod val="200000"/>
-              </a:schemeClr>
-            </a:gs>
-          </a:gsLst>
-          <a:path path="circle">
-            <a:fillToRect l="50000" t="50000" r="50000" b="50000"/>
-          </a:path>
-        </a:gradFill>
-      </a:bgFillStyleLst>
-    </a:fmtScheme>
-  </a:themeElements>
+  <a:objectDefaults/>
+  <a:extraClrSchemeLst/>
 </a:theme>
 </file>
</xml_diff>

<commit_message>
Update the presentation slides in the repo to get the last update from the google drive share we used
</commit_message>
<xml_diff>
--- a/assets/slides/Project Presentation.pptx
+++ b/assets/slides/Project Presentation.pptx
@@ -260,7 +260,7 @@
   </p:defaultTextStyle>
   <p:extLst>
     <p:ext uri="GoogleSlidesCustomDataVersion2">
-      <go:slidesCustomData xmlns:go="http://customooxmlschemas.google.com/" r:id="rId18" roundtripDataSignature="AMtx7miO97icILlS7LTi4XSjhyTfo16b+A=="/>
+      <go:slidesCustomData xmlns:go="http://customooxmlschemas.google.com/" r:id="rId18" roundtripDataSignature="AMtx7mirWRS7y1OcOnd+B0m2lnuBHjBP8w=="/>
     </p:ext>
   </p:extLst>
 </p:presentation>
@@ -1073,7 +1073,7 @@
   <p:cSld>
     <p:spTree>
       <p:nvGrpSpPr>
-        <p:cNvPr id="61" name="Shape 61"/>
+        <p:cNvPr id="62" name="Shape 62"/>
         <p:cNvGrpSpPr/>
         <p:nvPr/>
       </p:nvGrpSpPr>
@@ -1087,7 +1087,7 @@
       </p:grpSpPr>
       <p:sp>
         <p:nvSpPr>
-          <p:cNvPr id="62" name="Google Shape;62;p3:notes"/>
+          <p:cNvPr id="63" name="Google Shape;63;p3:notes"/>
           <p:cNvSpPr/>
           <p:nvPr>
             <p:ph idx="2" type="sldImg"/>
@@ -1132,7 +1132,7 @@
       </p:sp>
       <p:sp>
         <p:nvSpPr>
-          <p:cNvPr id="63" name="Google Shape;63;p3:notes"/>
+          <p:cNvPr id="64" name="Google Shape;64;p3:notes"/>
           <p:cNvSpPr txBox="1"/>
           <p:nvPr>
             <p:ph idx="1" type="body"/>
@@ -1190,7 +1190,7 @@
   <p:cSld>
     <p:spTree>
       <p:nvGrpSpPr>
-        <p:cNvPr id="67" name="Shape 67"/>
+        <p:cNvPr id="68" name="Shape 68"/>
         <p:cNvGrpSpPr/>
         <p:nvPr/>
       </p:nvGrpSpPr>
@@ -1204,7 +1204,7 @@
       </p:grpSpPr>
       <p:sp>
         <p:nvSpPr>
-          <p:cNvPr id="68" name="Google Shape;68;p4:notes"/>
+          <p:cNvPr id="69" name="Google Shape;69;p4:notes"/>
           <p:cNvSpPr/>
           <p:nvPr>
             <p:ph idx="2" type="sldImg"/>
@@ -1249,7 +1249,7 @@
       </p:sp>
       <p:sp>
         <p:nvSpPr>
-          <p:cNvPr id="69" name="Google Shape;69;p4:notes"/>
+          <p:cNvPr id="70" name="Google Shape;70;p4:notes"/>
           <p:cNvSpPr txBox="1"/>
           <p:nvPr>
             <p:ph idx="1" type="body"/>
@@ -1307,7 +1307,7 @@
   <p:cSld>
     <p:spTree>
       <p:nvGrpSpPr>
-        <p:cNvPr id="73" name="Shape 73"/>
+        <p:cNvPr id="74" name="Shape 74"/>
         <p:cNvGrpSpPr/>
         <p:nvPr/>
       </p:nvGrpSpPr>
@@ -1321,7 +1321,7 @@
       </p:grpSpPr>
       <p:sp>
         <p:nvSpPr>
-          <p:cNvPr id="74" name="Google Shape;74;g316582e2303_3_0:notes"/>
+          <p:cNvPr id="75" name="Google Shape;75;g316582e2303_3_0:notes"/>
           <p:cNvSpPr/>
           <p:nvPr>
             <p:ph idx="2" type="sldImg"/>
@@ -1356,7 +1356,7 @@
       </p:sp>
       <p:sp>
         <p:nvSpPr>
-          <p:cNvPr id="75" name="Google Shape;75;g316582e2303_3_0:notes"/>
+          <p:cNvPr id="76" name="Google Shape;76;g316582e2303_3_0:notes"/>
           <p:cNvSpPr txBox="1"/>
           <p:nvPr>
             <p:ph idx="1" type="body"/>
@@ -1406,7 +1406,7 @@
   <p:cSld>
     <p:spTree>
       <p:nvGrpSpPr>
-        <p:cNvPr id="79" name="Shape 79"/>
+        <p:cNvPr id="80" name="Shape 80"/>
         <p:cNvGrpSpPr/>
         <p:nvPr/>
       </p:nvGrpSpPr>
@@ -1420,7 +1420,7 @@
       </p:grpSpPr>
       <p:sp>
         <p:nvSpPr>
-          <p:cNvPr id="80" name="Google Shape;80;p5:notes"/>
+          <p:cNvPr id="81" name="Google Shape;81;p5:notes"/>
           <p:cNvSpPr/>
           <p:nvPr>
             <p:ph idx="2" type="sldImg"/>
@@ -1465,7 +1465,7 @@
       </p:sp>
       <p:sp>
         <p:nvSpPr>
-          <p:cNvPr id="81" name="Google Shape;81;p5:notes"/>
+          <p:cNvPr id="82" name="Google Shape;82;p5:notes"/>
           <p:cNvSpPr txBox="1"/>
           <p:nvPr>
             <p:ph idx="1" type="body"/>
@@ -1523,7 +1523,7 @@
   <p:cSld>
     <p:spTree>
       <p:nvGrpSpPr>
-        <p:cNvPr id="84" name="Shape 84"/>
+        <p:cNvPr id="85" name="Shape 85"/>
         <p:cNvGrpSpPr/>
         <p:nvPr/>
       </p:nvGrpSpPr>
@@ -1537,7 +1537,7 @@
       </p:grpSpPr>
       <p:sp>
         <p:nvSpPr>
-          <p:cNvPr id="85" name="Google Shape;85;p6:notes"/>
+          <p:cNvPr id="86" name="Google Shape;86;p6:notes"/>
           <p:cNvSpPr/>
           <p:nvPr>
             <p:ph idx="2" type="sldImg"/>
@@ -1582,7 +1582,7 @@
       </p:sp>
       <p:sp>
         <p:nvSpPr>
-          <p:cNvPr id="86" name="Google Shape;86;p6:notes"/>
+          <p:cNvPr id="87" name="Google Shape;87;p6:notes"/>
           <p:cNvSpPr txBox="1"/>
           <p:nvPr>
             <p:ph idx="1" type="body"/>
@@ -1640,7 +1640,7 @@
   <p:cSld>
     <p:spTree>
       <p:nvGrpSpPr>
-        <p:cNvPr id="90" name="Shape 90"/>
+        <p:cNvPr id="91" name="Shape 91"/>
         <p:cNvGrpSpPr/>
         <p:nvPr/>
       </p:nvGrpSpPr>
@@ -1654,7 +1654,7 @@
       </p:grpSpPr>
       <p:sp>
         <p:nvSpPr>
-          <p:cNvPr id="91" name="Google Shape;91;g313172484f0_4_0:notes"/>
+          <p:cNvPr id="92" name="Google Shape;92;g313172484f0_4_0:notes"/>
           <p:cNvSpPr/>
           <p:nvPr>
             <p:ph idx="2" type="sldImg"/>
@@ -1689,7 +1689,7 @@
       </p:sp>
       <p:sp>
         <p:nvSpPr>
-          <p:cNvPr id="92" name="Google Shape;92;g313172484f0_4_0:notes"/>
+          <p:cNvPr id="93" name="Google Shape;93;g313172484f0_4_0:notes"/>
           <p:cNvSpPr txBox="1"/>
           <p:nvPr>
             <p:ph idx="1" type="body"/>
@@ -1739,7 +1739,7 @@
   <p:cSld>
     <p:spTree>
       <p:nvGrpSpPr>
-        <p:cNvPr id="95" name="Shape 95"/>
+        <p:cNvPr id="96" name="Shape 96"/>
         <p:cNvGrpSpPr/>
         <p:nvPr/>
       </p:nvGrpSpPr>
@@ -1753,7 +1753,7 @@
       </p:grpSpPr>
       <p:sp>
         <p:nvSpPr>
-          <p:cNvPr id="96" name="Google Shape;96;p7:notes"/>
+          <p:cNvPr id="97" name="Google Shape;97;p7:notes"/>
           <p:cNvSpPr/>
           <p:nvPr>
             <p:ph idx="2" type="sldImg"/>
@@ -1798,7 +1798,7 @@
       </p:sp>
       <p:sp>
         <p:nvSpPr>
-          <p:cNvPr id="97" name="Google Shape;97;p7:notes"/>
+          <p:cNvPr id="98" name="Google Shape;98;p7:notes"/>
           <p:cNvSpPr txBox="1"/>
           <p:nvPr>
             <p:ph idx="1" type="body"/>
@@ -6699,10 +6699,80 @@
               <a:buNone/>
             </a:pPr>
             <a:r>
-              <a:rPr lang="en-US"/>
-              <a:t>Are you a nerd? Like… full sweat? Are you sure? Well then, brave adventurer, do we have a trivia game for you! This game is FULL of epix and lore from video games to movie trivia, it’s got it all. Do you have what it takes to claim the high-score? Are you the king of the hill? Or are you gonna cry about it?</a:t>
+              <a:rPr lang="en-US" sz="2900"/>
+              <a:t>Are you a nerd? Like… full sweat? Are you sure? Well then, brave adventurer, do we have a trivia game for you! This game is FULL of epix and lore. From video games to movie trivia, it’s got it all. Do you have what it takes to claim the high-score? Are you the king of the hill?</a:t>
             </a:r>
-            <a:endParaRPr/>
+            <a:endParaRPr sz="2900"/>
+          </a:p>
+          <a:p>
+            <a:pPr indent="0" lvl="0" marL="0" rtl="0" algn="ctr">
+              <a:lnSpc>
+                <a:spcPct val="100000"/>
+              </a:lnSpc>
+              <a:spcBef>
+                <a:spcPts val="0"/>
+              </a:spcBef>
+              <a:spcAft>
+                <a:spcPts val="0"/>
+              </a:spcAft>
+              <a:buSzPts val="3600"/>
+              <a:buNone/>
+            </a:pPr>
+            <a:r>
+              <a:rPr lang="en-US" sz="2900"/>
+              <a:t>Then Test Your Nerd Knowledge Now!!!</a:t>
+            </a:r>
+            <a:endParaRPr sz="2900"/>
+          </a:p>
+        </p:txBody>
+      </p:sp>
+      <p:sp>
+        <p:nvSpPr>
+          <p:cNvPr id="61" name="Google Shape;61;p2"/>
+          <p:cNvSpPr txBox="1"/>
+          <p:nvPr/>
+        </p:nvSpPr>
+        <p:spPr>
+          <a:xfrm>
+            <a:off x="439125" y="194250"/>
+            <a:ext cx="8041500" cy="512700"/>
+          </a:xfrm>
+          <a:prstGeom prst="rect">
+            <a:avLst/>
+          </a:prstGeom>
+          <a:noFill/>
+          <a:ln>
+            <a:noFill/>
+          </a:ln>
+        </p:spPr>
+        <p:txBody>
+          <a:bodyPr anchorCtr="0" anchor="t" bIns="91425" lIns="91425" spcFirstLastPara="1" rIns="91425" wrap="square" tIns="91425">
+            <a:noAutofit/>
+          </a:bodyPr>
+          <a:lstStyle/>
+          <a:p>
+            <a:pPr indent="0" lvl="0" marL="0" rtl="0" algn="l">
+              <a:spcBef>
+                <a:spcPts val="0"/>
+              </a:spcBef>
+              <a:spcAft>
+                <a:spcPts val="0"/>
+              </a:spcAft>
+              <a:buNone/>
+            </a:pPr>
+            <a:r>
+              <a:rPr b="1" lang="en-US" sz="2700" u="sng">
+                <a:solidFill>
+                  <a:schemeClr val="dk2"/>
+                </a:solidFill>
+              </a:rPr>
+              <a:t>Elevator Pitch!!</a:t>
+            </a:r>
+            <a:endParaRPr b="1" sz="2700" u="sng">
+              <a:solidFill>
+                <a:schemeClr val="dk2"/>
+              </a:solidFill>
+            </a:endParaRPr>
           </a:p>
         </p:txBody>
       </p:sp>
@@ -6731,7 +6801,7 @@
   <p:cSld>
     <p:spTree>
       <p:nvGrpSpPr>
-        <p:cNvPr id="64" name="Shape 64"/>
+        <p:cNvPr id="65" name="Shape 65"/>
         <p:cNvGrpSpPr/>
         <p:nvPr/>
       </p:nvGrpSpPr>
@@ -6745,7 +6815,7 @@
       </p:grpSpPr>
       <p:sp>
         <p:nvSpPr>
-          <p:cNvPr id="65" name="Google Shape;65;p3"/>
+          <p:cNvPr id="66" name="Google Shape;66;p3"/>
           <p:cNvSpPr txBox="1"/>
           <p:nvPr>
             <p:ph type="title"/>
@@ -6793,7 +6863,7 @@
       </p:sp>
       <p:sp>
         <p:nvSpPr>
-          <p:cNvPr id="66" name="Google Shape;66;p3"/>
+          <p:cNvPr id="67" name="Google Shape;67;p3"/>
           <p:cNvSpPr txBox="1"/>
           <p:nvPr>
             <p:ph idx="1" type="body"/>
@@ -6833,7 +6903,11 @@
             </a:pPr>
             <a:r>
               <a:rPr lang="en-US"/>
-              <a:t>The Nerd Trivia game is a web application that presents the user with 10 randomized multiple-choice questions on the subject of general video games. The user enters their name for personalization. After completing the questions, the final score is displayed on a summary screen.</a:t>
+              <a:t>The Nerd Trivia game is a web application that presents the user with 10 randomized multiple-choice questions on the subject of general video games. The user must enter their username in order to play the game. After completing the quiz, the final score will be displayed. The highest score will then </a:t>
+            </a:r>
+            <a:r>
+              <a:rPr lang="en-US"/>
+              <a:t>display on the homepage.</a:t>
             </a:r>
             <a:endParaRPr/>
           </a:p>
@@ -6913,7 +6987,7 @@
             </a:pPr>
             <a:r>
               <a:rPr lang="en-US"/>
-              <a:t>I WANT to play a quiz game</a:t>
+              <a:t>I WANT to play a trivia game</a:t>
             </a:r>
             <a:endParaRPr/>
           </a:p>
@@ -6952,7 +7026,7 @@
   <p:cSld>
     <p:spTree>
       <p:nvGrpSpPr>
-        <p:cNvPr id="70" name="Shape 70"/>
+        <p:cNvPr id="71" name="Shape 71"/>
         <p:cNvGrpSpPr/>
         <p:nvPr/>
       </p:nvGrpSpPr>
@@ -6966,7 +7040,7 @@
       </p:grpSpPr>
       <p:sp>
         <p:nvSpPr>
-          <p:cNvPr id="71" name="Google Shape;71;p4"/>
+          <p:cNvPr id="72" name="Google Shape;72;p4"/>
           <p:cNvSpPr txBox="1"/>
           <p:nvPr>
             <p:ph type="title"/>
@@ -7014,7 +7088,7 @@
       </p:sp>
       <p:sp>
         <p:nvSpPr>
-          <p:cNvPr id="72" name="Google Shape;72;p4"/>
+          <p:cNvPr id="73" name="Google Shape;73;p4"/>
           <p:cNvSpPr txBox="1"/>
           <p:nvPr>
             <p:ph idx="1" type="body"/>
@@ -7022,7 +7096,7 @@
         </p:nvSpPr>
         <p:spPr>
           <a:xfrm>
-            <a:off x="311700" y="1152475"/>
+            <a:off x="187400" y="1017725"/>
             <a:ext cx="8520600" cy="4155300"/>
           </a:xfrm>
           <a:prstGeom prst="rect">
@@ -7186,7 +7260,7 @@
             </a:r>
             <a:r>
               <a:rPr lang="en-US"/>
-              <a:t>: trivia question content, html layout. </a:t>
+              <a:t>: trivia question content, html layout and </a:t>
             </a:r>
             <a:r>
               <a:rPr b="1" lang="en-US"/>
@@ -7307,7 +7381,7 @@
   <p:cSld>
     <p:spTree>
       <p:nvGrpSpPr>
-        <p:cNvPr id="76" name="Shape 76"/>
+        <p:cNvPr id="77" name="Shape 77"/>
         <p:cNvGrpSpPr/>
         <p:nvPr/>
       </p:nvGrpSpPr>
@@ -7321,7 +7395,7 @@
       </p:grpSpPr>
       <p:sp>
         <p:nvSpPr>
-          <p:cNvPr id="77" name="Google Shape;77;g316582e2303_3_0"/>
+          <p:cNvPr id="78" name="Google Shape;78;g316582e2303_3_0"/>
           <p:cNvSpPr txBox="1"/>
           <p:nvPr>
             <p:ph type="title"/>
@@ -7361,7 +7435,7 @@
       </p:sp>
       <p:sp>
         <p:nvSpPr>
-          <p:cNvPr id="78" name="Google Shape;78;g316582e2303_3_0"/>
+          <p:cNvPr id="79" name="Google Shape;79;g316582e2303_3_0"/>
           <p:cNvSpPr txBox="1"/>
           <p:nvPr>
             <p:ph idx="1" type="body"/>
@@ -7369,7 +7443,7 @@
         </p:nvSpPr>
         <p:spPr>
           <a:xfrm>
-            <a:off x="311700" y="1152475"/>
+            <a:off x="210675" y="1191325"/>
             <a:ext cx="8520600" cy="3416400"/>
           </a:xfrm>
           <a:prstGeom prst="rect">
@@ -7398,9 +7472,9 @@
             </a:r>
             <a:r>
               <a:rPr lang="en-US" sz="1500"/>
-              <a:t>Trouble breaking into smaller tasks Difficulty planning the UI flow.</a:t>
+              <a:t>Trouble breaking into smaller tasks, Difficulty planning the UI flow. </a:t>
             </a:r>
-            <a:endParaRPr/>
+            <a:endParaRPr sz="1500"/>
           </a:p>
           <a:p>
             <a:pPr indent="-342900" lvl="0" marL="457200" rtl="0" algn="l">
@@ -7419,9 +7493,9 @@
             </a:r>
             <a:r>
               <a:rPr lang="en-US" sz="1500"/>
-              <a:t>Adapted to updates using a testbed temporary page. Broke out major features into individual css and js files to avoid work conflicts.</a:t>
+              <a:t>Adapted to updates using a testbed temporary page. Broke out major features into individual css and js files to avoid work conflicts, redirecting to certain pages using buttons and clickable images! </a:t>
             </a:r>
-            <a:endParaRPr/>
+            <a:endParaRPr sz="1500"/>
           </a:p>
         </p:txBody>
       </p:sp>
@@ -7438,7 +7512,7 @@
   <p:cSld>
     <p:spTree>
       <p:nvGrpSpPr>
-        <p:cNvPr id="82" name="Shape 82"/>
+        <p:cNvPr id="83" name="Shape 83"/>
         <p:cNvGrpSpPr/>
         <p:nvPr/>
       </p:nvGrpSpPr>
@@ -7452,16 +7526,16 @@
       </p:grpSpPr>
       <p:sp>
         <p:nvSpPr>
-          <p:cNvPr id="83" name="Google Shape;83;p5"/>
+          <p:cNvPr id="84" name="Google Shape;84;p5"/>
           <p:cNvSpPr txBox="1"/>
           <p:nvPr>
             <p:ph type="title"/>
           </p:nvPr>
         </p:nvSpPr>
         <p:spPr>
-          <a:xfrm rot="605">
-            <a:off x="274403" y="461464"/>
-            <a:ext cx="8520300" cy="841500"/>
+          <a:xfrm rot="552">
+            <a:off x="-100500" y="1926756"/>
+            <a:ext cx="9345000" cy="1290000"/>
           </a:xfrm>
           <a:prstGeom prst="rect">
             <a:avLst/>
@@ -7511,7 +7585,7 @@
   <p:cSld>
     <p:spTree>
       <p:nvGrpSpPr>
-        <p:cNvPr id="87" name="Shape 87"/>
+        <p:cNvPr id="88" name="Shape 88"/>
         <p:cNvGrpSpPr/>
         <p:nvPr/>
       </p:nvGrpSpPr>
@@ -7525,7 +7599,7 @@
       </p:grpSpPr>
       <p:sp>
         <p:nvSpPr>
-          <p:cNvPr id="88" name="Google Shape;88;p6"/>
+          <p:cNvPr id="89" name="Google Shape;89;p6"/>
           <p:cNvSpPr txBox="1"/>
           <p:nvPr>
             <p:ph type="title"/>
@@ -7573,7 +7647,7 @@
       </p:sp>
       <p:sp>
         <p:nvSpPr>
-          <p:cNvPr id="89" name="Google Shape;89;p6"/>
+          <p:cNvPr id="90" name="Google Shape;90;p6"/>
           <p:cNvSpPr txBox="1"/>
           <p:nvPr>
             <p:ph idx="1" type="body"/>
@@ -7741,7 +7815,7 @@
   <p:cSld>
     <p:spTree>
       <p:nvGrpSpPr>
-        <p:cNvPr id="93" name="Shape 93"/>
+        <p:cNvPr id="94" name="Shape 94"/>
         <p:cNvGrpSpPr/>
         <p:nvPr/>
       </p:nvGrpSpPr>
@@ -7755,7 +7829,7 @@
       </p:grpSpPr>
       <p:pic>
         <p:nvPicPr>
-          <p:cNvPr id="94" name="Google Shape;94;g313172484f0_4_0"/>
+          <p:cNvPr id="95" name="Google Shape;95;g313172484f0_4_0"/>
           <p:cNvPicPr preferRelativeResize="0"/>
           <p:nvPr/>
         </p:nvPicPr>
@@ -7794,7 +7868,7 @@
   <p:cSld>
     <p:spTree>
       <p:nvGrpSpPr>
-        <p:cNvPr id="98" name="Shape 98"/>
+        <p:cNvPr id="99" name="Shape 99"/>
         <p:cNvGrpSpPr/>
         <p:nvPr/>
       </p:nvGrpSpPr>
@@ -7808,7 +7882,7 @@
       </p:grpSpPr>
       <p:sp>
         <p:nvSpPr>
-          <p:cNvPr id="99" name="Google Shape;99;p7"/>
+          <p:cNvPr id="100" name="Google Shape;100;p7"/>
           <p:cNvSpPr txBox="1"/>
           <p:nvPr>
             <p:ph type="title"/>
@@ -7856,7 +7930,7 @@
       </p:sp>
       <p:sp>
         <p:nvSpPr>
-          <p:cNvPr id="100" name="Google Shape;100;p7"/>
+          <p:cNvPr id="101" name="Google Shape;101;p7"/>
           <p:cNvSpPr txBox="1"/>
           <p:nvPr>
             <p:ph idx="1" type="body"/>

</xml_diff>